<commit_message>
Project update, execrices dates adjusted
</commit_message>
<xml_diff>
--- a/WDSR - zarys programu.pptx
+++ b/WDSR - zarys programu.pptx
@@ -155,7 +155,7 @@
   </p:defaultTextStyle>
   <p:extLst>
     <p:ext uri="{EFAFB233-063F-42B5-8137-9DF3F51BA10A}">
-      <p15:sldGuideLst xmlns:p15="http://schemas.microsoft.com/office/powerpoint/2012/main">
+      <p15:sldGuideLst xmlns:p15="http://schemas.microsoft.com/office/powerpoint/2012/main" xmlns="">
         <p15:guide id="1" orient="horz" pos="2160">
           <p15:clr>
             <a:srgbClr val="A4A3A4"/>
@@ -169,7 +169,7 @@
       </p15:sldGuideLst>
     </p:ext>
     <p:ext uri="{2D200454-40CA-4A62-9FC3-DE9A4176ACB9}">
-      <p15:notesGuideLst xmlns:p15="http://schemas.microsoft.com/office/powerpoint/2012/main"/>
+      <p15:notesGuideLst xmlns:p15="http://schemas.microsoft.com/office/powerpoint/2012/main" xmlns=""/>
     </p:ext>
   </p:extLst>
 </p:presentation>
@@ -3755,29 +3755,29 @@
     </dgm:pt>
   </dgm:ptLst>
   <dgm:cxnLst>
-    <dgm:cxn modelId="{A643151B-3E22-4B18-8884-B35007EC6172}" srcId="{E07D3DF8-B531-453C-B599-898D9D03A724}" destId="{A6C8BD6C-B3B2-4605-8970-343DCDE52EF2}" srcOrd="4" destOrd="0" parTransId="{B4F2E15E-1C80-4166-8AB2-D3523720A631}" sibTransId="{1DEDE7B7-B08A-462B-8B72-29F3AA43F8B3}"/>
     <dgm:cxn modelId="{0CCCD3B3-D207-4257-AF84-B8775E8A0D94}" type="presOf" srcId="{1691F446-2C4D-4079-9D16-C341031FF10A}" destId="{5EE99CAA-C70B-49D9-9943-E42F93D8C815}" srcOrd="0" destOrd="0" presId="urn:microsoft.com/office/officeart/2005/8/layout/vList2"/>
-    <dgm:cxn modelId="{C645250B-999A-4C4B-B0D9-55ADA0CE32A4}" srcId="{D6EE5DE8-77E8-4922-A9C6-F365BBE83A79}" destId="{5A0F2CBC-D6CD-4367-8680-42DC6E42144E}" srcOrd="0" destOrd="0" parTransId="{2DDB378C-5C3B-4863-911A-3B31766CAA26}" sibTransId="{DBC07F86-E648-42B6-92D9-074FCD1F5866}"/>
-    <dgm:cxn modelId="{548A0F74-DBD6-46F8-9FF7-68DA0AB3A980}" srcId="{CB61399F-1A2D-42E5-8BED-9711DCC11731}" destId="{21F8D68D-EA5A-4A42-BBF1-FE8E7480EBDF}" srcOrd="0" destOrd="0" parTransId="{6A6B22FF-C327-472B-90B5-9F5FC64B0C98}" sibTransId="{AEE67130-E96F-4C8F-8A94-E077723513D2}"/>
-    <dgm:cxn modelId="{C087B476-0ECB-4B01-B85A-EE7A409D083F}" srcId="{A6C8BD6C-B3B2-4605-8970-343DCDE52EF2}" destId="{1691F446-2C4D-4079-9D16-C341031FF10A}" srcOrd="0" destOrd="0" parTransId="{DCA4AE69-92CF-4492-A9CA-C35A56BC76BB}" sibTransId="{05219947-3651-4DBB-9B49-DF587987A035}"/>
-    <dgm:cxn modelId="{0AFFA354-5C02-4BC8-9F90-6CB7F9AFE621}" type="presOf" srcId="{2D36E825-4ACE-45FF-9A82-A07828909465}" destId="{401ECA87-A414-4C2E-815B-2E740FECD9DF}" srcOrd="0" destOrd="0" presId="urn:microsoft.com/office/officeart/2005/8/layout/vList2"/>
+    <dgm:cxn modelId="{F76D688E-0948-47EA-A549-7D65A1582F49}" type="presOf" srcId="{A6C8BD6C-B3B2-4605-8970-343DCDE52EF2}" destId="{5AF62516-935A-4716-BC3C-96D1A9708875}" srcOrd="0" destOrd="0" presId="urn:microsoft.com/office/officeart/2005/8/layout/vList2"/>
     <dgm:cxn modelId="{BD83DB13-AF8E-45F1-8C52-C6D500289627}" srcId="{53EFCA86-4B4F-4BDE-9322-06215FFCFCBF}" destId="{D941E3BF-98DE-4282-B4DB-54913C6EC119}" srcOrd="0" destOrd="0" parTransId="{AA5B2974-F7E5-4CC9-83B2-B8740E8231AC}" sibTransId="{DDFB1F4D-E32E-4565-9580-62BBB3128E9E}"/>
-    <dgm:cxn modelId="{C7B1D9FF-5D60-42D7-959C-33E79E337AF9}" type="presOf" srcId="{21F8D68D-EA5A-4A42-BBF1-FE8E7480EBDF}" destId="{9C495DF5-169D-4A31-B3DB-88DFF8C7AB22}" srcOrd="0" destOrd="0" presId="urn:microsoft.com/office/officeart/2005/8/layout/vList2"/>
-    <dgm:cxn modelId="{6C00EABA-6F4F-4A66-86A2-B21FF967D541}" srcId="{E07D3DF8-B531-453C-B599-898D9D03A724}" destId="{CB61399F-1A2D-42E5-8BED-9711DCC11731}" srcOrd="3" destOrd="0" parTransId="{7AE97EF6-8A82-49B0-B4CC-14B044F0451A}" sibTransId="{2AF9AD82-5FDD-4C7C-B9BF-B03397D23B2C}"/>
-    <dgm:cxn modelId="{649E1C9A-C4FD-4E90-9094-E80372FE3B54}" srcId="{E07D3DF8-B531-453C-B599-898D9D03A724}" destId="{2D36E825-4ACE-45FF-9A82-A07828909465}" srcOrd="0" destOrd="0" parTransId="{B4AFEE9B-1623-480E-AD65-DE7486D44E39}" sibTransId="{3CA66D8E-C79A-4301-B374-30BE44E4CC8F}"/>
+    <dgm:cxn modelId="{8D8C4E95-60C9-480E-9C5F-EE033220E80F}" srcId="{E07D3DF8-B531-453C-B599-898D9D03A724}" destId="{D6EE5DE8-77E8-4922-A9C6-F365BBE83A79}" srcOrd="1" destOrd="0" parTransId="{8DA20819-D089-451F-B155-BEB2F31ACDE1}" sibTransId="{B04399C4-AD34-48A2-83F1-5DE748533820}"/>
     <dgm:cxn modelId="{A9BFA2C8-954A-4FE2-97AA-0009721AAFC5}" type="presOf" srcId="{5A0F2CBC-D6CD-4367-8680-42DC6E42144E}" destId="{0FB52419-7EF2-4113-8849-3B16BAEC9DD7}" srcOrd="0" destOrd="0" presId="urn:microsoft.com/office/officeart/2005/8/layout/vList2"/>
     <dgm:cxn modelId="{4FFEC5CB-4856-4516-B3A5-4EFCD07F5A88}" type="presOf" srcId="{CB61399F-1A2D-42E5-8BED-9711DCC11731}" destId="{78DA6840-523F-44DE-8870-8809A7BF9028}" srcOrd="0" destOrd="0" presId="urn:microsoft.com/office/officeart/2005/8/layout/vList2"/>
+    <dgm:cxn modelId="{8D5CBEEA-BF3A-4A31-9C1A-49FEF53E1159}" srcId="{2D36E825-4ACE-45FF-9A82-A07828909465}" destId="{38F77422-9DC2-4461-90F4-808381EB6C65}" srcOrd="0" destOrd="0" parTransId="{7E42520C-05FF-4542-92ED-FFCB90C662C0}" sibTransId="{5D5F5B14-0F69-49D6-8F3A-089808006D11}"/>
+    <dgm:cxn modelId="{5D734A43-4A03-4A3B-B7F1-B29B10CCBE03}" type="presOf" srcId="{E07D3DF8-B531-453C-B599-898D9D03A724}" destId="{AE563F13-1AA5-450D-9916-2F11638C1DA9}" srcOrd="0" destOrd="0" presId="urn:microsoft.com/office/officeart/2005/8/layout/vList2"/>
+    <dgm:cxn modelId="{C7B1D9FF-5D60-42D7-959C-33E79E337AF9}" type="presOf" srcId="{21F8D68D-EA5A-4A42-BBF1-FE8E7480EBDF}" destId="{9C495DF5-169D-4A31-B3DB-88DFF8C7AB22}" srcOrd="0" destOrd="0" presId="urn:microsoft.com/office/officeart/2005/8/layout/vList2"/>
+    <dgm:cxn modelId="{9D36F30C-4180-4DB2-BAE7-240B33A3EF2C}" type="presOf" srcId="{53EFCA86-4B4F-4BDE-9322-06215FFCFCBF}" destId="{AF79282F-4587-49CB-B714-735A3E3EDCB9}" srcOrd="0" destOrd="0" presId="urn:microsoft.com/office/officeart/2005/8/layout/vList2"/>
+    <dgm:cxn modelId="{16B41F11-0943-4602-ABD2-F3D16EECCA72}" type="presOf" srcId="{D6EE5DE8-77E8-4922-A9C6-F365BBE83A79}" destId="{376597F5-777C-4886-9496-C2590412E54E}" srcOrd="0" destOrd="0" presId="urn:microsoft.com/office/officeart/2005/8/layout/vList2"/>
+    <dgm:cxn modelId="{0AFFA354-5C02-4BC8-9F90-6CB7F9AFE621}" type="presOf" srcId="{2D36E825-4ACE-45FF-9A82-A07828909465}" destId="{401ECA87-A414-4C2E-815B-2E740FECD9DF}" srcOrd="0" destOrd="0" presId="urn:microsoft.com/office/officeart/2005/8/layout/vList2"/>
+    <dgm:cxn modelId="{4992FD39-C66E-4832-A5F1-11781180184C}" type="presOf" srcId="{2CE68B19-4D7E-4DE2-8DC6-889BE6ABFD76}" destId="{C7130AF6-5BCF-4F29-BA34-95CB85B72764}" srcOrd="0" destOrd="1" presId="urn:microsoft.com/office/officeart/2005/8/layout/vList2"/>
+    <dgm:cxn modelId="{2C2228F0-1DA1-4549-8ABC-794586086176}" srcId="{E07D3DF8-B531-453C-B599-898D9D03A724}" destId="{53EFCA86-4B4F-4BDE-9322-06215FFCFCBF}" srcOrd="2" destOrd="0" parTransId="{6F8E2E0C-0D28-4F6E-A0F7-62F820350508}" sibTransId="{06D6753B-B082-4C36-B61B-1650AF337FFC}"/>
+    <dgm:cxn modelId="{F66F8873-F080-4ED4-A831-58841009DADE}" type="presOf" srcId="{38F77422-9DC2-4461-90F4-808381EB6C65}" destId="{C7130AF6-5BCF-4F29-BA34-95CB85B72764}" srcOrd="0" destOrd="0" presId="urn:microsoft.com/office/officeart/2005/8/layout/vList2"/>
+    <dgm:cxn modelId="{6C00EABA-6F4F-4A66-86A2-B21FF967D541}" srcId="{E07D3DF8-B531-453C-B599-898D9D03A724}" destId="{CB61399F-1A2D-42E5-8BED-9711DCC11731}" srcOrd="3" destOrd="0" parTransId="{7AE97EF6-8A82-49B0-B4CC-14B044F0451A}" sibTransId="{2AF9AD82-5FDD-4C7C-B9BF-B03397D23B2C}"/>
     <dgm:cxn modelId="{0BA1EE72-EF87-4D62-8BBC-9B12C0A66E28}" type="presOf" srcId="{D941E3BF-98DE-4282-B4DB-54913C6EC119}" destId="{3FFC3410-A2D0-4B28-A055-BFAC61BCB93F}" srcOrd="0" destOrd="0" presId="urn:microsoft.com/office/officeart/2005/8/layout/vList2"/>
-    <dgm:cxn modelId="{5D734A43-4A03-4A3B-B7F1-B29B10CCBE03}" type="presOf" srcId="{E07D3DF8-B531-453C-B599-898D9D03A724}" destId="{AE563F13-1AA5-450D-9916-2F11638C1DA9}" srcOrd="0" destOrd="0" presId="urn:microsoft.com/office/officeart/2005/8/layout/vList2"/>
-    <dgm:cxn modelId="{4992FD39-C66E-4832-A5F1-11781180184C}" type="presOf" srcId="{2CE68B19-4D7E-4DE2-8DC6-889BE6ABFD76}" destId="{C7130AF6-5BCF-4F29-BA34-95CB85B72764}" srcOrd="0" destOrd="1" presId="urn:microsoft.com/office/officeart/2005/8/layout/vList2"/>
+    <dgm:cxn modelId="{548A0F74-DBD6-46F8-9FF7-68DA0AB3A980}" srcId="{CB61399F-1A2D-42E5-8BED-9711DCC11731}" destId="{21F8D68D-EA5A-4A42-BBF1-FE8E7480EBDF}" srcOrd="0" destOrd="0" parTransId="{6A6B22FF-C327-472B-90B5-9F5FC64B0C98}" sibTransId="{AEE67130-E96F-4C8F-8A94-E077723513D2}"/>
+    <dgm:cxn modelId="{C645250B-999A-4C4B-B0D9-55ADA0CE32A4}" srcId="{D6EE5DE8-77E8-4922-A9C6-F365BBE83A79}" destId="{5A0F2CBC-D6CD-4367-8680-42DC6E42144E}" srcOrd="0" destOrd="0" parTransId="{2DDB378C-5C3B-4863-911A-3B31766CAA26}" sibTransId="{DBC07F86-E648-42B6-92D9-074FCD1F5866}"/>
     <dgm:cxn modelId="{AE0D4A5E-017A-4636-8B86-9F08FCDA9C67}" srcId="{2D36E825-4ACE-45FF-9A82-A07828909465}" destId="{2CE68B19-4D7E-4DE2-8DC6-889BE6ABFD76}" srcOrd="1" destOrd="0" parTransId="{9F41A284-99E6-4545-BAF2-D2D9EA5E21B0}" sibTransId="{11F39526-C1AA-446A-809B-D9D4132A4E51}"/>
-    <dgm:cxn modelId="{16B41F11-0943-4602-ABD2-F3D16EECCA72}" type="presOf" srcId="{D6EE5DE8-77E8-4922-A9C6-F365BBE83A79}" destId="{376597F5-777C-4886-9496-C2590412E54E}" srcOrd="0" destOrd="0" presId="urn:microsoft.com/office/officeart/2005/8/layout/vList2"/>
-    <dgm:cxn modelId="{8D8C4E95-60C9-480E-9C5F-EE033220E80F}" srcId="{E07D3DF8-B531-453C-B599-898D9D03A724}" destId="{D6EE5DE8-77E8-4922-A9C6-F365BBE83A79}" srcOrd="1" destOrd="0" parTransId="{8DA20819-D089-451F-B155-BEB2F31ACDE1}" sibTransId="{B04399C4-AD34-48A2-83F1-5DE748533820}"/>
-    <dgm:cxn modelId="{F76D688E-0948-47EA-A549-7D65A1582F49}" type="presOf" srcId="{A6C8BD6C-B3B2-4605-8970-343DCDE52EF2}" destId="{5AF62516-935A-4716-BC3C-96D1A9708875}" srcOrd="0" destOrd="0" presId="urn:microsoft.com/office/officeart/2005/8/layout/vList2"/>
-    <dgm:cxn modelId="{2C2228F0-1DA1-4549-8ABC-794586086176}" srcId="{E07D3DF8-B531-453C-B599-898D9D03A724}" destId="{53EFCA86-4B4F-4BDE-9322-06215FFCFCBF}" srcOrd="2" destOrd="0" parTransId="{6F8E2E0C-0D28-4F6E-A0F7-62F820350508}" sibTransId="{06D6753B-B082-4C36-B61B-1650AF337FFC}"/>
-    <dgm:cxn modelId="{9D36F30C-4180-4DB2-BAE7-240B33A3EF2C}" type="presOf" srcId="{53EFCA86-4B4F-4BDE-9322-06215FFCFCBF}" destId="{AF79282F-4587-49CB-B714-735A3E3EDCB9}" srcOrd="0" destOrd="0" presId="urn:microsoft.com/office/officeart/2005/8/layout/vList2"/>
-    <dgm:cxn modelId="{F66F8873-F080-4ED4-A831-58841009DADE}" type="presOf" srcId="{38F77422-9DC2-4461-90F4-808381EB6C65}" destId="{C7130AF6-5BCF-4F29-BA34-95CB85B72764}" srcOrd="0" destOrd="0" presId="urn:microsoft.com/office/officeart/2005/8/layout/vList2"/>
-    <dgm:cxn modelId="{8D5CBEEA-BF3A-4A31-9C1A-49FEF53E1159}" srcId="{2D36E825-4ACE-45FF-9A82-A07828909465}" destId="{38F77422-9DC2-4461-90F4-808381EB6C65}" srcOrd="0" destOrd="0" parTransId="{7E42520C-05FF-4542-92ED-FFCB90C662C0}" sibTransId="{5D5F5B14-0F69-49D6-8F3A-089808006D11}"/>
+    <dgm:cxn modelId="{A643151B-3E22-4B18-8884-B35007EC6172}" srcId="{E07D3DF8-B531-453C-B599-898D9D03A724}" destId="{A6C8BD6C-B3B2-4605-8970-343DCDE52EF2}" srcOrd="4" destOrd="0" parTransId="{B4F2E15E-1C80-4166-8AB2-D3523720A631}" sibTransId="{1DEDE7B7-B08A-462B-8B72-29F3AA43F8B3}"/>
+    <dgm:cxn modelId="{C087B476-0ECB-4B01-B85A-EE7A409D083F}" srcId="{A6C8BD6C-B3B2-4605-8970-343DCDE52EF2}" destId="{1691F446-2C4D-4079-9D16-C341031FF10A}" srcOrd="0" destOrd="0" parTransId="{DCA4AE69-92CF-4492-A9CA-C35A56BC76BB}" sibTransId="{05219947-3651-4DBB-9B49-DF587987A035}"/>
+    <dgm:cxn modelId="{649E1C9A-C4FD-4E90-9094-E80372FE3B54}" srcId="{E07D3DF8-B531-453C-B599-898D9D03A724}" destId="{2D36E825-4ACE-45FF-9A82-A07828909465}" srcOrd="0" destOrd="0" parTransId="{B4AFEE9B-1623-480E-AD65-DE7486D44E39}" sibTransId="{3CA66D8E-C79A-4301-B374-30BE44E4CC8F}"/>
     <dgm:cxn modelId="{19C50BBE-C8CB-4767-9C04-53426BED15D7}" type="presParOf" srcId="{AE563F13-1AA5-450D-9916-2F11638C1DA9}" destId="{401ECA87-A414-4C2E-815B-2E740FECD9DF}" srcOrd="0" destOrd="0" presId="urn:microsoft.com/office/officeart/2005/8/layout/vList2"/>
     <dgm:cxn modelId="{3A705D86-27F1-4186-B5F0-4FBBE0EBF71C}" type="presParOf" srcId="{AE563F13-1AA5-450D-9916-2F11638C1DA9}" destId="{C7130AF6-5BCF-4F29-BA34-95CB85B72764}" srcOrd="1" destOrd="0" presId="urn:microsoft.com/office/officeart/2005/8/layout/vList2"/>
     <dgm:cxn modelId="{9F4BAB58-4BD1-416C-B496-780C6D23F298}" type="presParOf" srcId="{AE563F13-1AA5-450D-9916-2F11638C1DA9}" destId="{376597F5-777C-4886-9496-C2590412E54E}" srcOrd="2" destOrd="0" presId="urn:microsoft.com/office/officeart/2005/8/layout/vList2"/>
@@ -3793,7 +3793,7 @@
   <dgm:whole/>
   <dgm:extLst>
     <a:ext uri="http://schemas.microsoft.com/office/drawing/2008/diagram">
-      <dsp:dataModelExt xmlns:dsp="http://schemas.microsoft.com/office/drawing/2008/diagram" relId="rId6" minVer="http://schemas.openxmlformats.org/drawingml/2006/diagram"/>
+      <dsp:dataModelExt xmlns:dsp="http://schemas.microsoft.com/office/drawing/2008/diagram" xmlns="" relId="rId6" minVer="http://schemas.openxmlformats.org/drawingml/2006/diagram"/>
     </a:ext>
   </dgm:extLst>
 </dgm:dataModel>
@@ -4145,18 +4145,18 @@
   </dgm:ptLst>
   <dgm:cxnLst>
     <dgm:cxn modelId="{A643151B-3E22-4B18-8884-B35007EC6172}" srcId="{E07D3DF8-B531-453C-B599-898D9D03A724}" destId="{A6C8BD6C-B3B2-4605-8970-343DCDE52EF2}" srcOrd="2" destOrd="0" parTransId="{B4F2E15E-1C80-4166-8AB2-D3523720A631}" sibTransId="{1DEDE7B7-B08A-462B-8B72-29F3AA43F8B3}"/>
+    <dgm:cxn modelId="{6CB5BE82-1794-466D-BCBE-E4216D2C3F5D}" type="presOf" srcId="{A6C8BD6C-B3B2-4605-8970-343DCDE52EF2}" destId="{5AF62516-935A-4716-BC3C-96D1A9708875}" srcOrd="0" destOrd="0" presId="urn:microsoft.com/office/officeart/2005/8/layout/vList2"/>
+    <dgm:cxn modelId="{331FC39C-4E6F-4B27-B6DC-F377B797448E}" type="presOf" srcId="{2D36E825-4ACE-45FF-9A82-A07828909465}" destId="{401ECA87-A414-4C2E-815B-2E740FECD9DF}" srcOrd="0" destOrd="0" presId="urn:microsoft.com/office/officeart/2005/8/layout/vList2"/>
+    <dgm:cxn modelId="{6C00EABA-6F4F-4A66-86A2-B21FF967D541}" srcId="{E07D3DF8-B531-453C-B599-898D9D03A724}" destId="{CB61399F-1A2D-42E5-8BED-9711DCC11731}" srcOrd="1" destOrd="0" parTransId="{7AE97EF6-8A82-49B0-B4CC-14B044F0451A}" sibTransId="{2AF9AD82-5FDD-4C7C-B9BF-B03397D23B2C}"/>
+    <dgm:cxn modelId="{8D5CBEEA-BF3A-4A31-9C1A-49FEF53E1159}" srcId="{2D36E825-4ACE-45FF-9A82-A07828909465}" destId="{38F77422-9DC2-4461-90F4-808381EB6C65}" srcOrd="0" destOrd="0" parTransId="{7E42520C-05FF-4542-92ED-FFCB90C662C0}" sibTransId="{5D5F5B14-0F69-49D6-8F3A-089808006D11}"/>
+    <dgm:cxn modelId="{649E1C9A-C4FD-4E90-9094-E80372FE3B54}" srcId="{E07D3DF8-B531-453C-B599-898D9D03A724}" destId="{2D36E825-4ACE-45FF-9A82-A07828909465}" srcOrd="0" destOrd="0" parTransId="{B4AFEE9B-1623-480E-AD65-DE7486D44E39}" sibTransId="{3CA66D8E-C79A-4301-B374-30BE44E4CC8F}"/>
+    <dgm:cxn modelId="{548A0F74-DBD6-46F8-9FF7-68DA0AB3A980}" srcId="{CB61399F-1A2D-42E5-8BED-9711DCC11731}" destId="{21F8D68D-EA5A-4A42-BBF1-FE8E7480EBDF}" srcOrd="0" destOrd="0" parTransId="{6A6B22FF-C327-472B-90B5-9F5FC64B0C98}" sibTransId="{AEE67130-E96F-4C8F-8A94-E077723513D2}"/>
+    <dgm:cxn modelId="{D522EEA6-CED0-4726-8BDB-F1BEBE02DDCA}" type="presOf" srcId="{1691F446-2C4D-4079-9D16-C341031FF10A}" destId="{5EE99CAA-C70B-49D9-9943-E42F93D8C815}" srcOrd="0" destOrd="0" presId="urn:microsoft.com/office/officeart/2005/8/layout/vList2"/>
+    <dgm:cxn modelId="{332EF70E-5376-4614-A641-A415CA4B53BA}" type="presOf" srcId="{38F77422-9DC2-4461-90F4-808381EB6C65}" destId="{C7130AF6-5BCF-4F29-BA34-95CB85B72764}" srcOrd="0" destOrd="0" presId="urn:microsoft.com/office/officeart/2005/8/layout/vList2"/>
+    <dgm:cxn modelId="{45E20C9B-880D-4501-872F-9824EB3C2815}" type="presOf" srcId="{CB61399F-1A2D-42E5-8BED-9711DCC11731}" destId="{78DA6840-523F-44DE-8870-8809A7BF9028}" srcOrd="0" destOrd="0" presId="urn:microsoft.com/office/officeart/2005/8/layout/vList2"/>
+    <dgm:cxn modelId="{38242A67-662C-460B-BF65-C8E708CA8493}" type="presOf" srcId="{E07D3DF8-B531-453C-B599-898D9D03A724}" destId="{AE563F13-1AA5-450D-9916-2F11638C1DA9}" srcOrd="0" destOrd="0" presId="urn:microsoft.com/office/officeart/2005/8/layout/vList2"/>
+    <dgm:cxn modelId="{C087B476-0ECB-4B01-B85A-EE7A409D083F}" srcId="{A6C8BD6C-B3B2-4605-8970-343DCDE52EF2}" destId="{1691F446-2C4D-4079-9D16-C341031FF10A}" srcOrd="0" destOrd="0" parTransId="{DCA4AE69-92CF-4492-A9CA-C35A56BC76BB}" sibTransId="{05219947-3651-4DBB-9B49-DF587987A035}"/>
     <dgm:cxn modelId="{61DF26B5-61EC-4CC0-916D-36C222EC2E9A}" type="presOf" srcId="{21F8D68D-EA5A-4A42-BBF1-FE8E7480EBDF}" destId="{9C495DF5-169D-4A31-B3DB-88DFF8C7AB22}" srcOrd="0" destOrd="0" presId="urn:microsoft.com/office/officeart/2005/8/layout/vList2"/>
-    <dgm:cxn modelId="{548A0F74-DBD6-46F8-9FF7-68DA0AB3A980}" srcId="{CB61399F-1A2D-42E5-8BED-9711DCC11731}" destId="{21F8D68D-EA5A-4A42-BBF1-FE8E7480EBDF}" srcOrd="0" destOrd="0" parTransId="{6A6B22FF-C327-472B-90B5-9F5FC64B0C98}" sibTransId="{AEE67130-E96F-4C8F-8A94-E077723513D2}"/>
-    <dgm:cxn modelId="{C087B476-0ECB-4B01-B85A-EE7A409D083F}" srcId="{A6C8BD6C-B3B2-4605-8970-343DCDE52EF2}" destId="{1691F446-2C4D-4079-9D16-C341031FF10A}" srcOrd="0" destOrd="0" parTransId="{DCA4AE69-92CF-4492-A9CA-C35A56BC76BB}" sibTransId="{05219947-3651-4DBB-9B49-DF587987A035}"/>
-    <dgm:cxn modelId="{45E20C9B-880D-4501-872F-9824EB3C2815}" type="presOf" srcId="{CB61399F-1A2D-42E5-8BED-9711DCC11731}" destId="{78DA6840-523F-44DE-8870-8809A7BF9028}" srcOrd="0" destOrd="0" presId="urn:microsoft.com/office/officeart/2005/8/layout/vList2"/>
-    <dgm:cxn modelId="{D522EEA6-CED0-4726-8BDB-F1BEBE02DDCA}" type="presOf" srcId="{1691F446-2C4D-4079-9D16-C341031FF10A}" destId="{5EE99CAA-C70B-49D9-9943-E42F93D8C815}" srcOrd="0" destOrd="0" presId="urn:microsoft.com/office/officeart/2005/8/layout/vList2"/>
-    <dgm:cxn modelId="{6C00EABA-6F4F-4A66-86A2-B21FF967D541}" srcId="{E07D3DF8-B531-453C-B599-898D9D03A724}" destId="{CB61399F-1A2D-42E5-8BED-9711DCC11731}" srcOrd="1" destOrd="0" parTransId="{7AE97EF6-8A82-49B0-B4CC-14B044F0451A}" sibTransId="{2AF9AD82-5FDD-4C7C-B9BF-B03397D23B2C}"/>
-    <dgm:cxn modelId="{649E1C9A-C4FD-4E90-9094-E80372FE3B54}" srcId="{E07D3DF8-B531-453C-B599-898D9D03A724}" destId="{2D36E825-4ACE-45FF-9A82-A07828909465}" srcOrd="0" destOrd="0" parTransId="{B4AFEE9B-1623-480E-AD65-DE7486D44E39}" sibTransId="{3CA66D8E-C79A-4301-B374-30BE44E4CC8F}"/>
-    <dgm:cxn modelId="{38242A67-662C-460B-BF65-C8E708CA8493}" type="presOf" srcId="{E07D3DF8-B531-453C-B599-898D9D03A724}" destId="{AE563F13-1AA5-450D-9916-2F11638C1DA9}" srcOrd="0" destOrd="0" presId="urn:microsoft.com/office/officeart/2005/8/layout/vList2"/>
-    <dgm:cxn modelId="{332EF70E-5376-4614-A641-A415CA4B53BA}" type="presOf" srcId="{38F77422-9DC2-4461-90F4-808381EB6C65}" destId="{C7130AF6-5BCF-4F29-BA34-95CB85B72764}" srcOrd="0" destOrd="0" presId="urn:microsoft.com/office/officeart/2005/8/layout/vList2"/>
-    <dgm:cxn modelId="{6CB5BE82-1794-466D-BCBE-E4216D2C3F5D}" type="presOf" srcId="{A6C8BD6C-B3B2-4605-8970-343DCDE52EF2}" destId="{5AF62516-935A-4716-BC3C-96D1A9708875}" srcOrd="0" destOrd="0" presId="urn:microsoft.com/office/officeart/2005/8/layout/vList2"/>
-    <dgm:cxn modelId="{8D5CBEEA-BF3A-4A31-9C1A-49FEF53E1159}" srcId="{2D36E825-4ACE-45FF-9A82-A07828909465}" destId="{38F77422-9DC2-4461-90F4-808381EB6C65}" srcOrd="0" destOrd="0" parTransId="{7E42520C-05FF-4542-92ED-FFCB90C662C0}" sibTransId="{5D5F5B14-0F69-49D6-8F3A-089808006D11}"/>
-    <dgm:cxn modelId="{331FC39C-4E6F-4B27-B6DC-F377B797448E}" type="presOf" srcId="{2D36E825-4ACE-45FF-9A82-A07828909465}" destId="{401ECA87-A414-4C2E-815B-2E740FECD9DF}" srcOrd="0" destOrd="0" presId="urn:microsoft.com/office/officeart/2005/8/layout/vList2"/>
     <dgm:cxn modelId="{0A9504AD-702D-4B23-9D1A-A693DB10C4CA}" type="presParOf" srcId="{AE563F13-1AA5-450D-9916-2F11638C1DA9}" destId="{401ECA87-A414-4C2E-815B-2E740FECD9DF}" srcOrd="0" destOrd="0" presId="urn:microsoft.com/office/officeart/2005/8/layout/vList2"/>
     <dgm:cxn modelId="{CF144102-22ED-49B9-9D0D-410272622A8C}" type="presParOf" srcId="{AE563F13-1AA5-450D-9916-2F11638C1DA9}" destId="{C7130AF6-5BCF-4F29-BA34-95CB85B72764}" srcOrd="1" destOrd="0" presId="urn:microsoft.com/office/officeart/2005/8/layout/vList2"/>
     <dgm:cxn modelId="{140F9814-D7BE-46E8-9B08-4CB539BF985A}" type="presParOf" srcId="{AE563F13-1AA5-450D-9916-2F11638C1DA9}" destId="{78DA6840-523F-44DE-8870-8809A7BF9028}" srcOrd="2" destOrd="0" presId="urn:microsoft.com/office/officeart/2005/8/layout/vList2"/>
@@ -4168,7 +4168,7 @@
   <dgm:whole/>
   <dgm:extLst>
     <a:ext uri="http://schemas.microsoft.com/office/drawing/2008/diagram">
-      <dsp:dataModelExt xmlns:dsp="http://schemas.microsoft.com/office/drawing/2008/diagram" relId="rId6" minVer="http://schemas.openxmlformats.org/drawingml/2006/diagram"/>
+      <dsp:dataModelExt xmlns:dsp="http://schemas.microsoft.com/office/drawing/2008/diagram" xmlns="" relId="rId6" minVer="http://schemas.openxmlformats.org/drawingml/2006/diagram"/>
     </a:ext>
   </dgm:extLst>
 </dgm:dataModel>
@@ -4725,27 +4725,27 @@
     </dgm:pt>
   </dgm:ptLst>
   <dgm:cxnLst>
-    <dgm:cxn modelId="{A643151B-3E22-4B18-8884-B35007EC6172}" srcId="{E07D3DF8-B531-453C-B599-898D9D03A724}" destId="{A6C8BD6C-B3B2-4605-8970-343DCDE52EF2}" srcOrd="2" destOrd="0" parTransId="{B4F2E15E-1C80-4166-8AB2-D3523720A631}" sibTransId="{1DEDE7B7-B08A-462B-8B72-29F3AA43F8B3}"/>
-    <dgm:cxn modelId="{06E85CA7-A81C-4492-8E42-89F587E35226}" type="presOf" srcId="{38F77422-9DC2-4461-90F4-808381EB6C65}" destId="{C7130AF6-5BCF-4F29-BA34-95CB85B72764}" srcOrd="0" destOrd="0" presId="urn:microsoft.com/office/officeart/2005/8/layout/vList2"/>
-    <dgm:cxn modelId="{5907D802-1C99-48F0-B720-E1CAFE993656}" type="presOf" srcId="{632313F7-92C6-4DF6-B3C3-79F0F93A02D6}" destId="{1A51C3D3-58C0-4069-AB0A-A95B0B4B888D}" srcOrd="0" destOrd="0" presId="urn:microsoft.com/office/officeart/2005/8/layout/vList2"/>
-    <dgm:cxn modelId="{5274B04B-EBA3-4A06-A97D-DC94381F8CD3}" srcId="{632313F7-92C6-4DF6-B3C3-79F0F93A02D6}" destId="{0D9C04A8-F6C4-4A94-AAC0-4CDF1E2E33FD}" srcOrd="0" destOrd="0" parTransId="{F63F2778-E27B-4AE3-84B3-300A6BD57EE8}" sibTransId="{30B342D8-FC19-44EE-AC4E-C090EECA01D0}"/>
+    <dgm:cxn modelId="{80FC98DC-09F5-4861-9121-46E4D391D09F}" type="presOf" srcId="{A6C8BD6C-B3B2-4605-8970-343DCDE52EF2}" destId="{5AF62516-935A-4716-BC3C-96D1A9708875}" srcOrd="0" destOrd="0" presId="urn:microsoft.com/office/officeart/2005/8/layout/vList2"/>
     <dgm:cxn modelId="{700FBA62-08AC-4D50-A12E-F81588B592CD}" type="presOf" srcId="{21F8D68D-EA5A-4A42-BBF1-FE8E7480EBDF}" destId="{9C495DF5-169D-4A31-B3DB-88DFF8C7AB22}" srcOrd="0" destOrd="0" presId="urn:microsoft.com/office/officeart/2005/8/layout/vList2"/>
-    <dgm:cxn modelId="{548A0F74-DBD6-46F8-9FF7-68DA0AB3A980}" srcId="{CB61399F-1A2D-42E5-8BED-9711DCC11731}" destId="{21F8D68D-EA5A-4A42-BBF1-FE8E7480EBDF}" srcOrd="0" destOrd="0" parTransId="{6A6B22FF-C327-472B-90B5-9F5FC64B0C98}" sibTransId="{AEE67130-E96F-4C8F-8A94-E077723513D2}"/>
-    <dgm:cxn modelId="{C087B476-0ECB-4B01-B85A-EE7A409D083F}" srcId="{A6C8BD6C-B3B2-4605-8970-343DCDE52EF2}" destId="{1691F446-2C4D-4079-9D16-C341031FF10A}" srcOrd="0" destOrd="0" parTransId="{DCA4AE69-92CF-4492-A9CA-C35A56BC76BB}" sibTransId="{05219947-3651-4DBB-9B49-DF587987A035}"/>
-    <dgm:cxn modelId="{3109AF4A-1468-4B5C-BE53-69CBA1E54CEA}" srcId="{E07D3DF8-B531-453C-B599-898D9D03A724}" destId="{E9705339-6862-4592-949E-99BA249F19D1}" srcOrd="3" destOrd="0" parTransId="{06AAE812-5F9C-4F28-A6DB-C0E5E9A112D8}" sibTransId="{E3E15143-41D2-41E3-8117-DAD4A96EA8BC}"/>
-    <dgm:cxn modelId="{6C00EABA-6F4F-4A66-86A2-B21FF967D541}" srcId="{E07D3DF8-B531-453C-B599-898D9D03A724}" destId="{CB61399F-1A2D-42E5-8BED-9711DCC11731}" srcOrd="1" destOrd="0" parTransId="{7AE97EF6-8A82-49B0-B4CC-14B044F0451A}" sibTransId="{2AF9AD82-5FDD-4C7C-B9BF-B03397D23B2C}"/>
-    <dgm:cxn modelId="{649E1C9A-C4FD-4E90-9094-E80372FE3B54}" srcId="{E07D3DF8-B531-453C-B599-898D9D03A724}" destId="{2D36E825-4ACE-45FF-9A82-A07828909465}" srcOrd="0" destOrd="0" parTransId="{B4AFEE9B-1623-480E-AD65-DE7486D44E39}" sibTransId="{3CA66D8E-C79A-4301-B374-30BE44E4CC8F}"/>
-    <dgm:cxn modelId="{D30D59F3-71D6-4920-B79A-985FF9D767CC}" srcId="{E9705339-6862-4592-949E-99BA249F19D1}" destId="{83006853-3F34-4B56-B449-FA6A1E70C877}" srcOrd="0" destOrd="0" parTransId="{B0ED33F8-6293-440A-AC5A-286812C9ED6B}" sibTransId="{FCC202FC-334D-4ED6-B57B-5C99CA915F34}"/>
     <dgm:cxn modelId="{12B07D0C-D790-44F7-94D8-ED4470F1980B}" type="presOf" srcId="{E9705339-6862-4592-949E-99BA249F19D1}" destId="{8E384E35-9385-455F-B372-4AA6FE4C9346}" srcOrd="0" destOrd="0" presId="urn:microsoft.com/office/officeart/2005/8/layout/vList2"/>
-    <dgm:cxn modelId="{8B9AD8B4-B349-4B8D-BAB4-409CEC2F9059}" type="presOf" srcId="{E07D3DF8-B531-453C-B599-898D9D03A724}" destId="{AE563F13-1AA5-450D-9916-2F11638C1DA9}" srcOrd="0" destOrd="0" presId="urn:microsoft.com/office/officeart/2005/8/layout/vList2"/>
+    <dgm:cxn modelId="{957A5732-6643-4B4A-93D8-DB61D5FFC83E}" srcId="{E07D3DF8-B531-453C-B599-898D9D03A724}" destId="{632313F7-92C6-4DF6-B3C3-79F0F93A02D6}" srcOrd="4" destOrd="0" parTransId="{804005BE-B51D-4726-AC1E-68BB62682854}" sibTransId="{990CB716-E548-450E-9A90-4D8DB093C1ED}"/>
     <dgm:cxn modelId="{66F172EE-A2E4-46F7-85EE-7178ED2C26A8}" type="presOf" srcId="{2D36E825-4ACE-45FF-9A82-A07828909465}" destId="{401ECA87-A414-4C2E-815B-2E740FECD9DF}" srcOrd="0" destOrd="0" presId="urn:microsoft.com/office/officeart/2005/8/layout/vList2"/>
-    <dgm:cxn modelId="{80FC98DC-09F5-4861-9121-46E4D391D09F}" type="presOf" srcId="{A6C8BD6C-B3B2-4605-8970-343DCDE52EF2}" destId="{5AF62516-935A-4716-BC3C-96D1A9708875}" srcOrd="0" destOrd="0" presId="urn:microsoft.com/office/officeart/2005/8/layout/vList2"/>
     <dgm:cxn modelId="{EA3B3533-2C9C-48E2-9285-90EC72A69282}" type="presOf" srcId="{83006853-3F34-4B56-B449-FA6A1E70C877}" destId="{7E58D7A6-E1A3-4F64-B2F9-76B3525CD76E}" srcOrd="0" destOrd="0" presId="urn:microsoft.com/office/officeart/2005/8/layout/vList2"/>
-    <dgm:cxn modelId="{957A5732-6643-4B4A-93D8-DB61D5FFC83E}" srcId="{E07D3DF8-B531-453C-B599-898D9D03A724}" destId="{632313F7-92C6-4DF6-B3C3-79F0F93A02D6}" srcOrd="4" destOrd="0" parTransId="{804005BE-B51D-4726-AC1E-68BB62682854}" sibTransId="{990CB716-E548-450E-9A90-4D8DB093C1ED}"/>
     <dgm:cxn modelId="{FC5954B9-4B52-4440-B922-05DA414BC514}" type="presOf" srcId="{1691F446-2C4D-4079-9D16-C341031FF10A}" destId="{5EE99CAA-C70B-49D9-9943-E42F93D8C815}" srcOrd="0" destOrd="0" presId="urn:microsoft.com/office/officeart/2005/8/layout/vList2"/>
-    <dgm:cxn modelId="{4562EE19-D178-43C7-BCD7-5DEF9C1E6452}" type="presOf" srcId="{0D9C04A8-F6C4-4A94-AAC0-4CDF1E2E33FD}" destId="{C4D7444D-E9C0-4694-BF04-B566F459108B}" srcOrd="0" destOrd="0" presId="urn:microsoft.com/office/officeart/2005/8/layout/vList2"/>
     <dgm:cxn modelId="{5E0F4203-A41F-4185-972F-E7C47C185231}" type="presOf" srcId="{CB61399F-1A2D-42E5-8BED-9711DCC11731}" destId="{78DA6840-523F-44DE-8870-8809A7BF9028}" srcOrd="0" destOrd="0" presId="urn:microsoft.com/office/officeart/2005/8/layout/vList2"/>
     <dgm:cxn modelId="{8D5CBEEA-BF3A-4A31-9C1A-49FEF53E1159}" srcId="{2D36E825-4ACE-45FF-9A82-A07828909465}" destId="{38F77422-9DC2-4461-90F4-808381EB6C65}" srcOrd="0" destOrd="0" parTransId="{7E42520C-05FF-4542-92ED-FFCB90C662C0}" sibTransId="{5D5F5B14-0F69-49D6-8F3A-089808006D11}"/>
+    <dgm:cxn modelId="{5907D802-1C99-48F0-B720-E1CAFE993656}" type="presOf" srcId="{632313F7-92C6-4DF6-B3C3-79F0F93A02D6}" destId="{1A51C3D3-58C0-4069-AB0A-A95B0B4B888D}" srcOrd="0" destOrd="0" presId="urn:microsoft.com/office/officeart/2005/8/layout/vList2"/>
+    <dgm:cxn modelId="{3109AF4A-1468-4B5C-BE53-69CBA1E54CEA}" srcId="{E07D3DF8-B531-453C-B599-898D9D03A724}" destId="{E9705339-6862-4592-949E-99BA249F19D1}" srcOrd="3" destOrd="0" parTransId="{06AAE812-5F9C-4F28-A6DB-C0E5E9A112D8}" sibTransId="{E3E15143-41D2-41E3-8117-DAD4A96EA8BC}"/>
+    <dgm:cxn modelId="{4562EE19-D178-43C7-BCD7-5DEF9C1E6452}" type="presOf" srcId="{0D9C04A8-F6C4-4A94-AAC0-4CDF1E2E33FD}" destId="{C4D7444D-E9C0-4694-BF04-B566F459108B}" srcOrd="0" destOrd="0" presId="urn:microsoft.com/office/officeart/2005/8/layout/vList2"/>
+    <dgm:cxn modelId="{5274B04B-EBA3-4A06-A97D-DC94381F8CD3}" srcId="{632313F7-92C6-4DF6-B3C3-79F0F93A02D6}" destId="{0D9C04A8-F6C4-4A94-AAC0-4CDF1E2E33FD}" srcOrd="0" destOrd="0" parTransId="{F63F2778-E27B-4AE3-84B3-300A6BD57EE8}" sibTransId="{30B342D8-FC19-44EE-AC4E-C090EECA01D0}"/>
+    <dgm:cxn modelId="{D30D59F3-71D6-4920-B79A-985FF9D767CC}" srcId="{E9705339-6862-4592-949E-99BA249F19D1}" destId="{83006853-3F34-4B56-B449-FA6A1E70C877}" srcOrd="0" destOrd="0" parTransId="{B0ED33F8-6293-440A-AC5A-286812C9ED6B}" sibTransId="{FCC202FC-334D-4ED6-B57B-5C99CA915F34}"/>
+    <dgm:cxn modelId="{06E85CA7-A81C-4492-8E42-89F587E35226}" type="presOf" srcId="{38F77422-9DC2-4461-90F4-808381EB6C65}" destId="{C7130AF6-5BCF-4F29-BA34-95CB85B72764}" srcOrd="0" destOrd="0" presId="urn:microsoft.com/office/officeart/2005/8/layout/vList2"/>
+    <dgm:cxn modelId="{6C00EABA-6F4F-4A66-86A2-B21FF967D541}" srcId="{E07D3DF8-B531-453C-B599-898D9D03A724}" destId="{CB61399F-1A2D-42E5-8BED-9711DCC11731}" srcOrd="1" destOrd="0" parTransId="{7AE97EF6-8A82-49B0-B4CC-14B044F0451A}" sibTransId="{2AF9AD82-5FDD-4C7C-B9BF-B03397D23B2C}"/>
+    <dgm:cxn modelId="{548A0F74-DBD6-46F8-9FF7-68DA0AB3A980}" srcId="{CB61399F-1A2D-42E5-8BED-9711DCC11731}" destId="{21F8D68D-EA5A-4A42-BBF1-FE8E7480EBDF}" srcOrd="0" destOrd="0" parTransId="{6A6B22FF-C327-472B-90B5-9F5FC64B0C98}" sibTransId="{AEE67130-E96F-4C8F-8A94-E077723513D2}"/>
+    <dgm:cxn modelId="{8B9AD8B4-B349-4B8D-BAB4-409CEC2F9059}" type="presOf" srcId="{E07D3DF8-B531-453C-B599-898D9D03A724}" destId="{AE563F13-1AA5-450D-9916-2F11638C1DA9}" srcOrd="0" destOrd="0" presId="urn:microsoft.com/office/officeart/2005/8/layout/vList2"/>
+    <dgm:cxn modelId="{A643151B-3E22-4B18-8884-B35007EC6172}" srcId="{E07D3DF8-B531-453C-B599-898D9D03A724}" destId="{A6C8BD6C-B3B2-4605-8970-343DCDE52EF2}" srcOrd="2" destOrd="0" parTransId="{B4F2E15E-1C80-4166-8AB2-D3523720A631}" sibTransId="{1DEDE7B7-B08A-462B-8B72-29F3AA43F8B3}"/>
+    <dgm:cxn modelId="{C087B476-0ECB-4B01-B85A-EE7A409D083F}" srcId="{A6C8BD6C-B3B2-4605-8970-343DCDE52EF2}" destId="{1691F446-2C4D-4079-9D16-C341031FF10A}" srcOrd="0" destOrd="0" parTransId="{DCA4AE69-92CF-4492-A9CA-C35A56BC76BB}" sibTransId="{05219947-3651-4DBB-9B49-DF587987A035}"/>
+    <dgm:cxn modelId="{649E1C9A-C4FD-4E90-9094-E80372FE3B54}" srcId="{E07D3DF8-B531-453C-B599-898D9D03A724}" destId="{2D36E825-4ACE-45FF-9A82-A07828909465}" srcOrd="0" destOrd="0" parTransId="{B4AFEE9B-1623-480E-AD65-DE7486D44E39}" sibTransId="{3CA66D8E-C79A-4301-B374-30BE44E4CC8F}"/>
     <dgm:cxn modelId="{9A7975D6-1D4E-4856-B3C4-932BFBD3CDDB}" type="presParOf" srcId="{AE563F13-1AA5-450D-9916-2F11638C1DA9}" destId="{401ECA87-A414-4C2E-815B-2E740FECD9DF}" srcOrd="0" destOrd="0" presId="urn:microsoft.com/office/officeart/2005/8/layout/vList2"/>
     <dgm:cxn modelId="{3AF63245-2634-4686-883D-40B5F87F6805}" type="presParOf" srcId="{AE563F13-1AA5-450D-9916-2F11638C1DA9}" destId="{C7130AF6-5BCF-4F29-BA34-95CB85B72764}" srcOrd="1" destOrd="0" presId="urn:microsoft.com/office/officeart/2005/8/layout/vList2"/>
     <dgm:cxn modelId="{8DA64A14-6FC0-478B-BD2D-7F1A95AA20EC}" type="presParOf" srcId="{AE563F13-1AA5-450D-9916-2F11638C1DA9}" destId="{78DA6840-523F-44DE-8870-8809A7BF9028}" srcOrd="2" destOrd="0" presId="urn:microsoft.com/office/officeart/2005/8/layout/vList2"/>
@@ -4761,7 +4761,7 @@
   <dgm:whole/>
   <dgm:extLst>
     <a:ext uri="http://schemas.microsoft.com/office/drawing/2008/diagram">
-      <dsp:dataModelExt xmlns:dsp="http://schemas.microsoft.com/office/drawing/2008/diagram" relId="rId6" minVer="http://schemas.openxmlformats.org/drawingml/2006/diagram"/>
+      <dsp:dataModelExt xmlns:dsp="http://schemas.microsoft.com/office/drawing/2008/diagram" xmlns="" relId="rId6" minVer="http://schemas.openxmlformats.org/drawingml/2006/diagram"/>
     </a:ext>
   </dgm:extLst>
 </dgm:dataModel>
@@ -5241,24 +5241,24 @@
   </dgm:ptLst>
   <dgm:cxnLst>
     <dgm:cxn modelId="{C0211991-8DA9-412A-8B5A-52F2BACA6083}" type="presOf" srcId="{CB61399F-1A2D-42E5-8BED-9711DCC11731}" destId="{78DA6840-523F-44DE-8870-8809A7BF9028}" srcOrd="0" destOrd="0" presId="urn:microsoft.com/office/officeart/2005/8/layout/vList2"/>
-    <dgm:cxn modelId="{A643151B-3E22-4B18-8884-B35007EC6172}" srcId="{E07D3DF8-B531-453C-B599-898D9D03A724}" destId="{A6C8BD6C-B3B2-4605-8970-343DCDE52EF2}" srcOrd="2" destOrd="0" parTransId="{B4F2E15E-1C80-4166-8AB2-D3523720A631}" sibTransId="{1DEDE7B7-B08A-462B-8B72-29F3AA43F8B3}"/>
-    <dgm:cxn modelId="{ECC6EC58-6EBD-4D0F-8DA9-8F738B9D639E}" type="presOf" srcId="{A5C752E3-5F20-413C-96F0-081937642392}" destId="{C7130AF6-5BCF-4F29-BA34-95CB85B72764}" srcOrd="0" destOrd="2" presId="urn:microsoft.com/office/officeart/2005/8/layout/vList2"/>
-    <dgm:cxn modelId="{A68CBD88-771A-4A12-8B8B-9F0DC6B301A4}" type="presOf" srcId="{D07773C2-5821-447F-9880-D5FE54F059AC}" destId="{C7130AF6-5BCF-4F29-BA34-95CB85B72764}" srcOrd="0" destOrd="3" presId="urn:microsoft.com/office/officeart/2005/8/layout/vList2"/>
-    <dgm:cxn modelId="{649E1C9A-C4FD-4E90-9094-E80372FE3B54}" srcId="{E07D3DF8-B531-453C-B599-898D9D03A724}" destId="{2D36E825-4ACE-45FF-9A82-A07828909465}" srcOrd="0" destOrd="0" parTransId="{B4AFEE9B-1623-480E-AD65-DE7486D44E39}" sibTransId="{3CA66D8E-C79A-4301-B374-30BE44E4CC8F}"/>
-    <dgm:cxn modelId="{03E26BDF-5D4F-478D-B8F8-F2E5FCA7B9F8}" srcId="{2D36E825-4ACE-45FF-9A82-A07828909465}" destId="{A5C752E3-5F20-413C-96F0-081937642392}" srcOrd="2" destOrd="0" parTransId="{11EC339E-6CE9-4164-A730-957FA9F5DFA7}" sibTransId="{9382DBC6-5FC6-4FD1-8597-6E3833FBCCFD}"/>
     <dgm:cxn modelId="{957A5732-6643-4B4A-93D8-DB61D5FFC83E}" srcId="{E07D3DF8-B531-453C-B599-898D9D03A724}" destId="{632313F7-92C6-4DF6-B3C3-79F0F93A02D6}" srcOrd="4" destOrd="0" parTransId="{804005BE-B51D-4726-AC1E-68BB62682854}" sibTransId="{990CB716-E548-450E-9A90-4D8DB093C1ED}"/>
-    <dgm:cxn modelId="{6C00EABA-6F4F-4A66-86A2-B21FF967D541}" srcId="{E07D3DF8-B531-453C-B599-898D9D03A724}" destId="{CB61399F-1A2D-42E5-8BED-9711DCC11731}" srcOrd="1" destOrd="0" parTransId="{7AE97EF6-8A82-49B0-B4CC-14B044F0451A}" sibTransId="{2AF9AD82-5FDD-4C7C-B9BF-B03397D23B2C}"/>
     <dgm:cxn modelId="{27AE2B06-EC92-4DA5-922B-9E530FB48021}" type="presOf" srcId="{E07D3DF8-B531-453C-B599-898D9D03A724}" destId="{AE563F13-1AA5-450D-9916-2F11638C1DA9}" srcOrd="0" destOrd="0" presId="urn:microsoft.com/office/officeart/2005/8/layout/vList2"/>
-    <dgm:cxn modelId="{8D5CBEEA-BF3A-4A31-9C1A-49FEF53E1159}" srcId="{2D36E825-4ACE-45FF-9A82-A07828909465}" destId="{38F77422-9DC2-4461-90F4-808381EB6C65}" srcOrd="0" destOrd="0" parTransId="{7E42520C-05FF-4542-92ED-FFCB90C662C0}" sibTransId="{5D5F5B14-0F69-49D6-8F3A-089808006D11}"/>
-    <dgm:cxn modelId="{468E1276-49A4-427C-9635-5464C82F8338}" type="presOf" srcId="{E9705339-6862-4592-949E-99BA249F19D1}" destId="{8E384E35-9385-455F-B372-4AA6FE4C9346}" srcOrd="0" destOrd="0" presId="urn:microsoft.com/office/officeart/2005/8/layout/vList2"/>
-    <dgm:cxn modelId="{FE6F531F-AB5B-44A3-A0BD-29F8A7F52D79}" type="presOf" srcId="{A6C8BD6C-B3B2-4605-8970-343DCDE52EF2}" destId="{5AF62516-935A-4716-BC3C-96D1A9708875}" srcOrd="0" destOrd="0" presId="urn:microsoft.com/office/officeart/2005/8/layout/vList2"/>
-    <dgm:cxn modelId="{3109AF4A-1468-4B5C-BE53-69CBA1E54CEA}" srcId="{E07D3DF8-B531-453C-B599-898D9D03A724}" destId="{E9705339-6862-4592-949E-99BA249F19D1}" srcOrd="3" destOrd="0" parTransId="{06AAE812-5F9C-4F28-A6DB-C0E5E9A112D8}" sibTransId="{E3E15143-41D2-41E3-8117-DAD4A96EA8BC}"/>
-    <dgm:cxn modelId="{DEAC3F62-24BD-4A1E-BB26-42028C0882A5}" type="presOf" srcId="{6E0EABB4-8FD4-4A31-BD32-71E547315439}" destId="{C7130AF6-5BCF-4F29-BA34-95CB85B72764}" srcOrd="0" destOrd="1" presId="urn:microsoft.com/office/officeart/2005/8/layout/vList2"/>
     <dgm:cxn modelId="{68C5A92B-71CF-4F6B-983F-ED9BDB130016}" type="presOf" srcId="{632313F7-92C6-4DF6-B3C3-79F0F93A02D6}" destId="{1A51C3D3-58C0-4069-AB0A-A95B0B4B888D}" srcOrd="0" destOrd="0" presId="urn:microsoft.com/office/officeart/2005/8/layout/vList2"/>
     <dgm:cxn modelId="{B1C8337E-EBFA-4ABD-9C53-BED174458251}" type="presOf" srcId="{2D36E825-4ACE-45FF-9A82-A07828909465}" destId="{401ECA87-A414-4C2E-815B-2E740FECD9DF}" srcOrd="0" destOrd="0" presId="urn:microsoft.com/office/officeart/2005/8/layout/vList2"/>
+    <dgm:cxn modelId="{CF1B1A12-0D10-4D25-9073-8F46478748FC}" type="presOf" srcId="{38F77422-9DC2-4461-90F4-808381EB6C65}" destId="{C7130AF6-5BCF-4F29-BA34-95CB85B72764}" srcOrd="0" destOrd="0" presId="urn:microsoft.com/office/officeart/2005/8/layout/vList2"/>
+    <dgm:cxn modelId="{8D5CBEEA-BF3A-4A31-9C1A-49FEF53E1159}" srcId="{2D36E825-4ACE-45FF-9A82-A07828909465}" destId="{38F77422-9DC2-4461-90F4-808381EB6C65}" srcOrd="0" destOrd="0" parTransId="{7E42520C-05FF-4542-92ED-FFCB90C662C0}" sibTransId="{5D5F5B14-0F69-49D6-8F3A-089808006D11}"/>
+    <dgm:cxn modelId="{3109AF4A-1468-4B5C-BE53-69CBA1E54CEA}" srcId="{E07D3DF8-B531-453C-B599-898D9D03A724}" destId="{E9705339-6862-4592-949E-99BA249F19D1}" srcOrd="3" destOrd="0" parTransId="{06AAE812-5F9C-4F28-A6DB-C0E5E9A112D8}" sibTransId="{E3E15143-41D2-41E3-8117-DAD4A96EA8BC}"/>
     <dgm:cxn modelId="{C908B49B-DBCB-4C55-8D32-48E6281ECE53}" srcId="{2D36E825-4ACE-45FF-9A82-A07828909465}" destId="{D07773C2-5821-447F-9880-D5FE54F059AC}" srcOrd="3" destOrd="0" parTransId="{604414DF-3A89-4A5E-A279-588AFA58EAA7}" sibTransId="{81AD834C-F68E-4FFE-9341-3944C4CC184F}"/>
+    <dgm:cxn modelId="{A68CBD88-771A-4A12-8B8B-9F0DC6B301A4}" type="presOf" srcId="{D07773C2-5821-447F-9880-D5FE54F059AC}" destId="{C7130AF6-5BCF-4F29-BA34-95CB85B72764}" srcOrd="0" destOrd="3" presId="urn:microsoft.com/office/officeart/2005/8/layout/vList2"/>
+    <dgm:cxn modelId="{ECC6EC58-6EBD-4D0F-8DA9-8F738B9D639E}" type="presOf" srcId="{A5C752E3-5F20-413C-96F0-081937642392}" destId="{C7130AF6-5BCF-4F29-BA34-95CB85B72764}" srcOrd="0" destOrd="2" presId="urn:microsoft.com/office/officeart/2005/8/layout/vList2"/>
+    <dgm:cxn modelId="{6C00EABA-6F4F-4A66-86A2-B21FF967D541}" srcId="{E07D3DF8-B531-453C-B599-898D9D03A724}" destId="{CB61399F-1A2D-42E5-8BED-9711DCC11731}" srcOrd="1" destOrd="0" parTransId="{7AE97EF6-8A82-49B0-B4CC-14B044F0451A}" sibTransId="{2AF9AD82-5FDD-4C7C-B9BF-B03397D23B2C}"/>
+    <dgm:cxn modelId="{FE6F531F-AB5B-44A3-A0BD-29F8A7F52D79}" type="presOf" srcId="{A6C8BD6C-B3B2-4605-8970-343DCDE52EF2}" destId="{5AF62516-935A-4716-BC3C-96D1A9708875}" srcOrd="0" destOrd="0" presId="urn:microsoft.com/office/officeart/2005/8/layout/vList2"/>
+    <dgm:cxn modelId="{DEAC3F62-24BD-4A1E-BB26-42028C0882A5}" type="presOf" srcId="{6E0EABB4-8FD4-4A31-BD32-71E547315439}" destId="{C7130AF6-5BCF-4F29-BA34-95CB85B72764}" srcOrd="0" destOrd="1" presId="urn:microsoft.com/office/officeart/2005/8/layout/vList2"/>
     <dgm:cxn modelId="{2F3EECC4-15B6-4560-A7D0-C01E1E99200E}" srcId="{2D36E825-4ACE-45FF-9A82-A07828909465}" destId="{6E0EABB4-8FD4-4A31-BD32-71E547315439}" srcOrd="1" destOrd="0" parTransId="{95D09281-F1D7-4188-8EE7-854B701AF533}" sibTransId="{6209FA6D-8B4E-41AD-8D38-DBCFB2DFB1FB}"/>
-    <dgm:cxn modelId="{CF1B1A12-0D10-4D25-9073-8F46478748FC}" type="presOf" srcId="{38F77422-9DC2-4461-90F4-808381EB6C65}" destId="{C7130AF6-5BCF-4F29-BA34-95CB85B72764}" srcOrd="0" destOrd="0" presId="urn:microsoft.com/office/officeart/2005/8/layout/vList2"/>
+    <dgm:cxn modelId="{468E1276-49A4-427C-9635-5464C82F8338}" type="presOf" srcId="{E9705339-6862-4592-949E-99BA249F19D1}" destId="{8E384E35-9385-455F-B372-4AA6FE4C9346}" srcOrd="0" destOrd="0" presId="urn:microsoft.com/office/officeart/2005/8/layout/vList2"/>
+    <dgm:cxn modelId="{03E26BDF-5D4F-478D-B8F8-F2E5FCA7B9F8}" srcId="{2D36E825-4ACE-45FF-9A82-A07828909465}" destId="{A5C752E3-5F20-413C-96F0-081937642392}" srcOrd="2" destOrd="0" parTransId="{11EC339E-6CE9-4164-A730-957FA9F5DFA7}" sibTransId="{9382DBC6-5FC6-4FD1-8597-6E3833FBCCFD}"/>
+    <dgm:cxn modelId="{A643151B-3E22-4B18-8884-B35007EC6172}" srcId="{E07D3DF8-B531-453C-B599-898D9D03A724}" destId="{A6C8BD6C-B3B2-4605-8970-343DCDE52EF2}" srcOrd="2" destOrd="0" parTransId="{B4F2E15E-1C80-4166-8AB2-D3523720A631}" sibTransId="{1DEDE7B7-B08A-462B-8B72-29F3AA43F8B3}"/>
+    <dgm:cxn modelId="{649E1C9A-C4FD-4E90-9094-E80372FE3B54}" srcId="{E07D3DF8-B531-453C-B599-898D9D03A724}" destId="{2D36E825-4ACE-45FF-9A82-A07828909465}" srcOrd="0" destOrd="0" parTransId="{B4AFEE9B-1623-480E-AD65-DE7486D44E39}" sibTransId="{3CA66D8E-C79A-4301-B374-30BE44E4CC8F}"/>
     <dgm:cxn modelId="{EDFC91EA-EE13-4EE1-91F8-56E13C73E6F0}" type="presParOf" srcId="{AE563F13-1AA5-450D-9916-2F11638C1DA9}" destId="{401ECA87-A414-4C2E-815B-2E740FECD9DF}" srcOrd="0" destOrd="0" presId="urn:microsoft.com/office/officeart/2005/8/layout/vList2"/>
     <dgm:cxn modelId="{CFFCD5FA-DD6D-4A45-8DD3-92B9AF0A6280}" type="presParOf" srcId="{AE563F13-1AA5-450D-9916-2F11638C1DA9}" destId="{C7130AF6-5BCF-4F29-BA34-95CB85B72764}" srcOrd="1" destOrd="0" presId="urn:microsoft.com/office/officeart/2005/8/layout/vList2"/>
     <dgm:cxn modelId="{3AF01595-9CA6-4EB1-9E62-04B0C173F5E6}" type="presParOf" srcId="{AE563F13-1AA5-450D-9916-2F11638C1DA9}" destId="{78DA6840-523F-44DE-8870-8809A7BF9028}" srcOrd="2" destOrd="0" presId="urn:microsoft.com/office/officeart/2005/8/layout/vList2"/>
@@ -5273,14 +5273,14 @@
   <dgm:whole/>
   <dgm:extLst>
     <a:ext uri="http://schemas.microsoft.com/office/drawing/2008/diagram">
-      <dsp:dataModelExt xmlns:dsp="http://schemas.microsoft.com/office/drawing/2008/diagram" relId="rId6" minVer="http://schemas.openxmlformats.org/drawingml/2006/diagram"/>
+      <dsp:dataModelExt xmlns:dsp="http://schemas.microsoft.com/office/drawing/2008/diagram" xmlns="" relId="rId6" minVer="http://schemas.openxmlformats.org/drawingml/2006/diagram"/>
     </a:ext>
   </dgm:extLst>
 </dgm:dataModel>
 </file>
 
 <file path=ppt/diagrams/drawing1.xml><?xml version="1.0" encoding="utf-8"?>
-<dsp:drawing xmlns:dgm="http://schemas.openxmlformats.org/drawingml/2006/diagram" xmlns:dsp="http://schemas.microsoft.com/office/drawing/2008/diagram" xmlns:a="http://schemas.openxmlformats.org/drawingml/2006/main">
+<dsp:drawing xmlns:dgm="http://schemas.openxmlformats.org/drawingml/2006/diagram" xmlns:a="http://schemas.openxmlformats.org/drawingml/2006/main" xmlns:dsp="http://schemas.microsoft.com/office/drawing/2008/diagram">
   <dsp:spTree>
     <dsp:nvGrpSpPr>
       <dsp:cNvPr id="0" name=""/>
@@ -5360,8 +5360,8 @@
         </a:p>
       </dsp:txBody>
       <dsp:txXfrm>
-        <a:off x="21704" y="78546"/>
-        <a:ext cx="7198851" cy="401192"/>
+        <a:off x="0" y="56842"/>
+        <a:ext cx="7242259" cy="444600"/>
       </dsp:txXfrm>
     </dsp:sp>
     <dsp:sp modelId="{C7130AF6-5BCF-4F29-BA34-95CB85B72764}">
@@ -5517,8 +5517,8 @@
         </a:p>
       </dsp:txBody>
       <dsp:txXfrm>
-        <a:off x="21704" y="1211421"/>
-        <a:ext cx="7198851" cy="401192"/>
+        <a:off x="0" y="1189717"/>
+        <a:ext cx="7242259" cy="444600"/>
       </dsp:txXfrm>
     </dsp:sp>
     <dsp:sp modelId="{0FB52419-7EF2-4113-8849-3B16BAEC9DD7}">
@@ -5655,8 +5655,8 @@
         </a:p>
       </dsp:txBody>
       <dsp:txXfrm>
-        <a:off x="21704" y="2108316"/>
-        <a:ext cx="7198851" cy="401192"/>
+        <a:off x="0" y="2086612"/>
+        <a:ext cx="7242259" cy="444600"/>
       </dsp:txXfrm>
     </dsp:sp>
     <dsp:sp modelId="{3FFC3410-A2D0-4B28-A055-BFAC61BCB93F}">
@@ -5793,8 +5793,8 @@
         </a:p>
       </dsp:txBody>
       <dsp:txXfrm>
-        <a:off x="21704" y="2867556"/>
-        <a:ext cx="7198851" cy="401192"/>
+        <a:off x="0" y="2845852"/>
+        <a:ext cx="7242259" cy="444600"/>
       </dsp:txXfrm>
     </dsp:sp>
     <dsp:sp modelId="{9C495DF5-169D-4A31-B3DB-88DFF8C7AB22}">
@@ -5930,8 +5930,8 @@
         </a:p>
       </dsp:txBody>
       <dsp:txXfrm>
-        <a:off x="21704" y="3626796"/>
-        <a:ext cx="7198851" cy="401192"/>
+        <a:off x="0" y="3605092"/>
+        <a:ext cx="7242259" cy="444600"/>
       </dsp:txXfrm>
     </dsp:sp>
     <dsp:sp modelId="{5EE99CAA-C70B-49D9-9943-E42F93D8C815}">
@@ -5999,7 +5999,7 @@
 </file>
 
 <file path=ppt/diagrams/drawing2.xml><?xml version="1.0" encoding="utf-8"?>
-<dsp:drawing xmlns:dgm="http://schemas.openxmlformats.org/drawingml/2006/diagram" xmlns:dsp="http://schemas.microsoft.com/office/drawing/2008/diagram" xmlns:a="http://schemas.openxmlformats.org/drawingml/2006/main">
+<dsp:drawing xmlns:dgm="http://schemas.openxmlformats.org/drawingml/2006/diagram" xmlns:a="http://schemas.openxmlformats.org/drawingml/2006/main" xmlns:dsp="http://schemas.microsoft.com/office/drawing/2008/diagram">
   <dsp:spTree>
     <dsp:nvGrpSpPr>
       <dsp:cNvPr id="0" name=""/>
@@ -6079,8 +6079,8 @@
         </a:p>
       </dsp:txBody>
       <dsp:txXfrm>
-        <a:off x="29700" y="107373"/>
-        <a:ext cx="7110144" cy="549000"/>
+        <a:off x="0" y="77673"/>
+        <a:ext cx="7169544" cy="608400"/>
       </dsp:txXfrm>
     </dsp:sp>
     <dsp:sp modelId="{C7130AF6-5BCF-4F29-BA34-95CB85B72764}">
@@ -6217,8 +6217,8 @@
         </a:p>
       </dsp:txBody>
       <dsp:txXfrm>
-        <a:off x="29700" y="1307793"/>
-        <a:ext cx="7110144" cy="549000"/>
+        <a:off x="0" y="1278093"/>
+        <a:ext cx="7169544" cy="608400"/>
       </dsp:txXfrm>
     </dsp:sp>
     <dsp:sp modelId="{9C495DF5-169D-4A31-B3DB-88DFF8C7AB22}">
@@ -6354,8 +6354,8 @@
         </a:p>
       </dsp:txBody>
       <dsp:txXfrm>
-        <a:off x="29700" y="2777313"/>
-        <a:ext cx="7110144" cy="549000"/>
+        <a:off x="0" y="2747613"/>
+        <a:ext cx="7169544" cy="608400"/>
       </dsp:txXfrm>
     </dsp:sp>
     <dsp:sp modelId="{5EE99CAA-C70B-49D9-9943-E42F93D8C815}">
@@ -6423,7 +6423,7 @@
 </file>
 
 <file path=ppt/diagrams/drawing3.xml><?xml version="1.0" encoding="utf-8"?>
-<dsp:drawing xmlns:dgm="http://schemas.openxmlformats.org/drawingml/2006/diagram" xmlns:dsp="http://schemas.microsoft.com/office/drawing/2008/diagram" xmlns:a="http://schemas.openxmlformats.org/drawingml/2006/main">
+<dsp:drawing xmlns:dgm="http://schemas.openxmlformats.org/drawingml/2006/diagram" xmlns:a="http://schemas.openxmlformats.org/drawingml/2006/main" xmlns:dsp="http://schemas.microsoft.com/office/drawing/2008/diagram">
   <dsp:spTree>
     <dsp:nvGrpSpPr>
       <dsp:cNvPr id="0" name=""/>
@@ -6503,8 +6503,8 @@
         </a:p>
       </dsp:txBody>
       <dsp:txXfrm>
-        <a:off x="20561" y="86132"/>
-        <a:ext cx="7322630" cy="380078"/>
+        <a:off x="0" y="65571"/>
+        <a:ext cx="7363752" cy="421200"/>
       </dsp:txXfrm>
     </dsp:sp>
     <dsp:sp modelId="{C7130AF6-5BCF-4F29-BA34-95CB85B72764}">
@@ -6641,8 +6641,8 @@
         </a:p>
       </dsp:txBody>
       <dsp:txXfrm>
-        <a:off x="20561" y="926507"/>
-        <a:ext cx="7322630" cy="380078"/>
+        <a:off x="0" y="905946"/>
+        <a:ext cx="7363752" cy="421200"/>
       </dsp:txXfrm>
     </dsp:sp>
     <dsp:sp modelId="{9C495DF5-169D-4A31-B3DB-88DFF8C7AB22}">
@@ -6778,8 +6778,8 @@
         </a:p>
       </dsp:txBody>
       <dsp:txXfrm>
-        <a:off x="20561" y="1766882"/>
-        <a:ext cx="7322630" cy="380078"/>
+        <a:off x="0" y="1746321"/>
+        <a:ext cx="7363752" cy="421200"/>
       </dsp:txXfrm>
     </dsp:sp>
     <dsp:sp modelId="{5EE99CAA-C70B-49D9-9943-E42F93D8C815}">
@@ -6914,8 +6914,8 @@
         </a:p>
       </dsp:txBody>
       <dsp:txXfrm>
-        <a:off x="20561" y="2624635"/>
-        <a:ext cx="7322630" cy="380078"/>
+        <a:off x="0" y="2604074"/>
+        <a:ext cx="7363752" cy="421200"/>
       </dsp:txXfrm>
     </dsp:sp>
     <dsp:sp modelId="{7E58D7A6-E1A3-4F64-B2F9-76B3525CD76E}">
@@ -7050,8 +7050,8 @@
         </a:p>
       </dsp:txBody>
       <dsp:txXfrm>
-        <a:off x="20561" y="3810917"/>
-        <a:ext cx="7322630" cy="380078"/>
+        <a:off x="0" y="3790356"/>
+        <a:ext cx="7363752" cy="421200"/>
       </dsp:txXfrm>
     </dsp:sp>
     <dsp:sp modelId="{C4D7444D-E9C0-4694-BF04-B566F459108B}">
@@ -7119,7 +7119,7 @@
 </file>
 
 <file path=ppt/diagrams/drawing4.xml><?xml version="1.0" encoding="utf-8"?>
-<dsp:drawing xmlns:dgm="http://schemas.openxmlformats.org/drawingml/2006/diagram" xmlns:dsp="http://schemas.microsoft.com/office/drawing/2008/diagram" xmlns:a="http://schemas.openxmlformats.org/drawingml/2006/main">
+<dsp:drawing xmlns:dgm="http://schemas.openxmlformats.org/drawingml/2006/diagram" xmlns:a="http://schemas.openxmlformats.org/drawingml/2006/main" xmlns:dsp="http://schemas.microsoft.com/office/drawing/2008/diagram">
   <dsp:spTree>
     <dsp:nvGrpSpPr>
       <dsp:cNvPr id="0" name=""/>
@@ -7199,8 +7199,8 @@
         </a:p>
       </dsp:txBody>
       <dsp:txXfrm>
-        <a:off x="23988" y="531279"/>
-        <a:ext cx="7315776" cy="443423"/>
+        <a:off x="0" y="507291"/>
+        <a:ext cx="7363752" cy="491399"/>
       </dsp:txXfrm>
     </dsp:sp>
     <dsp:sp modelId="{C7130AF6-5BCF-4F29-BA34-95CB85B72764}">
@@ -7398,8 +7398,8 @@
         </a:p>
       </dsp:txBody>
       <dsp:txXfrm>
-        <a:off x="23988" y="2065959"/>
-        <a:ext cx="7315776" cy="443423"/>
+        <a:off x="0" y="2041971"/>
+        <a:ext cx="7363752" cy="491399"/>
       </dsp:txXfrm>
     </dsp:sp>
     <dsp:sp modelId="{5AF62516-935A-4716-BC3C-96D1A9708875}">
@@ -7474,8 +7474,8 @@
         </a:p>
       </dsp:txBody>
       <dsp:txXfrm>
-        <a:off x="23988" y="2617839"/>
-        <a:ext cx="7315776" cy="443423"/>
+        <a:off x="0" y="2593851"/>
+        <a:ext cx="7363752" cy="491399"/>
       </dsp:txXfrm>
     </dsp:sp>
     <dsp:sp modelId="{8E384E35-9385-455F-B372-4AA6FE4C9346}">
@@ -7550,8 +7550,8 @@
         </a:p>
       </dsp:txBody>
       <dsp:txXfrm>
-        <a:off x="23988" y="3171062"/>
-        <a:ext cx="7315776" cy="443423"/>
+        <a:off x="0" y="3147074"/>
+        <a:ext cx="7363752" cy="491399"/>
       </dsp:txXfrm>
     </dsp:sp>
     <dsp:sp modelId="{1A51C3D3-58C0-4069-AB0A-A95B0B4B888D}">
@@ -7626,8 +7626,8 @@
         </a:p>
       </dsp:txBody>
       <dsp:txXfrm>
-        <a:off x="23988" y="3721599"/>
-        <a:ext cx="7315776" cy="443423"/>
+        <a:off x="0" y="3697611"/>
+        <a:ext cx="7363752" cy="491399"/>
       </dsp:txXfrm>
     </dsp:sp>
   </dsp:spTree>
@@ -12666,7 +12666,7 @@
     </p:spTree>
     <p:extLst>
       <p:ext uri="{BB962C8B-B14F-4D97-AF65-F5344CB8AC3E}">
-        <p14:creationId xmlns:p14="http://schemas.microsoft.com/office/powerpoint/2010/main" val="2505596649"/>
+        <p14:creationId xmlns:p14="http://schemas.microsoft.com/office/powerpoint/2010/main" xmlns="" val="2505596649"/>
       </p:ext>
     </p:extLst>
   </p:cSld>
@@ -12828,7 +12828,7 @@
           </a:ln>
           <a:extLst>
             <a:ext uri="{909E8E84-426E-40DD-AFC4-6F175D3DCCD1}">
-              <a14:hiddenFill xmlns:a14="http://schemas.microsoft.com/office/drawing/2010/main">
+              <a14:hiddenFill xmlns:a14="http://schemas.microsoft.com/office/drawing/2010/main" xmlns="">
                 <a:solidFill>
                   <a:srgbClr val="FFFFFF"/>
                 </a:solidFill>
@@ -13009,7 +13009,7 @@
     </p:spTree>
     <p:extLst>
       <p:ext uri="{BB962C8B-B14F-4D97-AF65-F5344CB8AC3E}">
-        <p14:creationId xmlns:p14="http://schemas.microsoft.com/office/powerpoint/2010/main" val="2057188744"/>
+        <p14:creationId xmlns:p14="http://schemas.microsoft.com/office/powerpoint/2010/main" xmlns="" val="2057188744"/>
       </p:ext>
     </p:extLst>
   </p:cSld>
@@ -13185,14 +13185,14 @@
           <a:ln/>
           <a:extLst>
             <a:ext uri="{909E8E84-426E-40DD-AFC4-6F175D3DCCD1}">
-              <a14:hiddenFill xmlns:a14="http://schemas.microsoft.com/office/drawing/2010/main">
+              <a14:hiddenFill xmlns:a14="http://schemas.microsoft.com/office/drawing/2010/main" xmlns="">
                 <a:solidFill>
                   <a:srgbClr val="FFFFFF"/>
                 </a:solidFill>
               </a14:hiddenFill>
             </a:ext>
             <a:ext uri="{91240B29-F687-4F45-9708-019B960494DF}">
-              <a14:hiddenLine xmlns:a14="http://schemas.microsoft.com/office/drawing/2010/main" w="9525">
+              <a14:hiddenLine xmlns:a14="http://schemas.microsoft.com/office/drawing/2010/main" xmlns="" w="9525">
                 <a:solidFill>
                   <a:srgbClr val="000000"/>
                 </a:solidFill>
@@ -13228,14 +13228,14 @@
           <a:ln/>
           <a:extLst>
             <a:ext uri="{909E8E84-426E-40DD-AFC4-6F175D3DCCD1}">
-              <a14:hiddenFill xmlns:a14="http://schemas.microsoft.com/office/drawing/2010/main">
+              <a14:hiddenFill xmlns:a14="http://schemas.microsoft.com/office/drawing/2010/main" xmlns="">
                 <a:solidFill>
                   <a:srgbClr val="FFFFFF"/>
                 </a:solidFill>
               </a14:hiddenFill>
             </a:ext>
             <a:ext uri="{91240B29-F687-4F45-9708-019B960494DF}">
-              <a14:hiddenLine xmlns:a14="http://schemas.microsoft.com/office/drawing/2010/main" w="9525">
+              <a14:hiddenLine xmlns:a14="http://schemas.microsoft.com/office/drawing/2010/main" xmlns="" w="9525">
                 <a:solidFill>
                   <a:srgbClr val="000000"/>
                 </a:solidFill>
@@ -13368,7 +13368,7 @@
     </p:spTree>
     <p:extLst>
       <p:ext uri="{BB962C8B-B14F-4D97-AF65-F5344CB8AC3E}">
-        <p14:creationId xmlns:p14="http://schemas.microsoft.com/office/powerpoint/2010/main" val="3818956960"/>
+        <p14:creationId xmlns:p14="http://schemas.microsoft.com/office/powerpoint/2010/main" xmlns="" val="3818956960"/>
       </p:ext>
     </p:extLst>
   </p:cSld>
@@ -13404,10 +13404,10 @@
           <p:nvPr/>
         </p:nvPicPr>
         <p:blipFill>
-          <a:blip r:embed="rId2">
+          <a:blip r:embed="rId2" cstate="print">
             <a:extLst>
               <a:ext uri="{28A0092B-C50C-407E-A947-70E740481C1C}">
-                <a14:useLocalDpi xmlns:a14="http://schemas.microsoft.com/office/drawing/2010/main" val="0"/>
+                <a14:useLocalDpi xmlns:a14="http://schemas.microsoft.com/office/drawing/2010/main" xmlns="" val="0"/>
               </a:ext>
             </a:extLst>
           </a:blip>
@@ -13430,14 +13430,14 @@
           </a:ln>
           <a:extLst>
             <a:ext uri="{909E8E84-426E-40DD-AFC4-6F175D3DCCD1}">
-              <a14:hiddenFill xmlns:a14="http://schemas.microsoft.com/office/drawing/2010/main">
+              <a14:hiddenFill xmlns:a14="http://schemas.microsoft.com/office/drawing/2010/main" xmlns="">
                 <a:solidFill>
                   <a:srgbClr val="FFFFFF"/>
                 </a:solidFill>
               </a14:hiddenFill>
             </a:ext>
             <a:ext uri="{91240B29-F687-4F45-9708-019B960494DF}">
-              <a14:hiddenLine xmlns:a14="http://schemas.microsoft.com/office/drawing/2010/main" w="9525">
+              <a14:hiddenLine xmlns:a14="http://schemas.microsoft.com/office/drawing/2010/main" xmlns="" w="9525">
                 <a:solidFill>
                   <a:srgbClr val="000000"/>
                 </a:solidFill>
@@ -13515,7 +13515,7 @@
           </a:ln>
           <a:extLst>
             <a:ext uri="{91240B29-F687-4F45-9708-019B960494DF}">
-              <a14:hiddenLine xmlns:a14="http://schemas.microsoft.com/office/drawing/2010/main" w="9525">
+              <a14:hiddenLine xmlns:a14="http://schemas.microsoft.com/office/drawing/2010/main" xmlns="" w="9525">
                 <a:solidFill>
                   <a:srgbClr val="000000"/>
                 </a:solidFill>
@@ -13650,10 +13650,10 @@
           <p:nvPr/>
         </p:nvPicPr>
         <p:blipFill>
-          <a:blip r:embed="rId3">
+          <a:blip r:embed="rId3" cstate="print">
             <a:extLst>
               <a:ext uri="{28A0092B-C50C-407E-A947-70E740481C1C}">
-                <a14:useLocalDpi xmlns:a14="http://schemas.microsoft.com/office/drawing/2010/main" val="0"/>
+                <a14:useLocalDpi xmlns:a14="http://schemas.microsoft.com/office/drawing/2010/main" xmlns="" val="0"/>
               </a:ext>
             </a:extLst>
           </a:blip>
@@ -13676,14 +13676,14 @@
           </a:ln>
           <a:extLst>
             <a:ext uri="{909E8E84-426E-40DD-AFC4-6F175D3DCCD1}">
-              <a14:hiddenFill xmlns:a14="http://schemas.microsoft.com/office/drawing/2010/main">
+              <a14:hiddenFill xmlns:a14="http://schemas.microsoft.com/office/drawing/2010/main" xmlns="">
                 <a:solidFill>
                   <a:srgbClr val="FFFFFF"/>
                 </a:solidFill>
               </a14:hiddenFill>
             </a:ext>
             <a:ext uri="{91240B29-F687-4F45-9708-019B960494DF}">
-              <a14:hiddenLine xmlns:a14="http://schemas.microsoft.com/office/drawing/2010/main" w="9525">
+              <a14:hiddenLine xmlns:a14="http://schemas.microsoft.com/office/drawing/2010/main" xmlns="" w="9525">
                 <a:solidFill>
                   <a:srgbClr val="000000"/>
                 </a:solidFill>
@@ -13714,7 +13714,7 @@
             </a:duotone>
             <a:extLst>
               <a:ext uri="{28A0092B-C50C-407E-A947-70E740481C1C}">
-                <a14:useLocalDpi xmlns:a14="http://schemas.microsoft.com/office/drawing/2010/main" val="0"/>
+                <a14:useLocalDpi xmlns:a14="http://schemas.microsoft.com/office/drawing/2010/main" xmlns="" val="0"/>
               </a:ext>
             </a:extLst>
           </a:blip>
@@ -13876,7 +13876,7 @@
     </p:spTree>
     <p:extLst>
       <p:ext uri="{BB962C8B-B14F-4D97-AF65-F5344CB8AC3E}">
-        <p14:creationId xmlns:p14="http://schemas.microsoft.com/office/powerpoint/2010/main" val="419336918"/>
+        <p14:creationId xmlns:p14="http://schemas.microsoft.com/office/powerpoint/2010/main" xmlns="" val="419336918"/>
       </p:ext>
     </p:extLst>
   </p:cSld>
@@ -13915,10 +13915,10 @@
           <p:nvPr/>
         </p:nvPicPr>
         <p:blipFill>
-          <a:blip r:embed="rId2">
+          <a:blip r:embed="rId2" cstate="print">
             <a:extLst>
               <a:ext uri="{28A0092B-C50C-407E-A947-70E740481C1C}">
-                <a14:useLocalDpi xmlns:a14="http://schemas.microsoft.com/office/drawing/2010/main" val="0"/>
+                <a14:useLocalDpi xmlns:a14="http://schemas.microsoft.com/office/drawing/2010/main" xmlns="" val="0"/>
               </a:ext>
             </a:extLst>
           </a:blip>
@@ -13941,14 +13941,14 @@
           </a:ln>
           <a:extLst>
             <a:ext uri="{909E8E84-426E-40DD-AFC4-6F175D3DCCD1}">
-              <a14:hiddenFill xmlns:a14="http://schemas.microsoft.com/office/drawing/2010/main">
+              <a14:hiddenFill xmlns:a14="http://schemas.microsoft.com/office/drawing/2010/main" xmlns="">
                 <a:solidFill>
                   <a:srgbClr val="FFFFFF"/>
                 </a:solidFill>
               </a14:hiddenFill>
             </a:ext>
             <a:ext uri="{91240B29-F687-4F45-9708-019B960494DF}">
-              <a14:hiddenLine xmlns:a14="http://schemas.microsoft.com/office/drawing/2010/main" w="9525">
+              <a14:hiddenLine xmlns:a14="http://schemas.microsoft.com/office/drawing/2010/main" xmlns="" w="9525">
                 <a:solidFill>
                   <a:srgbClr val="000000"/>
                 </a:solidFill>
@@ -13972,7 +13972,7 @@
           <a:blip r:embed="rId3" cstate="print">
             <a:extLst>
               <a:ext uri="{28A0092B-C50C-407E-A947-70E740481C1C}">
-                <a14:useLocalDpi xmlns:a14="http://schemas.microsoft.com/office/drawing/2010/main" val="0"/>
+                <a14:useLocalDpi xmlns:a14="http://schemas.microsoft.com/office/drawing/2010/main" xmlns="" val="0"/>
               </a:ext>
             </a:extLst>
           </a:blip>
@@ -13995,14 +13995,14 @@
           </a:ln>
           <a:extLst>
             <a:ext uri="{909E8E84-426E-40DD-AFC4-6F175D3DCCD1}">
-              <a14:hiddenFill xmlns:a14="http://schemas.microsoft.com/office/drawing/2010/main">
+              <a14:hiddenFill xmlns:a14="http://schemas.microsoft.com/office/drawing/2010/main" xmlns="">
                 <a:solidFill>
                   <a:srgbClr val="FFFFFF"/>
                 </a:solidFill>
               </a14:hiddenFill>
             </a:ext>
             <a:ext uri="{91240B29-F687-4F45-9708-019B960494DF}">
-              <a14:hiddenLine xmlns:a14="http://schemas.microsoft.com/office/drawing/2010/main" w="9525">
+              <a14:hiddenLine xmlns:a14="http://schemas.microsoft.com/office/drawing/2010/main" xmlns="" w="9525">
                 <a:solidFill>
                   <a:srgbClr val="000000"/>
                 </a:solidFill>
@@ -14075,7 +14075,7 @@
             </a:duotone>
             <a:extLst>
               <a:ext uri="{28A0092B-C50C-407E-A947-70E740481C1C}">
-                <a14:useLocalDpi xmlns:a14="http://schemas.microsoft.com/office/drawing/2010/main" val="0"/>
+                <a14:useLocalDpi xmlns:a14="http://schemas.microsoft.com/office/drawing/2010/main" xmlns="" val="0"/>
               </a:ext>
             </a:extLst>
           </a:blip>
@@ -14169,7 +14169,7 @@
     </p:spTree>
     <p:extLst>
       <p:ext uri="{BB962C8B-B14F-4D97-AF65-F5344CB8AC3E}">
-        <p14:creationId xmlns:p14="http://schemas.microsoft.com/office/powerpoint/2010/main" val="3980436823"/>
+        <p14:creationId xmlns:p14="http://schemas.microsoft.com/office/powerpoint/2010/main" xmlns="" val="3980436823"/>
       </p:ext>
     </p:extLst>
   </p:cSld>
@@ -14208,10 +14208,10 @@
           <p:nvPr/>
         </p:nvPicPr>
         <p:blipFill>
-          <a:blip r:embed="rId2">
+          <a:blip r:embed="rId2" cstate="print">
             <a:extLst>
               <a:ext uri="{28A0092B-C50C-407E-A947-70E740481C1C}">
-                <a14:useLocalDpi xmlns:a14="http://schemas.microsoft.com/office/drawing/2010/main" val="0"/>
+                <a14:useLocalDpi xmlns:a14="http://schemas.microsoft.com/office/drawing/2010/main" xmlns="" val="0"/>
               </a:ext>
             </a:extLst>
           </a:blip>
@@ -14234,14 +14234,14 @@
           </a:ln>
           <a:extLst>
             <a:ext uri="{909E8E84-426E-40DD-AFC4-6F175D3DCCD1}">
-              <a14:hiddenFill xmlns:a14="http://schemas.microsoft.com/office/drawing/2010/main">
+              <a14:hiddenFill xmlns:a14="http://schemas.microsoft.com/office/drawing/2010/main" xmlns="">
                 <a:solidFill>
                   <a:srgbClr val="FFFFFF"/>
                 </a:solidFill>
               </a14:hiddenFill>
             </a:ext>
             <a:ext uri="{91240B29-F687-4F45-9708-019B960494DF}">
-              <a14:hiddenLine xmlns:a14="http://schemas.microsoft.com/office/drawing/2010/main" w="9525">
+              <a14:hiddenLine xmlns:a14="http://schemas.microsoft.com/office/drawing/2010/main" xmlns="" w="9525">
                 <a:solidFill>
                   <a:srgbClr val="000000"/>
                 </a:solidFill>
@@ -14265,7 +14265,7 @@
           <a:blip r:embed="rId3" cstate="print">
             <a:extLst>
               <a:ext uri="{28A0092B-C50C-407E-A947-70E740481C1C}">
-                <a14:useLocalDpi xmlns:a14="http://schemas.microsoft.com/office/drawing/2010/main" val="0"/>
+                <a14:useLocalDpi xmlns:a14="http://schemas.microsoft.com/office/drawing/2010/main" xmlns="" val="0"/>
               </a:ext>
             </a:extLst>
           </a:blip>
@@ -14288,14 +14288,14 @@
           </a:ln>
           <a:extLst>
             <a:ext uri="{909E8E84-426E-40DD-AFC4-6F175D3DCCD1}">
-              <a14:hiddenFill xmlns:a14="http://schemas.microsoft.com/office/drawing/2010/main">
+              <a14:hiddenFill xmlns:a14="http://schemas.microsoft.com/office/drawing/2010/main" xmlns="">
                 <a:solidFill>
                   <a:srgbClr val="FFFFFF"/>
                 </a:solidFill>
               </a14:hiddenFill>
             </a:ext>
             <a:ext uri="{91240B29-F687-4F45-9708-019B960494DF}">
-              <a14:hiddenLine xmlns:a14="http://schemas.microsoft.com/office/drawing/2010/main" w="9525">
+              <a14:hiddenLine xmlns:a14="http://schemas.microsoft.com/office/drawing/2010/main" xmlns="" w="9525">
                 <a:solidFill>
                   <a:srgbClr val="000000"/>
                 </a:solidFill>
@@ -14368,7 +14368,7 @@
             </a:duotone>
             <a:extLst>
               <a:ext uri="{28A0092B-C50C-407E-A947-70E740481C1C}">
-                <a14:useLocalDpi xmlns:a14="http://schemas.microsoft.com/office/drawing/2010/main" val="0"/>
+                <a14:useLocalDpi xmlns:a14="http://schemas.microsoft.com/office/drawing/2010/main" xmlns="" val="0"/>
               </a:ext>
             </a:extLst>
           </a:blip>
@@ -14478,7 +14478,7 @@
           <a:ln/>
           <a:extLst>
             <a:ext uri="{909E8E84-426E-40DD-AFC4-6F175D3DCCD1}">
-              <a14:hiddenFill xmlns:a14="http://schemas.microsoft.com/office/drawing/2010/main">
+              <a14:hiddenFill xmlns:a14="http://schemas.microsoft.com/office/drawing/2010/main" xmlns="">
                 <a:solidFill>
                   <a:srgbClr val="FFFFFF">
                     <a:alpha val="0"/>
@@ -14522,7 +14522,7 @@
     </p:spTree>
     <p:extLst>
       <p:ext uri="{BB962C8B-B14F-4D97-AF65-F5344CB8AC3E}">
-        <p14:creationId xmlns:p14="http://schemas.microsoft.com/office/powerpoint/2010/main" val="3550375277"/>
+        <p14:creationId xmlns:p14="http://schemas.microsoft.com/office/powerpoint/2010/main" xmlns="" val="3550375277"/>
       </p:ext>
     </p:extLst>
   </p:cSld>
@@ -14704,7 +14704,7 @@
             <a:fld id="{E906F336-2E39-43F8-9DF9-B9244679DDFB}" type="datetime5">
               <a:rPr lang="en-US" altLang="pl-PL"/>
               <a:pPr/>
-              <a:t>13-Feb-17</a:t>
+              <a:t>21-Feb-17</a:t>
             </a:fld>
             <a:endParaRPr lang="en-US" altLang="pl-PL"/>
           </a:p>
@@ -14776,7 +14776,7 @@
     </p:spTree>
     <p:extLst>
       <p:ext uri="{BB962C8B-B14F-4D97-AF65-F5344CB8AC3E}">
-        <p14:creationId xmlns:p14="http://schemas.microsoft.com/office/powerpoint/2010/main" val="614391971"/>
+        <p14:creationId xmlns:p14="http://schemas.microsoft.com/office/powerpoint/2010/main" xmlns="" val="614391971"/>
       </p:ext>
     </p:extLst>
   </p:cSld>
@@ -15031,7 +15031,7 @@
             <a:fld id="{7B2EBB8C-B024-47EA-BB67-9AC43555CB71}" type="datetime5">
               <a:rPr lang="en-US" altLang="pl-PL"/>
               <a:pPr/>
-              <a:t>13-Feb-17</a:t>
+              <a:t>21-Feb-17</a:t>
             </a:fld>
             <a:endParaRPr lang="en-US" altLang="pl-PL"/>
           </a:p>
@@ -15103,7 +15103,7 @@
     </p:spTree>
     <p:extLst>
       <p:ext uri="{BB962C8B-B14F-4D97-AF65-F5344CB8AC3E}">
-        <p14:creationId xmlns:p14="http://schemas.microsoft.com/office/powerpoint/2010/main" val="2153308106"/>
+        <p14:creationId xmlns:p14="http://schemas.microsoft.com/office/powerpoint/2010/main" xmlns="" val="2153308106"/>
       </p:ext>
     </p:extLst>
   </p:cSld>
@@ -15595,7 +15595,7 @@
             <a:fld id="{AF037DEB-4CF1-4C5F-B037-398229B9C945}" type="datetime5">
               <a:rPr lang="en-US" altLang="pl-PL"/>
               <a:pPr/>
-              <a:t>13-Feb-17</a:t>
+              <a:t>21-Feb-17</a:t>
             </a:fld>
             <a:endParaRPr lang="de-DE" altLang="pl-PL"/>
           </a:p>
@@ -15662,7 +15662,7 @@
     </p:spTree>
     <p:extLst>
       <p:ext uri="{BB962C8B-B14F-4D97-AF65-F5344CB8AC3E}">
-        <p14:creationId xmlns:p14="http://schemas.microsoft.com/office/powerpoint/2010/main" val="2263958231"/>
+        <p14:creationId xmlns:p14="http://schemas.microsoft.com/office/powerpoint/2010/main" xmlns="" val="2263958231"/>
       </p:ext>
     </p:extLst>
   </p:cSld>
@@ -15745,7 +15745,7 @@
             <a:fld id="{9D49F2BD-E1AC-4AED-B4E5-321CBE4AD3D2}" type="datetime5">
               <a:rPr lang="en-US" altLang="pl-PL"/>
               <a:pPr/>
-              <a:t>13-Feb-17</a:t>
+              <a:t>21-Feb-17</a:t>
             </a:fld>
             <a:endParaRPr lang="en-US" altLang="pl-PL"/>
           </a:p>
@@ -15817,7 +15817,7 @@
     </p:spTree>
     <p:extLst>
       <p:ext uri="{BB962C8B-B14F-4D97-AF65-F5344CB8AC3E}">
-        <p14:creationId xmlns:p14="http://schemas.microsoft.com/office/powerpoint/2010/main" val="578267505"/>
+        <p14:creationId xmlns:p14="http://schemas.microsoft.com/office/powerpoint/2010/main" xmlns="" val="578267505"/>
       </p:ext>
     </p:extLst>
   </p:cSld>
@@ -15871,7 +15871,7 @@
           </a:ln>
           <a:extLst>
             <a:ext uri="{91240B29-F687-4F45-9708-019B960494DF}">
-              <a14:hiddenLine xmlns:a14="http://schemas.microsoft.com/office/drawing/2010/main" w="9525">
+              <a14:hiddenLine xmlns:a14="http://schemas.microsoft.com/office/drawing/2010/main" xmlns="" w="9525">
                 <a:solidFill>
                   <a:srgbClr val="000000"/>
                 </a:solidFill>
@@ -16019,7 +16019,7 @@
             <a:fld id="{6DE49DB7-DE0A-4B13-98D6-E8B911A92E91}" type="datetime5">
               <a:rPr lang="en-US" altLang="pl-PL"/>
               <a:pPr/>
-              <a:t>13-Feb-17</a:t>
+              <a:t>21-Feb-17</a:t>
             </a:fld>
             <a:endParaRPr lang="en-US" altLang="pl-PL"/>
           </a:p>
@@ -16085,7 +16085,7 @@
     </p:spTree>
     <p:extLst>
       <p:ext uri="{BB962C8B-B14F-4D97-AF65-F5344CB8AC3E}">
-        <p14:creationId xmlns:p14="http://schemas.microsoft.com/office/powerpoint/2010/main" val="806562212"/>
+        <p14:creationId xmlns:p14="http://schemas.microsoft.com/office/powerpoint/2010/main" xmlns="" val="806562212"/>
       </p:ext>
     </p:extLst>
   </p:cSld>
@@ -16135,7 +16135,7 @@
           <a:blip r:embed="rId14" cstate="print">
             <a:extLst>
               <a:ext uri="{28A0092B-C50C-407E-A947-70E740481C1C}">
-                <a14:useLocalDpi xmlns:a14="http://schemas.microsoft.com/office/drawing/2010/main" val="0"/>
+                <a14:useLocalDpi xmlns:a14="http://schemas.microsoft.com/office/drawing/2010/main" xmlns="" val="0"/>
               </a:ext>
             </a:extLst>
           </a:blip>
@@ -16158,14 +16158,14 @@
           </a:ln>
           <a:extLst>
             <a:ext uri="{909E8E84-426E-40DD-AFC4-6F175D3DCCD1}">
-              <a14:hiddenFill xmlns:a14="http://schemas.microsoft.com/office/drawing/2010/main">
+              <a14:hiddenFill xmlns:a14="http://schemas.microsoft.com/office/drawing/2010/main" xmlns="">
                 <a:solidFill>
                   <a:srgbClr val="FFFFFF"/>
                 </a:solidFill>
               </a14:hiddenFill>
             </a:ext>
             <a:ext uri="{91240B29-F687-4F45-9708-019B960494DF}">
-              <a14:hiddenLine xmlns:a14="http://schemas.microsoft.com/office/drawing/2010/main" w="9525">
+              <a14:hiddenLine xmlns:a14="http://schemas.microsoft.com/office/drawing/2010/main" xmlns="" w="9525">
                 <a:solidFill>
                   <a:srgbClr val="000000"/>
                 </a:solidFill>
@@ -16196,7 +16196,7 @@
             </a:duotone>
             <a:extLst>
               <a:ext uri="{28A0092B-C50C-407E-A947-70E740481C1C}">
-                <a14:useLocalDpi xmlns:a14="http://schemas.microsoft.com/office/drawing/2010/main" val="0"/>
+                <a14:useLocalDpi xmlns:a14="http://schemas.microsoft.com/office/drawing/2010/main" xmlns="" val="0"/>
               </a:ext>
             </a:extLst>
           </a:blip>
@@ -16241,7 +16241,7 @@
           </a:ln>
           <a:extLst>
             <a:ext uri="{909E8E84-426E-40DD-AFC4-6F175D3DCCD1}">
-              <a14:hiddenFill xmlns:a14="http://schemas.microsoft.com/office/drawing/2010/main">
+              <a14:hiddenFill xmlns:a14="http://schemas.microsoft.com/office/drawing/2010/main" xmlns="">
                 <a:noFill/>
               </a14:hiddenFill>
             </a:ext>
@@ -16279,14 +16279,14 @@
           </a:ln>
           <a:extLst>
             <a:ext uri="{909E8E84-426E-40DD-AFC4-6F175D3DCCD1}">
-              <a14:hiddenFill xmlns:a14="http://schemas.microsoft.com/office/drawing/2010/main">
+              <a14:hiddenFill xmlns:a14="http://schemas.microsoft.com/office/drawing/2010/main" xmlns="">
                 <a:solidFill>
                   <a:srgbClr val="FFFFFF"/>
                 </a:solidFill>
               </a14:hiddenFill>
             </a:ext>
             <a:ext uri="{91240B29-F687-4F45-9708-019B960494DF}">
-              <a14:hiddenLine xmlns:a14="http://schemas.microsoft.com/office/drawing/2010/main" w="9525">
+              <a14:hiddenLine xmlns:a14="http://schemas.microsoft.com/office/drawing/2010/main" xmlns="" w="9525">
                 <a:solidFill>
                   <a:srgbClr val="000000"/>
                 </a:solidFill>
@@ -16368,7 +16368,7 @@
           </a:ln>
           <a:extLst>
             <a:ext uri="{909E8E84-426E-40DD-AFC4-6F175D3DCCD1}">
-              <a14:hiddenFill xmlns:a14="http://schemas.microsoft.com/office/drawing/2010/main">
+              <a14:hiddenFill xmlns:a14="http://schemas.microsoft.com/office/drawing/2010/main" xmlns="">
                 <a:noFill/>
               </a14:hiddenFill>
             </a:ext>
@@ -16447,7 +16447,7 @@
           <a:ln/>
           <a:extLst>
             <a:ext uri="{909E8E84-426E-40DD-AFC4-6F175D3DCCD1}">
-              <a14:hiddenFill xmlns:a14="http://schemas.microsoft.com/office/drawing/2010/main">
+              <a14:hiddenFill xmlns:a14="http://schemas.microsoft.com/office/drawing/2010/main" xmlns="">
                 <a:solidFill>
                   <a:srgbClr val="FFFFFF">
                     <a:alpha val="0"/>
@@ -16476,7 +16476,7 @@
             <a:fld id="{57896E6B-B1BC-4ECC-9043-421F9FF1FF7E}" type="datetime5">
               <a:rPr lang="en-US" altLang="pl-PL"/>
               <a:pPr/>
-              <a:t>13-Feb-17</a:t>
+              <a:t>21-Feb-17</a:t>
             </a:fld>
             <a:endParaRPr lang="en-US" altLang="pl-PL"/>
           </a:p>
@@ -16507,7 +16507,7 @@
           <a:ln/>
           <a:extLst>
             <a:ext uri="{909E8E84-426E-40DD-AFC4-6F175D3DCCD1}">
-              <a14:hiddenFill xmlns:a14="http://schemas.microsoft.com/office/drawing/2010/main">
+              <a14:hiddenFill xmlns:a14="http://schemas.microsoft.com/office/drawing/2010/main" xmlns="">
                 <a:solidFill>
                   <a:srgbClr val="FFFFFF">
                     <a:alpha val="0"/>
@@ -16576,7 +16576,7 @@
           <a:ln/>
           <a:extLst>
             <a:ext uri="{909E8E84-426E-40DD-AFC4-6F175D3DCCD1}">
-              <a14:hiddenFill xmlns:a14="http://schemas.microsoft.com/office/drawing/2010/main">
+              <a14:hiddenFill xmlns:a14="http://schemas.microsoft.com/office/drawing/2010/main" xmlns="">
                 <a:solidFill>
                   <a:srgbClr val="FFFFFF">
                     <a:alpha val="0"/>
@@ -17195,9 +17195,6 @@
               </a:rPr>
               <a:t>Mateusz Kołodziejski</a:t>
             </a:r>
-            <a:endParaRPr lang="pl-PL" altLang="pl-PL" dirty="0" smtClean="0">
-              <a:cs typeface="ＭＳ Ｐゴシック" charset="-128"/>
-            </a:endParaRPr>
           </a:p>
           <a:p>
             <a:pPr>
@@ -17208,17 +17205,8 @@
               <a:rPr lang="pl-PL" altLang="pl-PL" dirty="0" smtClean="0">
                 <a:cs typeface="ＭＳ Ｐゴシック" charset="-128"/>
               </a:rPr>
-              <a:t>Semestr letni </a:t>
+              <a:t>Semestr letni 2017</a:t>
             </a:r>
-            <a:r>
-              <a:rPr lang="pl-PL" altLang="pl-PL" dirty="0" smtClean="0">
-                <a:cs typeface="ＭＳ Ｐゴシック" charset="-128"/>
-              </a:rPr>
-              <a:t>2017</a:t>
-            </a:r>
-            <a:endParaRPr lang="pl-PL" altLang="pl-PL" dirty="0" smtClean="0">
-              <a:cs typeface="ＭＳ Ｐゴシック" charset="-128"/>
-            </a:endParaRPr>
           </a:p>
           <a:p>
             <a:pPr>
@@ -17229,13 +17217,7 @@
               <a:rPr lang="pl-PL" altLang="pl-PL" dirty="0" smtClean="0">
                 <a:cs typeface="ＭＳ Ｐゴシック" charset="-128"/>
               </a:rPr>
-              <a:t>Wersja </a:t>
-            </a:r>
-            <a:r>
-              <a:rPr lang="pl-PL" altLang="pl-PL" dirty="0" smtClean="0">
-                <a:cs typeface="ＭＳ Ｐゴシック" charset="-128"/>
-              </a:rPr>
-              <a:t>1.3</a:t>
+              <a:t>Wersja 1.3</a:t>
             </a:r>
             <a:endParaRPr lang="en-US" altLang="pl-PL" dirty="0" smtClean="0">
               <a:cs typeface="ＭＳ Ｐゴシック" charset="-128"/>
@@ -17372,7 +17354,7 @@
           <a:noFill/>
           <a:extLst>
             <a:ext uri="{91240B29-F687-4F45-9708-019B960494DF}">
-              <a14:hiddenLine xmlns:a14="http://schemas.microsoft.com/office/drawing/2010/main" w="9525">
+              <a14:hiddenLine xmlns:a14="http://schemas.microsoft.com/office/drawing/2010/main" xmlns="" w="9525">
                 <a:solidFill>
                   <a:srgbClr val="000000"/>
                 </a:solidFill>
@@ -17500,7 +17482,7 @@
                 </a:solidFill>
               </a:rPr>
               <a:pPr/>
-              <a:t>13-Feb-17</a:t>
+              <a:t>21-Feb-17</a:t>
             </a:fld>
             <a:endParaRPr lang="en-US" altLang="pl-PL" sz="900">
               <a:solidFill>
@@ -17524,7 +17506,7 @@
           <a:noFill/>
           <a:extLst>
             <a:ext uri="{91240B29-F687-4F45-9708-019B960494DF}">
-              <a14:hiddenLine xmlns:a14="http://schemas.microsoft.com/office/drawing/2010/main" w="9525">
+              <a14:hiddenLine xmlns:a14="http://schemas.microsoft.com/office/drawing/2010/main" xmlns="" w="9525">
                 <a:solidFill>
                   <a:srgbClr val="000000"/>
                 </a:solidFill>
@@ -17674,7 +17656,7 @@
           <a:noFill/>
           <a:extLst>
             <a:ext uri="{91240B29-F687-4F45-9708-019B960494DF}">
-              <a14:hiddenLine xmlns:a14="http://schemas.microsoft.com/office/drawing/2010/main" w="9525">
+              <a14:hiddenLine xmlns:a14="http://schemas.microsoft.com/office/drawing/2010/main" xmlns="" w="9525">
                 <a:solidFill>
                   <a:srgbClr val="000000"/>
                 </a:solidFill>
@@ -17821,7 +17803,7 @@
           <p:nvPr>
             <p:extLst>
               <p:ext uri="{D42A27DB-BD31-4B8C-83A1-F6EECF244321}">
-                <p14:modId xmlns:p14="http://schemas.microsoft.com/office/powerpoint/2010/main" val="36956152"/>
+                <p14:modId xmlns:p14="http://schemas.microsoft.com/office/powerpoint/2010/main" xmlns="" val="36956152"/>
               </p:ext>
             </p:extLst>
           </p:nvPr>
@@ -18136,7 +18118,6 @@
                         <a:rPr lang="pl-PL" sz="1100" dirty="0" smtClean="0"/>
                         <a:t>Zajęcia 12-14</a:t>
                       </a:r>
-                      <a:endParaRPr lang="pl-PL" sz="1100" dirty="0" smtClean="0"/>
                     </a:p>
                   </a:txBody>
                   <a:tcPr/>
@@ -18206,7 +18187,6 @@
                         <a:rPr lang="pl-PL" sz="1100" dirty="0" smtClean="0"/>
                         <a:t>Zajęcia 15</a:t>
                       </a:r>
-                      <a:endParaRPr lang="pl-PL" sz="1100" dirty="0" smtClean="0"/>
                     </a:p>
                   </a:txBody>
                   <a:tcPr/>
@@ -18295,7 +18275,7 @@
     </p:spTree>
     <p:extLst>
       <p:ext uri="{BB962C8B-B14F-4D97-AF65-F5344CB8AC3E}">
-        <p14:creationId xmlns:p14="http://schemas.microsoft.com/office/powerpoint/2010/main" val="2851306553"/>
+        <p14:creationId xmlns:p14="http://schemas.microsoft.com/office/powerpoint/2010/main" xmlns="" val="2851306553"/>
       </p:ext>
     </p:extLst>
   </p:cSld>
@@ -18449,7 +18429,7 @@
             <a:fld id="{E906F336-2E39-43F8-9DF9-B9244679DDFB}" type="datetime5">
               <a:rPr lang="en-US" altLang="pl-PL" smtClean="0"/>
               <a:pPr/>
-              <a:t>14-Feb-17</a:t>
+              <a:t>21-Feb-17</a:t>
             </a:fld>
             <a:endParaRPr lang="en-US" altLang="pl-PL"/>
           </a:p>
@@ -18508,7 +18488,7 @@
     </p:spTree>
     <p:extLst>
       <p:ext uri="{BB962C8B-B14F-4D97-AF65-F5344CB8AC3E}">
-        <p14:creationId xmlns:p14="http://schemas.microsoft.com/office/powerpoint/2010/main" val="3319988810"/>
+        <p14:creationId xmlns:p14="http://schemas.microsoft.com/office/powerpoint/2010/main" xmlns="" val="3319988810"/>
       </p:ext>
     </p:extLst>
   </p:cSld>
@@ -18584,7 +18564,7 @@
           <a:noFill/>
           <a:extLst>
             <a:ext uri="{91240B29-F687-4F45-9708-019B960494DF}">
-              <a14:hiddenLine xmlns:a14="http://schemas.microsoft.com/office/drawing/2010/main" w="9525">
+              <a14:hiddenLine xmlns:a14="http://schemas.microsoft.com/office/drawing/2010/main" xmlns="" w="9525">
                 <a:solidFill>
                   <a:srgbClr val="000000"/>
                 </a:solidFill>
@@ -18712,7 +18692,7 @@
                 </a:solidFill>
               </a:rPr>
               <a:pPr/>
-              <a:t>13-Feb-17</a:t>
+              <a:t>21-Feb-17</a:t>
             </a:fld>
             <a:endParaRPr lang="en-US" altLang="pl-PL" sz="900">
               <a:solidFill>
@@ -18736,7 +18716,7 @@
           <a:noFill/>
           <a:extLst>
             <a:ext uri="{91240B29-F687-4F45-9708-019B960494DF}">
-              <a14:hiddenLine xmlns:a14="http://schemas.microsoft.com/office/drawing/2010/main" w="9525">
+              <a14:hiddenLine xmlns:a14="http://schemas.microsoft.com/office/drawing/2010/main" xmlns="" w="9525">
                 <a:solidFill>
                   <a:srgbClr val="000000"/>
                 </a:solidFill>
@@ -18886,7 +18866,7 @@
           <a:noFill/>
           <a:extLst>
             <a:ext uri="{91240B29-F687-4F45-9708-019B960494DF}">
-              <a14:hiddenLine xmlns:a14="http://schemas.microsoft.com/office/drawing/2010/main" w="9525">
+              <a14:hiddenLine xmlns:a14="http://schemas.microsoft.com/office/drawing/2010/main" xmlns="" w="9525">
                 <a:solidFill>
                   <a:srgbClr val="000000"/>
                 </a:solidFill>
@@ -19631,7 +19611,7 @@
                   <a:srgbClr val="00B050"/>
                 </a:solidFill>
               </a:rPr>
-              <a:t>27lutego</a:t>
+              <a:t>2 marca</a:t>
             </a:r>
             <a:endParaRPr lang="pl-PL" sz="1600" b="1" dirty="0" smtClean="0">
               <a:solidFill>
@@ -19667,7 +19647,7 @@
     </p:spTree>
     <p:extLst>
       <p:ext uri="{BB962C8B-B14F-4D97-AF65-F5344CB8AC3E}">
-        <p14:creationId xmlns:p14="http://schemas.microsoft.com/office/powerpoint/2010/main" val="2253719762"/>
+        <p14:creationId xmlns:p14="http://schemas.microsoft.com/office/powerpoint/2010/main" xmlns="" val="2253719762"/>
       </p:ext>
     </p:extLst>
   </p:cSld>
@@ -19756,7 +19736,7 @@
           <a:noFill/>
           <a:extLst>
             <a:ext uri="{91240B29-F687-4F45-9708-019B960494DF}">
-              <a14:hiddenLine xmlns:a14="http://schemas.microsoft.com/office/drawing/2010/main" w="9525">
+              <a14:hiddenLine xmlns:a14="http://schemas.microsoft.com/office/drawing/2010/main" xmlns="" w="9525">
                 <a:solidFill>
                   <a:srgbClr val="000000"/>
                 </a:solidFill>
@@ -19884,7 +19864,7 @@
                 </a:solidFill>
               </a:rPr>
               <a:pPr/>
-              <a:t>13-Feb-17</a:t>
+              <a:t>21-Feb-17</a:t>
             </a:fld>
             <a:endParaRPr lang="en-US" altLang="pl-PL" sz="900">
               <a:solidFill>
@@ -19908,7 +19888,7 @@
           <a:noFill/>
           <a:extLst>
             <a:ext uri="{91240B29-F687-4F45-9708-019B960494DF}">
-              <a14:hiddenLine xmlns:a14="http://schemas.microsoft.com/office/drawing/2010/main" w="9525">
+              <a14:hiddenLine xmlns:a14="http://schemas.microsoft.com/office/drawing/2010/main" xmlns="" w="9525">
                 <a:solidFill>
                   <a:srgbClr val="000000"/>
                 </a:solidFill>
@@ -20058,7 +20038,7 @@
           <a:noFill/>
           <a:extLst>
             <a:ext uri="{91240B29-F687-4F45-9708-019B960494DF}">
-              <a14:hiddenLine xmlns:a14="http://schemas.microsoft.com/office/drawing/2010/main" w="9525">
+              <a14:hiddenLine xmlns:a14="http://schemas.microsoft.com/office/drawing/2010/main" xmlns="" w="9525">
                 <a:solidFill>
                   <a:srgbClr val="000000"/>
                 </a:solidFill>
@@ -20205,10 +20185,10 @@
           <p:nvPr/>
         </p:nvPicPr>
         <p:blipFill>
-          <a:blip r:embed="rId2">
+          <a:blip r:embed="rId2" cstate="print">
             <a:extLst>
               <a:ext uri="{28A0092B-C50C-407E-A947-70E740481C1C}">
-                <a14:useLocalDpi xmlns:a14="http://schemas.microsoft.com/office/drawing/2010/main" val="0"/>
+                <a14:useLocalDpi xmlns:a14="http://schemas.microsoft.com/office/drawing/2010/main" xmlns="" val="0"/>
               </a:ext>
             </a:extLst>
           </a:blip>
@@ -20231,14 +20211,14 @@
           </a:ln>
           <a:extLst>
             <a:ext uri="{909E8E84-426E-40DD-AFC4-6F175D3DCCD1}">
-              <a14:hiddenFill xmlns:a14="http://schemas.microsoft.com/office/drawing/2010/main">
+              <a14:hiddenFill xmlns:a14="http://schemas.microsoft.com/office/drawing/2010/main" xmlns="">
                 <a:solidFill>
                   <a:schemeClr val="accent1"/>
                 </a:solidFill>
               </a14:hiddenFill>
             </a:ext>
             <a:ext uri="{91240B29-F687-4F45-9708-019B960494DF}">
-              <a14:hiddenLine xmlns:a14="http://schemas.microsoft.com/office/drawing/2010/main" w="9525">
+              <a14:hiddenLine xmlns:a14="http://schemas.microsoft.com/office/drawing/2010/main" xmlns="" w="9525">
                 <a:solidFill>
                   <a:schemeClr val="tx1"/>
                 </a:solidFill>
@@ -20259,10 +20239,10 @@
           <p:nvPr/>
         </p:nvPicPr>
         <p:blipFill>
-          <a:blip r:embed="rId3">
+          <a:blip r:embed="rId3" cstate="print">
             <a:extLst>
               <a:ext uri="{28A0092B-C50C-407E-A947-70E740481C1C}">
-                <a14:useLocalDpi xmlns:a14="http://schemas.microsoft.com/office/drawing/2010/main" val="0"/>
+                <a14:useLocalDpi xmlns:a14="http://schemas.microsoft.com/office/drawing/2010/main" xmlns="" val="0"/>
               </a:ext>
             </a:extLst>
           </a:blip>
@@ -20285,14 +20265,14 @@
           </a:ln>
           <a:extLst>
             <a:ext uri="{909E8E84-426E-40DD-AFC4-6F175D3DCCD1}">
-              <a14:hiddenFill xmlns:a14="http://schemas.microsoft.com/office/drawing/2010/main">
+              <a14:hiddenFill xmlns:a14="http://schemas.microsoft.com/office/drawing/2010/main" xmlns="">
                 <a:solidFill>
                   <a:schemeClr val="accent1"/>
                 </a:solidFill>
               </a14:hiddenFill>
             </a:ext>
             <a:ext uri="{91240B29-F687-4F45-9708-019B960494DF}">
-              <a14:hiddenLine xmlns:a14="http://schemas.microsoft.com/office/drawing/2010/main" w="9525">
+              <a14:hiddenLine xmlns:a14="http://schemas.microsoft.com/office/drawing/2010/main" xmlns="" w="9525">
                 <a:solidFill>
                   <a:schemeClr val="tx1"/>
                 </a:solidFill>
@@ -20313,10 +20293,10 @@
           <p:nvPr/>
         </p:nvPicPr>
         <p:blipFill>
-          <a:blip r:embed="rId4">
+          <a:blip r:embed="rId4" cstate="print">
             <a:extLst>
               <a:ext uri="{28A0092B-C50C-407E-A947-70E740481C1C}">
-                <a14:useLocalDpi xmlns:a14="http://schemas.microsoft.com/office/drawing/2010/main" val="0"/>
+                <a14:useLocalDpi xmlns:a14="http://schemas.microsoft.com/office/drawing/2010/main" xmlns="" val="0"/>
               </a:ext>
             </a:extLst>
           </a:blip>
@@ -20339,14 +20319,14 @@
           </a:ln>
           <a:extLst>
             <a:ext uri="{909E8E84-426E-40DD-AFC4-6F175D3DCCD1}">
-              <a14:hiddenFill xmlns:a14="http://schemas.microsoft.com/office/drawing/2010/main">
+              <a14:hiddenFill xmlns:a14="http://schemas.microsoft.com/office/drawing/2010/main" xmlns="">
                 <a:solidFill>
                   <a:schemeClr val="accent1"/>
                 </a:solidFill>
               </a14:hiddenFill>
             </a:ext>
             <a:ext uri="{91240B29-F687-4F45-9708-019B960494DF}">
-              <a14:hiddenLine xmlns:a14="http://schemas.microsoft.com/office/drawing/2010/main" w="9525">
+              <a14:hiddenLine xmlns:a14="http://schemas.microsoft.com/office/drawing/2010/main" xmlns="" w="9525">
                 <a:solidFill>
                   <a:schemeClr val="tx1"/>
                 </a:solidFill>
@@ -20408,7 +20388,7 @@
                   <a:srgbClr val="00B050"/>
                 </a:solidFill>
               </a:rPr>
-              <a:t>27lutego</a:t>
+              <a:t>2 marca</a:t>
             </a:r>
             <a:endParaRPr lang="pl-PL" sz="950" b="1" dirty="0" smtClean="0">
               <a:solidFill>
@@ -20444,7 +20424,7 @@
     </p:spTree>
     <p:extLst>
       <p:ext uri="{BB962C8B-B14F-4D97-AF65-F5344CB8AC3E}">
-        <p14:creationId xmlns:p14="http://schemas.microsoft.com/office/powerpoint/2010/main" val="958256763"/>
+        <p14:creationId xmlns:p14="http://schemas.microsoft.com/office/powerpoint/2010/main" xmlns="" val="958256763"/>
       </p:ext>
     </p:extLst>
   </p:cSld>
@@ -20542,7 +20522,7 @@
           </a:ln>
           <a:extLst>
             <a:ext uri="{91240B29-F687-4F45-9708-019B960494DF}">
-              <a14:hiddenLine xmlns:a14="http://schemas.microsoft.com/office/drawing/2010/main" w="9525">
+              <a14:hiddenLine xmlns:a14="http://schemas.microsoft.com/office/drawing/2010/main" xmlns="" w="9525">
                 <a:solidFill>
                   <a:srgbClr val="000000"/>
                 </a:solidFill>
@@ -20972,7 +20952,7 @@
           <a:noFill/>
           <a:extLst>
             <a:ext uri="{91240B29-F687-4F45-9708-019B960494DF}">
-              <a14:hiddenLine xmlns:a14="http://schemas.microsoft.com/office/drawing/2010/main" w="9525">
+              <a14:hiddenLine xmlns:a14="http://schemas.microsoft.com/office/drawing/2010/main" xmlns="" w="9525">
                 <a:solidFill>
                   <a:srgbClr val="000000"/>
                 </a:solidFill>
@@ -21100,7 +21080,7 @@
                 </a:solidFill>
               </a:rPr>
               <a:pPr/>
-              <a:t>13-Feb-17</a:t>
+              <a:t>21-Feb-17</a:t>
             </a:fld>
             <a:endParaRPr lang="en-US" altLang="pl-PL" sz="900">
               <a:solidFill>
@@ -21124,7 +21104,7 @@
           <a:noFill/>
           <a:extLst>
             <a:ext uri="{91240B29-F687-4F45-9708-019B960494DF}">
-              <a14:hiddenLine xmlns:a14="http://schemas.microsoft.com/office/drawing/2010/main" w="9525">
+              <a14:hiddenLine xmlns:a14="http://schemas.microsoft.com/office/drawing/2010/main" xmlns="" w="9525">
                 <a:solidFill>
                   <a:srgbClr val="000000"/>
                 </a:solidFill>
@@ -21274,7 +21254,7 @@
           <a:noFill/>
           <a:extLst>
             <a:ext uri="{91240B29-F687-4F45-9708-019B960494DF}">
-              <a14:hiddenLine xmlns:a14="http://schemas.microsoft.com/office/drawing/2010/main" w="9525">
+              <a14:hiddenLine xmlns:a14="http://schemas.microsoft.com/office/drawing/2010/main" xmlns="" w="9525">
                 <a:solidFill>
                   <a:srgbClr val="000000"/>
                 </a:solidFill>
@@ -21627,7 +21607,7 @@
           <a:noFill/>
           <a:extLst>
             <a:ext uri="{91240B29-F687-4F45-9708-019B960494DF}">
-              <a14:hiddenLine xmlns:a14="http://schemas.microsoft.com/office/drawing/2010/main" w="9525">
+              <a14:hiddenLine xmlns:a14="http://schemas.microsoft.com/office/drawing/2010/main" xmlns="" w="9525">
                 <a:solidFill>
                   <a:srgbClr val="000000"/>
                 </a:solidFill>
@@ -21755,7 +21735,7 @@
                 </a:solidFill>
               </a:rPr>
               <a:pPr/>
-              <a:t>13-Feb-17</a:t>
+              <a:t>21-Feb-17</a:t>
             </a:fld>
             <a:endParaRPr lang="en-US" altLang="pl-PL" sz="900">
               <a:solidFill>
@@ -21779,7 +21759,7 @@
           <a:noFill/>
           <a:extLst>
             <a:ext uri="{91240B29-F687-4F45-9708-019B960494DF}">
-              <a14:hiddenLine xmlns:a14="http://schemas.microsoft.com/office/drawing/2010/main" w="9525">
+              <a14:hiddenLine xmlns:a14="http://schemas.microsoft.com/office/drawing/2010/main" xmlns="" w="9525">
                 <a:solidFill>
                   <a:srgbClr val="000000"/>
                 </a:solidFill>
@@ -21929,7 +21909,7 @@
           <a:noFill/>
           <a:extLst>
             <a:ext uri="{91240B29-F687-4F45-9708-019B960494DF}">
-              <a14:hiddenLine xmlns:a14="http://schemas.microsoft.com/office/drawing/2010/main" w="9525">
+              <a14:hiddenLine xmlns:a14="http://schemas.microsoft.com/office/drawing/2010/main" xmlns="" w="9525">
                 <a:solidFill>
                   <a:srgbClr val="000000"/>
                 </a:solidFill>
@@ -22076,10 +22056,10 @@
           <p:nvPr/>
         </p:nvPicPr>
         <p:blipFill>
-          <a:blip r:embed="rId2">
+          <a:blip r:embed="rId2" cstate="print">
             <a:extLst>
               <a:ext uri="{28A0092B-C50C-407E-A947-70E740481C1C}">
-                <a14:useLocalDpi xmlns:a14="http://schemas.microsoft.com/office/drawing/2010/main" val="0"/>
+                <a14:useLocalDpi xmlns:a14="http://schemas.microsoft.com/office/drawing/2010/main" xmlns="" val="0"/>
               </a:ext>
             </a:extLst>
           </a:blip>
@@ -22099,7 +22079,7 @@
           <a:noFill/>
           <a:extLst>
             <a:ext uri="{909E8E84-426E-40DD-AFC4-6F175D3DCCD1}">
-              <a14:hiddenFill xmlns:a14="http://schemas.microsoft.com/office/drawing/2010/main">
+              <a14:hiddenFill xmlns:a14="http://schemas.microsoft.com/office/drawing/2010/main" xmlns="">
                 <a:solidFill>
                   <a:srgbClr val="FFFFFF"/>
                 </a:solidFill>
@@ -22229,7 +22209,7 @@
           <a:blip r:embed="rId3" cstate="print">
             <a:extLst>
               <a:ext uri="{28A0092B-C50C-407E-A947-70E740481C1C}">
-                <a14:useLocalDpi xmlns:a14="http://schemas.microsoft.com/office/drawing/2010/main" val="0"/>
+                <a14:useLocalDpi xmlns:a14="http://schemas.microsoft.com/office/drawing/2010/main" xmlns="" val="0"/>
               </a:ext>
             </a:extLst>
           </a:blip>
@@ -22252,14 +22232,14 @@
           </a:ln>
           <a:extLst>
             <a:ext uri="{909E8E84-426E-40DD-AFC4-6F175D3DCCD1}">
-              <a14:hiddenFill xmlns:a14="http://schemas.microsoft.com/office/drawing/2010/main">
+              <a14:hiddenFill xmlns:a14="http://schemas.microsoft.com/office/drawing/2010/main" xmlns="">
                 <a:solidFill>
                   <a:schemeClr val="accent1"/>
                 </a:solidFill>
               </a14:hiddenFill>
             </a:ext>
             <a:ext uri="{91240B29-F687-4F45-9708-019B960494DF}">
-              <a14:hiddenLine xmlns:a14="http://schemas.microsoft.com/office/drawing/2010/main" w="9525">
+              <a14:hiddenLine xmlns:a14="http://schemas.microsoft.com/office/drawing/2010/main" xmlns="" w="9525">
                 <a:solidFill>
                   <a:schemeClr val="tx1"/>
                 </a:solidFill>
@@ -22392,7 +22372,7 @@
           <a:blip r:embed="rId4" cstate="print">
             <a:extLst>
               <a:ext uri="{28A0092B-C50C-407E-A947-70E740481C1C}">
-                <a14:useLocalDpi xmlns:a14="http://schemas.microsoft.com/office/drawing/2010/main" val="0"/>
+                <a14:useLocalDpi xmlns:a14="http://schemas.microsoft.com/office/drawing/2010/main" xmlns="" val="0"/>
               </a:ext>
             </a:extLst>
           </a:blip>
@@ -22412,7 +22392,7 @@
           <a:noFill/>
           <a:extLst>
             <a:ext uri="{909E8E84-426E-40DD-AFC4-6F175D3DCCD1}">
-              <a14:hiddenFill xmlns:a14="http://schemas.microsoft.com/office/drawing/2010/main">
+              <a14:hiddenFill xmlns:a14="http://schemas.microsoft.com/office/drawing/2010/main" xmlns="">
                 <a:solidFill>
                   <a:srgbClr val="FFFFFF"/>
                 </a:solidFill>
@@ -22556,7 +22536,7 @@
     </p:spTree>
     <p:extLst>
       <p:ext uri="{BB962C8B-B14F-4D97-AF65-F5344CB8AC3E}">
-        <p14:creationId xmlns:p14="http://schemas.microsoft.com/office/powerpoint/2010/main" val="2736078194"/>
+        <p14:creationId xmlns:p14="http://schemas.microsoft.com/office/powerpoint/2010/main" xmlns="" val="2736078194"/>
       </p:ext>
     </p:extLst>
   </p:cSld>
@@ -22967,7 +22947,7 @@
           <a:noFill/>
           <a:extLst>
             <a:ext uri="{91240B29-F687-4F45-9708-019B960494DF}">
-              <a14:hiddenLine xmlns:a14="http://schemas.microsoft.com/office/drawing/2010/main" w="9525">
+              <a14:hiddenLine xmlns:a14="http://schemas.microsoft.com/office/drawing/2010/main" xmlns="" w="9525">
                 <a:solidFill>
                   <a:srgbClr val="000000"/>
                 </a:solidFill>
@@ -23095,7 +23075,7 @@
                 </a:solidFill>
               </a:rPr>
               <a:pPr/>
-              <a:t>13-Feb-17</a:t>
+              <a:t>21-Feb-17</a:t>
             </a:fld>
             <a:endParaRPr lang="en-US" altLang="pl-PL" sz="900">
               <a:solidFill>
@@ -23119,7 +23099,7 @@
           <a:noFill/>
           <a:extLst>
             <a:ext uri="{91240B29-F687-4F45-9708-019B960494DF}">
-              <a14:hiddenLine xmlns:a14="http://schemas.microsoft.com/office/drawing/2010/main" w="9525">
+              <a14:hiddenLine xmlns:a14="http://schemas.microsoft.com/office/drawing/2010/main" xmlns="" w="9525">
                 <a:solidFill>
                   <a:srgbClr val="000000"/>
                 </a:solidFill>
@@ -23269,7 +23249,7 @@
           <a:noFill/>
           <a:extLst>
             <a:ext uri="{91240B29-F687-4F45-9708-019B960494DF}">
-              <a14:hiddenLine xmlns:a14="http://schemas.microsoft.com/office/drawing/2010/main" w="9525">
+              <a14:hiddenLine xmlns:a14="http://schemas.microsoft.com/office/drawing/2010/main" xmlns="" w="9525">
                 <a:solidFill>
                   <a:srgbClr val="000000"/>
                 </a:solidFill>
@@ -23414,7 +23394,7 @@
           <p:nvPr>
             <p:extLst>
               <p:ext uri="{D42A27DB-BD31-4B8C-83A1-F6EECF244321}">
-                <p14:modId xmlns:p14="http://schemas.microsoft.com/office/powerpoint/2010/main" val="573347322"/>
+                <p14:modId xmlns:p14="http://schemas.microsoft.com/office/powerpoint/2010/main" xmlns="" val="573347322"/>
               </p:ext>
             </p:extLst>
           </p:nvPr>
@@ -23432,7 +23412,7 @@
     </p:spTree>
     <p:extLst>
       <p:ext uri="{BB962C8B-B14F-4D97-AF65-F5344CB8AC3E}">
-        <p14:creationId xmlns:p14="http://schemas.microsoft.com/office/powerpoint/2010/main" val="670607410"/>
+        <p14:creationId xmlns:p14="http://schemas.microsoft.com/office/powerpoint/2010/main" xmlns="" val="670607410"/>
       </p:ext>
     </p:extLst>
   </p:cSld>
@@ -24035,7 +24015,7 @@
           <a:noFill/>
           <a:extLst>
             <a:ext uri="{91240B29-F687-4F45-9708-019B960494DF}">
-              <a14:hiddenLine xmlns:a14="http://schemas.microsoft.com/office/drawing/2010/main" w="9525">
+              <a14:hiddenLine xmlns:a14="http://schemas.microsoft.com/office/drawing/2010/main" xmlns="" w="9525">
                 <a:solidFill>
                   <a:srgbClr val="000000"/>
                 </a:solidFill>
@@ -24163,7 +24143,7 @@
                 </a:solidFill>
               </a:rPr>
               <a:pPr/>
-              <a:t>13-Feb-17</a:t>
+              <a:t>21-Feb-17</a:t>
             </a:fld>
             <a:endParaRPr lang="en-US" altLang="pl-PL" sz="900">
               <a:solidFill>
@@ -24187,7 +24167,7 @@
           <a:noFill/>
           <a:extLst>
             <a:ext uri="{91240B29-F687-4F45-9708-019B960494DF}">
-              <a14:hiddenLine xmlns:a14="http://schemas.microsoft.com/office/drawing/2010/main" w="9525">
+              <a14:hiddenLine xmlns:a14="http://schemas.microsoft.com/office/drawing/2010/main" xmlns="" w="9525">
                 <a:solidFill>
                   <a:srgbClr val="000000"/>
                 </a:solidFill>
@@ -24337,7 +24317,7 @@
           <a:noFill/>
           <a:extLst>
             <a:ext uri="{91240B29-F687-4F45-9708-019B960494DF}">
-              <a14:hiddenLine xmlns:a14="http://schemas.microsoft.com/office/drawing/2010/main" w="9525">
+              <a14:hiddenLine xmlns:a14="http://schemas.microsoft.com/office/drawing/2010/main" xmlns="" w="9525">
                 <a:solidFill>
                   <a:srgbClr val="000000"/>
                 </a:solidFill>
@@ -24482,7 +24462,7 @@
           <p:nvPr>
             <p:extLst>
               <p:ext uri="{D42A27DB-BD31-4B8C-83A1-F6EECF244321}">
-                <p14:modId xmlns:p14="http://schemas.microsoft.com/office/powerpoint/2010/main" val="1835432058"/>
+                <p14:modId xmlns:p14="http://schemas.microsoft.com/office/powerpoint/2010/main" xmlns="" val="1835432058"/>
               </p:ext>
             </p:extLst>
           </p:nvPr>
@@ -24500,7 +24480,7 @@
     </p:spTree>
     <p:extLst>
       <p:ext uri="{BB962C8B-B14F-4D97-AF65-F5344CB8AC3E}">
-        <p14:creationId xmlns:p14="http://schemas.microsoft.com/office/powerpoint/2010/main" val="401109775"/>
+        <p14:creationId xmlns:p14="http://schemas.microsoft.com/office/powerpoint/2010/main" xmlns="" val="401109775"/>
       </p:ext>
     </p:extLst>
   </p:cSld>
@@ -24907,7 +24887,7 @@
           <a:noFill/>
           <a:extLst>
             <a:ext uri="{91240B29-F687-4F45-9708-019B960494DF}">
-              <a14:hiddenLine xmlns:a14="http://schemas.microsoft.com/office/drawing/2010/main" w="9525">
+              <a14:hiddenLine xmlns:a14="http://schemas.microsoft.com/office/drawing/2010/main" xmlns="" w="9525">
                 <a:solidFill>
                   <a:srgbClr val="000000"/>
                 </a:solidFill>
@@ -25035,7 +25015,7 @@
                 </a:solidFill>
               </a:rPr>
               <a:pPr/>
-              <a:t>13-Feb-17</a:t>
+              <a:t>21-Feb-17</a:t>
             </a:fld>
             <a:endParaRPr lang="en-US" altLang="pl-PL" sz="900">
               <a:solidFill>
@@ -25059,7 +25039,7 @@
           <a:noFill/>
           <a:extLst>
             <a:ext uri="{91240B29-F687-4F45-9708-019B960494DF}">
-              <a14:hiddenLine xmlns:a14="http://schemas.microsoft.com/office/drawing/2010/main" w="9525">
+              <a14:hiddenLine xmlns:a14="http://schemas.microsoft.com/office/drawing/2010/main" xmlns="" w="9525">
                 <a:solidFill>
                   <a:srgbClr val="000000"/>
                 </a:solidFill>
@@ -25209,7 +25189,7 @@
           <a:noFill/>
           <a:extLst>
             <a:ext uri="{91240B29-F687-4F45-9708-019B960494DF}">
-              <a14:hiddenLine xmlns:a14="http://schemas.microsoft.com/office/drawing/2010/main" w="9525">
+              <a14:hiddenLine xmlns:a14="http://schemas.microsoft.com/office/drawing/2010/main" xmlns="" w="9525">
                 <a:solidFill>
                   <a:srgbClr val="000000"/>
                 </a:solidFill>
@@ -25354,7 +25334,7 @@
           <p:nvPr>
             <p:extLst>
               <p:ext uri="{D42A27DB-BD31-4B8C-83A1-F6EECF244321}">
-                <p14:modId xmlns:p14="http://schemas.microsoft.com/office/powerpoint/2010/main" val="188920010"/>
+                <p14:modId xmlns:p14="http://schemas.microsoft.com/office/powerpoint/2010/main" xmlns="" val="188920010"/>
               </p:ext>
             </p:extLst>
           </p:nvPr>
@@ -25372,7 +25352,7 @@
     </p:spTree>
     <p:extLst>
       <p:ext uri="{BB962C8B-B14F-4D97-AF65-F5344CB8AC3E}">
-        <p14:creationId xmlns:p14="http://schemas.microsoft.com/office/powerpoint/2010/main" val="946513416"/>
+        <p14:creationId xmlns:p14="http://schemas.microsoft.com/office/powerpoint/2010/main" xmlns="" val="946513416"/>
       </p:ext>
     </p:extLst>
   </p:cSld>
@@ -25975,7 +25955,7 @@
           <a:noFill/>
           <a:extLst>
             <a:ext uri="{91240B29-F687-4F45-9708-019B960494DF}">
-              <a14:hiddenLine xmlns:a14="http://schemas.microsoft.com/office/drawing/2010/main" w="9525">
+              <a14:hiddenLine xmlns:a14="http://schemas.microsoft.com/office/drawing/2010/main" xmlns="" w="9525">
                 <a:solidFill>
                   <a:srgbClr val="000000"/>
                 </a:solidFill>
@@ -26103,7 +26083,7 @@
                 </a:solidFill>
               </a:rPr>
               <a:pPr/>
-              <a:t>13-Feb-17</a:t>
+              <a:t>21-Feb-17</a:t>
             </a:fld>
             <a:endParaRPr lang="en-US" altLang="pl-PL" sz="900">
               <a:solidFill>
@@ -26127,7 +26107,7 @@
           <a:noFill/>
           <a:extLst>
             <a:ext uri="{91240B29-F687-4F45-9708-019B960494DF}">
-              <a14:hiddenLine xmlns:a14="http://schemas.microsoft.com/office/drawing/2010/main" w="9525">
+              <a14:hiddenLine xmlns:a14="http://schemas.microsoft.com/office/drawing/2010/main" xmlns="" w="9525">
                 <a:solidFill>
                   <a:srgbClr val="000000"/>
                 </a:solidFill>
@@ -26277,7 +26257,7 @@
           <a:noFill/>
           <a:extLst>
             <a:ext uri="{91240B29-F687-4F45-9708-019B960494DF}">
-              <a14:hiddenLine xmlns:a14="http://schemas.microsoft.com/office/drawing/2010/main" w="9525">
+              <a14:hiddenLine xmlns:a14="http://schemas.microsoft.com/office/drawing/2010/main" xmlns="" w="9525">
                 <a:solidFill>
                   <a:srgbClr val="000000"/>
                 </a:solidFill>
@@ -26504,7 +26484,7 @@
     </p:spTree>
     <p:extLst>
       <p:ext uri="{BB962C8B-B14F-4D97-AF65-F5344CB8AC3E}">
-        <p14:creationId xmlns:p14="http://schemas.microsoft.com/office/powerpoint/2010/main" val="1780986173"/>
+        <p14:creationId xmlns:p14="http://schemas.microsoft.com/office/powerpoint/2010/main" xmlns="" val="1780986173"/>
       </p:ext>
     </p:extLst>
   </p:cSld>
@@ -26587,7 +26567,7 @@
           <a:noFill/>
           <a:extLst>
             <a:ext uri="{91240B29-F687-4F45-9708-019B960494DF}">
-              <a14:hiddenLine xmlns:a14="http://schemas.microsoft.com/office/drawing/2010/main" w="9525">
+              <a14:hiddenLine xmlns:a14="http://schemas.microsoft.com/office/drawing/2010/main" xmlns="" w="9525">
                 <a:solidFill>
                   <a:srgbClr val="000000"/>
                 </a:solidFill>
@@ -26715,7 +26695,7 @@
                 </a:solidFill>
               </a:rPr>
               <a:pPr/>
-              <a:t>13-Feb-17</a:t>
+              <a:t>21-Feb-17</a:t>
             </a:fld>
             <a:endParaRPr lang="en-US" altLang="pl-PL" sz="900">
               <a:solidFill>
@@ -26739,7 +26719,7 @@
           <a:noFill/>
           <a:extLst>
             <a:ext uri="{91240B29-F687-4F45-9708-019B960494DF}">
-              <a14:hiddenLine xmlns:a14="http://schemas.microsoft.com/office/drawing/2010/main" w="9525">
+              <a14:hiddenLine xmlns:a14="http://schemas.microsoft.com/office/drawing/2010/main" xmlns="" w="9525">
                 <a:solidFill>
                   <a:srgbClr val="000000"/>
                 </a:solidFill>
@@ -26889,7 +26869,7 @@
           <a:noFill/>
           <a:extLst>
             <a:ext uri="{91240B29-F687-4F45-9708-019B960494DF}">
-              <a14:hiddenLine xmlns:a14="http://schemas.microsoft.com/office/drawing/2010/main" w="9525">
+              <a14:hiddenLine xmlns:a14="http://schemas.microsoft.com/office/drawing/2010/main" xmlns="" w="9525">
                 <a:solidFill>
                   <a:srgbClr val="000000"/>
                 </a:solidFill>
@@ -27034,7 +27014,7 @@
           <p:nvPr>
             <p:extLst>
               <p:ext uri="{D42A27DB-BD31-4B8C-83A1-F6EECF244321}">
-                <p14:modId xmlns:p14="http://schemas.microsoft.com/office/powerpoint/2010/main" val="1049449028"/>
+                <p14:modId xmlns:p14="http://schemas.microsoft.com/office/powerpoint/2010/main" xmlns="" val="1049449028"/>
               </p:ext>
             </p:extLst>
           </p:nvPr>
@@ -27052,7 +27032,7 @@
     </p:spTree>
     <p:extLst>
       <p:ext uri="{BB962C8B-B14F-4D97-AF65-F5344CB8AC3E}">
-        <p14:creationId xmlns:p14="http://schemas.microsoft.com/office/powerpoint/2010/main" val="3632515949"/>
+        <p14:creationId xmlns:p14="http://schemas.microsoft.com/office/powerpoint/2010/main" xmlns="" val="3632515949"/>
       </p:ext>
     </p:extLst>
   </p:cSld>
@@ -27459,7 +27439,7 @@
           <a:noFill/>
           <a:extLst>
             <a:ext uri="{91240B29-F687-4F45-9708-019B960494DF}">
-              <a14:hiddenLine xmlns:a14="http://schemas.microsoft.com/office/drawing/2010/main" w="9525">
+              <a14:hiddenLine xmlns:a14="http://schemas.microsoft.com/office/drawing/2010/main" xmlns="" w="9525">
                 <a:solidFill>
                   <a:srgbClr val="000000"/>
                 </a:solidFill>
@@ -27587,7 +27567,7 @@
                 </a:solidFill>
               </a:rPr>
               <a:pPr/>
-              <a:t>13-Feb-17</a:t>
+              <a:t>21-Feb-17</a:t>
             </a:fld>
             <a:endParaRPr lang="en-US" altLang="pl-PL" sz="900">
               <a:solidFill>
@@ -27611,7 +27591,7 @@
           <a:noFill/>
           <a:extLst>
             <a:ext uri="{91240B29-F687-4F45-9708-019B960494DF}">
-              <a14:hiddenLine xmlns:a14="http://schemas.microsoft.com/office/drawing/2010/main" w="9525">
+              <a14:hiddenLine xmlns:a14="http://schemas.microsoft.com/office/drawing/2010/main" xmlns="" w="9525">
                 <a:solidFill>
                   <a:srgbClr val="000000"/>
                 </a:solidFill>
@@ -27761,7 +27741,7 @@
           <a:noFill/>
           <a:extLst>
             <a:ext uri="{91240B29-F687-4F45-9708-019B960494DF}">
-              <a14:hiddenLine xmlns:a14="http://schemas.microsoft.com/office/drawing/2010/main" w="9525">
+              <a14:hiddenLine xmlns:a14="http://schemas.microsoft.com/office/drawing/2010/main" xmlns="" w="9525">
                 <a:solidFill>
                   <a:srgbClr val="000000"/>
                 </a:solidFill>
@@ -27908,7 +27888,7 @@
           <p:nvPr>
             <p:extLst>
               <p:ext uri="{D42A27DB-BD31-4B8C-83A1-F6EECF244321}">
-                <p14:modId xmlns:p14="http://schemas.microsoft.com/office/powerpoint/2010/main" val="3524606262"/>
+                <p14:modId xmlns:p14="http://schemas.microsoft.com/office/powerpoint/2010/main" xmlns="" val="3524606262"/>
               </p:ext>
             </p:extLst>
           </p:nvPr>
@@ -28001,11 +27981,7 @@
                     <a:p>
                       <a:r>
                         <a:rPr lang="pl-PL" sz="1100" baseline="0" dirty="0" smtClean="0"/>
-                        <a:t>(pozostało 14 </a:t>
-                      </a:r>
-                      <a:r>
-                        <a:rPr lang="pl-PL" sz="1100" baseline="0" dirty="0" smtClean="0"/>
-                        <a:t>zajęć </a:t>
+                        <a:t>(pozostało 14 zajęć </a:t>
                       </a:r>
                       <a:r>
                         <a:rPr lang="pl-PL" sz="1100" baseline="0" dirty="0" smtClean="0">
@@ -28342,7 +28318,7 @@
           <p:nvPr>
             <p:extLst>
               <p:ext uri="{D42A27DB-BD31-4B8C-83A1-F6EECF244321}">
-                <p14:modId xmlns:p14="http://schemas.microsoft.com/office/powerpoint/2010/main" val="3857556710"/>
+                <p14:modId xmlns:p14="http://schemas.microsoft.com/office/powerpoint/2010/main" xmlns="" val="3857556710"/>
               </p:ext>
             </p:extLst>
           </p:nvPr>
@@ -28606,7 +28582,7 @@
     </p:spTree>
     <p:extLst>
       <p:ext uri="{BB962C8B-B14F-4D97-AF65-F5344CB8AC3E}">
-        <p14:creationId xmlns:p14="http://schemas.microsoft.com/office/powerpoint/2010/main" val="393837832"/>
+        <p14:creationId xmlns:p14="http://schemas.microsoft.com/office/powerpoint/2010/main" xmlns="" val="393837832"/>
       </p:ext>
     </p:extLst>
   </p:cSld>
@@ -29157,7 +29133,7 @@
   </a:extraClrSchemeLst>
   <a:extLst>
     <a:ext uri="{05A4C25C-085E-4340-85A3-A5531E510DB2}">
-      <thm15:themeFamily xmlns:thm15="http://schemas.microsoft.com/office/thememl/2012/main" name="v5_GFT_MASTER.potx" id="{0499BC36-F504-48FE-B624-679107AB1F18}" vid="{304785FB-A37F-4ED5-A32C-8677DED9BBC6}"/>
+      <thm15:themeFamily xmlns:thm15="http://schemas.microsoft.com/office/thememl/2012/main" xmlns="" name="v5_GFT_MASTER.potx" id="{0499BC36-F504-48FE-B624-679107AB1F18}" vid="{304785FB-A37F-4ED5-A32C-8677DED9BBC6}"/>
     </a:ext>
   </a:extLst>
 </a:theme>
@@ -29730,6 +29706,21 @@
 </file>
 
 <file path=customXml/item1.xml><?xml version="1.0" encoding="utf-8"?>
+<p:properties xmlns:p="http://schemas.microsoft.com/office/2006/metadata/properties" xmlns:xsi="http://www.w3.org/2001/XMLSchema-instance" xmlns:pc="http://schemas.microsoft.com/office/infopath/2007/PartnerControls">
+  <documentManagement/>
+</p:properties>
+</file>
+
+<file path=customXml/item2.xml><?xml version="1.0" encoding="utf-8"?>
+<?mso-contentType ?>
+<FormTemplates xmlns="http://schemas.microsoft.com/sharepoint/v3/contenttype/forms">
+  <Display>DocumentLibraryForm</Display>
+  <Edit>DocumentLibraryForm</Edit>
+  <New>DocumentLibraryForm</New>
+</FormTemplates>
+</file>
+
+<file path=customXml/item3.xml><?xml version="1.0" encoding="utf-8"?>
 <ct:contentTypeSchema xmlns:ct="http://schemas.microsoft.com/office/2006/metadata/contentType" xmlns:ma="http://schemas.microsoft.com/office/2006/metadata/properties/metaAttributes" ct:_="" ma:_="" ma:contentTypeName="Dokument" ma:contentTypeID="0x010100AA54360A2A4C9D41BAEAEC5B88091E96" ma:contentTypeVersion="0" ma:contentTypeDescription="Ein neues Dokument erstellen." ma:contentTypeScope="" ma:versionID="adbe31085c672446fb9e5148d79a6dc6">
   <xsd:schema xmlns:xsd="http://www.w3.org/2001/XMLSchema" xmlns:xs="http://www.w3.org/2001/XMLSchema" xmlns:p="http://schemas.microsoft.com/office/2006/metadata/properties" targetNamespace="http://schemas.microsoft.com/office/2006/metadata/properties" ma:root="true" ma:fieldsID="cb715de677b26ad619381b53932d724a">
     <xsd:element name="properties">
@@ -29843,22 +29834,30 @@
 </ct:contentTypeSchema>
 </file>
 
-<file path=customXml/item2.xml><?xml version="1.0" encoding="utf-8"?>
-<?mso-contentType ?>
-<FormTemplates xmlns="http://schemas.microsoft.com/sharepoint/v3/contenttype/forms">
-  <Display>DocumentLibraryForm</Display>
-  <Edit>DocumentLibraryForm</Edit>
-  <New>DocumentLibraryForm</New>
-</FormTemplates>
+<file path=customXml/itemProps1.xml><?xml version="1.0" encoding="utf-8"?>
+<ds:datastoreItem xmlns:ds="http://schemas.openxmlformats.org/officeDocument/2006/customXml" ds:itemID="{5405BF3B-1233-4D26-8BBF-BED295340DF6}">
+  <ds:schemaRefs>
+    <ds:schemaRef ds:uri="http://purl.org/dc/terms/"/>
+    <ds:schemaRef ds:uri="http://schemas.openxmlformats.org/package/2006/metadata/core-properties"/>
+    <ds:schemaRef ds:uri="http://schemas.microsoft.com/office/2006/documentManagement/types"/>
+    <ds:schemaRef ds:uri="http://schemas.microsoft.com/office/infopath/2007/PartnerControls"/>
+    <ds:schemaRef ds:uri="http://purl.org/dc/elements/1.1/"/>
+    <ds:schemaRef ds:uri="http://schemas.microsoft.com/office/2006/metadata/properties"/>
+    <ds:schemaRef ds:uri="http://www.w3.org/XML/1998/namespace"/>
+    <ds:schemaRef ds:uri="http://purl.org/dc/dcmitype/"/>
+  </ds:schemaRefs>
+</ds:datastoreItem>
 </file>
 
-<file path=customXml/item3.xml><?xml version="1.0" encoding="utf-8"?>
-<p:properties xmlns:p="http://schemas.microsoft.com/office/2006/metadata/properties" xmlns:xsi="http://www.w3.org/2001/XMLSchema-instance" xmlns:pc="http://schemas.microsoft.com/office/infopath/2007/PartnerControls">
-  <documentManagement/>
-</p:properties>
+<file path=customXml/itemProps2.xml><?xml version="1.0" encoding="utf-8"?>
+<ds:datastoreItem xmlns:ds="http://schemas.openxmlformats.org/officeDocument/2006/customXml" ds:itemID="{A99115DC-C02A-4EF3-990D-5FF7CC0EE91A}">
+  <ds:schemaRefs>
+    <ds:schemaRef ds:uri="http://schemas.microsoft.com/sharepoint/v3/contenttype/forms"/>
+  </ds:schemaRefs>
+</ds:datastoreItem>
 </file>
 
-<file path=customXml/itemProps1.xml><?xml version="1.0" encoding="utf-8"?>
+<file path=customXml/itemProps3.xml><?xml version="1.0" encoding="utf-8"?>
 <ds:datastoreItem xmlns:ds="http://schemas.openxmlformats.org/officeDocument/2006/customXml" ds:itemID="{C17FC477-C6F3-4824-AF67-67A952D7D3F1}">
   <ds:schemaRefs>
     <ds:schemaRef ds:uri="http://schemas.microsoft.com/office/2006/metadata/contentType"/>
@@ -29872,27 +29871,4 @@
     <ds:schemaRef ds:uri="http://schemas.microsoft.com/office/infopath/2007/PartnerControls"/>
   </ds:schemaRefs>
 </ds:datastoreItem>
-</file>
-
-<file path=customXml/itemProps2.xml><?xml version="1.0" encoding="utf-8"?>
-<ds:datastoreItem xmlns:ds="http://schemas.openxmlformats.org/officeDocument/2006/customXml" ds:itemID="{A99115DC-C02A-4EF3-990D-5FF7CC0EE91A}">
-  <ds:schemaRefs>
-    <ds:schemaRef ds:uri="http://schemas.microsoft.com/sharepoint/v3/contenttype/forms"/>
-  </ds:schemaRefs>
-</ds:datastoreItem>
-</file>
-
-<file path=customXml/itemProps3.xml><?xml version="1.0" encoding="utf-8"?>
-<ds:datastoreItem xmlns:ds="http://schemas.openxmlformats.org/officeDocument/2006/customXml" ds:itemID="{5405BF3B-1233-4D26-8BBF-BED295340DF6}">
-  <ds:schemaRefs>
-    <ds:schemaRef ds:uri="http://purl.org/dc/terms/"/>
-    <ds:schemaRef ds:uri="http://schemas.openxmlformats.org/package/2006/metadata/core-properties"/>
-    <ds:schemaRef ds:uri="http://schemas.microsoft.com/office/2006/documentManagement/types"/>
-    <ds:schemaRef ds:uri="http://schemas.microsoft.com/office/infopath/2007/PartnerControls"/>
-    <ds:schemaRef ds:uri="http://purl.org/dc/elements/1.1/"/>
-    <ds:schemaRef ds:uri="http://schemas.microsoft.com/office/2006/metadata/properties"/>
-    <ds:schemaRef ds:uri="http://www.w3.org/XML/1998/namespace"/>
-    <ds:schemaRef ds:uri="http://purl.org/dc/dcmitype/"/>
-  </ds:schemaRefs>
-</ds:datastoreItem>
 </file>
</xml_diff>

<commit_message>
Update for GutHUb repo location
</commit_message>
<xml_diff>
--- a/WDSR - zarys programu.pptx
+++ b/WDSR - zarys programu.pptx
@@ -155,7 +155,7 @@
   </p:defaultTextStyle>
   <p:extLst>
     <p:ext uri="{EFAFB233-063F-42B5-8137-9DF3F51BA10A}">
-      <p15:sldGuideLst xmlns:p15="http://schemas.microsoft.com/office/powerpoint/2012/main" xmlns="">
+      <p15:sldGuideLst xmlns:p15="http://schemas.microsoft.com/office/powerpoint/2012/main">
         <p15:guide id="1" orient="horz" pos="2160">
           <p15:clr>
             <a:srgbClr val="A4A3A4"/>
@@ -169,7 +169,7 @@
       </p15:sldGuideLst>
     </p:ext>
     <p:ext uri="{2D200454-40CA-4A62-9FC3-DE9A4176ACB9}">
-      <p15:notesGuideLst xmlns:p15="http://schemas.microsoft.com/office/powerpoint/2012/main" xmlns=""/>
+      <p15:notesGuideLst xmlns:p15="http://schemas.microsoft.com/office/powerpoint/2012/main"/>
     </p:ext>
   </p:extLst>
 </p:presentation>
@@ -3755,29 +3755,29 @@
     </dgm:pt>
   </dgm:ptLst>
   <dgm:cxnLst>
+    <dgm:cxn modelId="{A643151B-3E22-4B18-8884-B35007EC6172}" srcId="{E07D3DF8-B531-453C-B599-898D9D03A724}" destId="{A6C8BD6C-B3B2-4605-8970-343DCDE52EF2}" srcOrd="4" destOrd="0" parTransId="{B4F2E15E-1C80-4166-8AB2-D3523720A631}" sibTransId="{1DEDE7B7-B08A-462B-8B72-29F3AA43F8B3}"/>
     <dgm:cxn modelId="{0CCCD3B3-D207-4257-AF84-B8775E8A0D94}" type="presOf" srcId="{1691F446-2C4D-4079-9D16-C341031FF10A}" destId="{5EE99CAA-C70B-49D9-9943-E42F93D8C815}" srcOrd="0" destOrd="0" presId="urn:microsoft.com/office/officeart/2005/8/layout/vList2"/>
-    <dgm:cxn modelId="{F76D688E-0948-47EA-A549-7D65A1582F49}" type="presOf" srcId="{A6C8BD6C-B3B2-4605-8970-343DCDE52EF2}" destId="{5AF62516-935A-4716-BC3C-96D1A9708875}" srcOrd="0" destOrd="0" presId="urn:microsoft.com/office/officeart/2005/8/layout/vList2"/>
+    <dgm:cxn modelId="{C645250B-999A-4C4B-B0D9-55ADA0CE32A4}" srcId="{D6EE5DE8-77E8-4922-A9C6-F365BBE83A79}" destId="{5A0F2CBC-D6CD-4367-8680-42DC6E42144E}" srcOrd="0" destOrd="0" parTransId="{2DDB378C-5C3B-4863-911A-3B31766CAA26}" sibTransId="{DBC07F86-E648-42B6-92D9-074FCD1F5866}"/>
+    <dgm:cxn modelId="{548A0F74-DBD6-46F8-9FF7-68DA0AB3A980}" srcId="{CB61399F-1A2D-42E5-8BED-9711DCC11731}" destId="{21F8D68D-EA5A-4A42-BBF1-FE8E7480EBDF}" srcOrd="0" destOrd="0" parTransId="{6A6B22FF-C327-472B-90B5-9F5FC64B0C98}" sibTransId="{AEE67130-E96F-4C8F-8A94-E077723513D2}"/>
+    <dgm:cxn modelId="{C087B476-0ECB-4B01-B85A-EE7A409D083F}" srcId="{A6C8BD6C-B3B2-4605-8970-343DCDE52EF2}" destId="{1691F446-2C4D-4079-9D16-C341031FF10A}" srcOrd="0" destOrd="0" parTransId="{DCA4AE69-92CF-4492-A9CA-C35A56BC76BB}" sibTransId="{05219947-3651-4DBB-9B49-DF587987A035}"/>
+    <dgm:cxn modelId="{0AFFA354-5C02-4BC8-9F90-6CB7F9AFE621}" type="presOf" srcId="{2D36E825-4ACE-45FF-9A82-A07828909465}" destId="{401ECA87-A414-4C2E-815B-2E740FECD9DF}" srcOrd="0" destOrd="0" presId="urn:microsoft.com/office/officeart/2005/8/layout/vList2"/>
     <dgm:cxn modelId="{BD83DB13-AF8E-45F1-8C52-C6D500289627}" srcId="{53EFCA86-4B4F-4BDE-9322-06215FFCFCBF}" destId="{D941E3BF-98DE-4282-B4DB-54913C6EC119}" srcOrd="0" destOrd="0" parTransId="{AA5B2974-F7E5-4CC9-83B2-B8740E8231AC}" sibTransId="{DDFB1F4D-E32E-4565-9580-62BBB3128E9E}"/>
-    <dgm:cxn modelId="{8D8C4E95-60C9-480E-9C5F-EE033220E80F}" srcId="{E07D3DF8-B531-453C-B599-898D9D03A724}" destId="{D6EE5DE8-77E8-4922-A9C6-F365BBE83A79}" srcOrd="1" destOrd="0" parTransId="{8DA20819-D089-451F-B155-BEB2F31ACDE1}" sibTransId="{B04399C4-AD34-48A2-83F1-5DE748533820}"/>
+    <dgm:cxn modelId="{C7B1D9FF-5D60-42D7-959C-33E79E337AF9}" type="presOf" srcId="{21F8D68D-EA5A-4A42-BBF1-FE8E7480EBDF}" destId="{9C495DF5-169D-4A31-B3DB-88DFF8C7AB22}" srcOrd="0" destOrd="0" presId="urn:microsoft.com/office/officeart/2005/8/layout/vList2"/>
+    <dgm:cxn modelId="{6C00EABA-6F4F-4A66-86A2-B21FF967D541}" srcId="{E07D3DF8-B531-453C-B599-898D9D03A724}" destId="{CB61399F-1A2D-42E5-8BED-9711DCC11731}" srcOrd="3" destOrd="0" parTransId="{7AE97EF6-8A82-49B0-B4CC-14B044F0451A}" sibTransId="{2AF9AD82-5FDD-4C7C-B9BF-B03397D23B2C}"/>
+    <dgm:cxn modelId="{649E1C9A-C4FD-4E90-9094-E80372FE3B54}" srcId="{E07D3DF8-B531-453C-B599-898D9D03A724}" destId="{2D36E825-4ACE-45FF-9A82-A07828909465}" srcOrd="0" destOrd="0" parTransId="{B4AFEE9B-1623-480E-AD65-DE7486D44E39}" sibTransId="{3CA66D8E-C79A-4301-B374-30BE44E4CC8F}"/>
     <dgm:cxn modelId="{A9BFA2C8-954A-4FE2-97AA-0009721AAFC5}" type="presOf" srcId="{5A0F2CBC-D6CD-4367-8680-42DC6E42144E}" destId="{0FB52419-7EF2-4113-8849-3B16BAEC9DD7}" srcOrd="0" destOrd="0" presId="urn:microsoft.com/office/officeart/2005/8/layout/vList2"/>
     <dgm:cxn modelId="{4FFEC5CB-4856-4516-B3A5-4EFCD07F5A88}" type="presOf" srcId="{CB61399F-1A2D-42E5-8BED-9711DCC11731}" destId="{78DA6840-523F-44DE-8870-8809A7BF9028}" srcOrd="0" destOrd="0" presId="urn:microsoft.com/office/officeart/2005/8/layout/vList2"/>
+    <dgm:cxn modelId="{5D734A43-4A03-4A3B-B7F1-B29B10CCBE03}" type="presOf" srcId="{E07D3DF8-B531-453C-B599-898D9D03A724}" destId="{AE563F13-1AA5-450D-9916-2F11638C1DA9}" srcOrd="0" destOrd="0" presId="urn:microsoft.com/office/officeart/2005/8/layout/vList2"/>
+    <dgm:cxn modelId="{0BA1EE72-EF87-4D62-8BBC-9B12C0A66E28}" type="presOf" srcId="{D941E3BF-98DE-4282-B4DB-54913C6EC119}" destId="{3FFC3410-A2D0-4B28-A055-BFAC61BCB93F}" srcOrd="0" destOrd="0" presId="urn:microsoft.com/office/officeart/2005/8/layout/vList2"/>
+    <dgm:cxn modelId="{4992FD39-C66E-4832-A5F1-11781180184C}" type="presOf" srcId="{2CE68B19-4D7E-4DE2-8DC6-889BE6ABFD76}" destId="{C7130AF6-5BCF-4F29-BA34-95CB85B72764}" srcOrd="0" destOrd="1" presId="urn:microsoft.com/office/officeart/2005/8/layout/vList2"/>
+    <dgm:cxn modelId="{AE0D4A5E-017A-4636-8B86-9F08FCDA9C67}" srcId="{2D36E825-4ACE-45FF-9A82-A07828909465}" destId="{2CE68B19-4D7E-4DE2-8DC6-889BE6ABFD76}" srcOrd="1" destOrd="0" parTransId="{9F41A284-99E6-4545-BAF2-D2D9EA5E21B0}" sibTransId="{11F39526-C1AA-446A-809B-D9D4132A4E51}"/>
+    <dgm:cxn modelId="{16B41F11-0943-4602-ABD2-F3D16EECCA72}" type="presOf" srcId="{D6EE5DE8-77E8-4922-A9C6-F365BBE83A79}" destId="{376597F5-777C-4886-9496-C2590412E54E}" srcOrd="0" destOrd="0" presId="urn:microsoft.com/office/officeart/2005/8/layout/vList2"/>
+    <dgm:cxn modelId="{8D8C4E95-60C9-480E-9C5F-EE033220E80F}" srcId="{E07D3DF8-B531-453C-B599-898D9D03A724}" destId="{D6EE5DE8-77E8-4922-A9C6-F365BBE83A79}" srcOrd="1" destOrd="0" parTransId="{8DA20819-D089-451F-B155-BEB2F31ACDE1}" sibTransId="{B04399C4-AD34-48A2-83F1-5DE748533820}"/>
+    <dgm:cxn modelId="{F76D688E-0948-47EA-A549-7D65A1582F49}" type="presOf" srcId="{A6C8BD6C-B3B2-4605-8970-343DCDE52EF2}" destId="{5AF62516-935A-4716-BC3C-96D1A9708875}" srcOrd="0" destOrd="0" presId="urn:microsoft.com/office/officeart/2005/8/layout/vList2"/>
+    <dgm:cxn modelId="{2C2228F0-1DA1-4549-8ABC-794586086176}" srcId="{E07D3DF8-B531-453C-B599-898D9D03A724}" destId="{53EFCA86-4B4F-4BDE-9322-06215FFCFCBF}" srcOrd="2" destOrd="0" parTransId="{6F8E2E0C-0D28-4F6E-A0F7-62F820350508}" sibTransId="{06D6753B-B082-4C36-B61B-1650AF337FFC}"/>
+    <dgm:cxn modelId="{9D36F30C-4180-4DB2-BAE7-240B33A3EF2C}" type="presOf" srcId="{53EFCA86-4B4F-4BDE-9322-06215FFCFCBF}" destId="{AF79282F-4587-49CB-B714-735A3E3EDCB9}" srcOrd="0" destOrd="0" presId="urn:microsoft.com/office/officeart/2005/8/layout/vList2"/>
+    <dgm:cxn modelId="{F66F8873-F080-4ED4-A831-58841009DADE}" type="presOf" srcId="{38F77422-9DC2-4461-90F4-808381EB6C65}" destId="{C7130AF6-5BCF-4F29-BA34-95CB85B72764}" srcOrd="0" destOrd="0" presId="urn:microsoft.com/office/officeart/2005/8/layout/vList2"/>
     <dgm:cxn modelId="{8D5CBEEA-BF3A-4A31-9C1A-49FEF53E1159}" srcId="{2D36E825-4ACE-45FF-9A82-A07828909465}" destId="{38F77422-9DC2-4461-90F4-808381EB6C65}" srcOrd="0" destOrd="0" parTransId="{7E42520C-05FF-4542-92ED-FFCB90C662C0}" sibTransId="{5D5F5B14-0F69-49D6-8F3A-089808006D11}"/>
-    <dgm:cxn modelId="{5D734A43-4A03-4A3B-B7F1-B29B10CCBE03}" type="presOf" srcId="{E07D3DF8-B531-453C-B599-898D9D03A724}" destId="{AE563F13-1AA5-450D-9916-2F11638C1DA9}" srcOrd="0" destOrd="0" presId="urn:microsoft.com/office/officeart/2005/8/layout/vList2"/>
-    <dgm:cxn modelId="{C7B1D9FF-5D60-42D7-959C-33E79E337AF9}" type="presOf" srcId="{21F8D68D-EA5A-4A42-BBF1-FE8E7480EBDF}" destId="{9C495DF5-169D-4A31-B3DB-88DFF8C7AB22}" srcOrd="0" destOrd="0" presId="urn:microsoft.com/office/officeart/2005/8/layout/vList2"/>
-    <dgm:cxn modelId="{9D36F30C-4180-4DB2-BAE7-240B33A3EF2C}" type="presOf" srcId="{53EFCA86-4B4F-4BDE-9322-06215FFCFCBF}" destId="{AF79282F-4587-49CB-B714-735A3E3EDCB9}" srcOrd="0" destOrd="0" presId="urn:microsoft.com/office/officeart/2005/8/layout/vList2"/>
-    <dgm:cxn modelId="{16B41F11-0943-4602-ABD2-F3D16EECCA72}" type="presOf" srcId="{D6EE5DE8-77E8-4922-A9C6-F365BBE83A79}" destId="{376597F5-777C-4886-9496-C2590412E54E}" srcOrd="0" destOrd="0" presId="urn:microsoft.com/office/officeart/2005/8/layout/vList2"/>
-    <dgm:cxn modelId="{0AFFA354-5C02-4BC8-9F90-6CB7F9AFE621}" type="presOf" srcId="{2D36E825-4ACE-45FF-9A82-A07828909465}" destId="{401ECA87-A414-4C2E-815B-2E740FECD9DF}" srcOrd="0" destOrd="0" presId="urn:microsoft.com/office/officeart/2005/8/layout/vList2"/>
-    <dgm:cxn modelId="{4992FD39-C66E-4832-A5F1-11781180184C}" type="presOf" srcId="{2CE68B19-4D7E-4DE2-8DC6-889BE6ABFD76}" destId="{C7130AF6-5BCF-4F29-BA34-95CB85B72764}" srcOrd="0" destOrd="1" presId="urn:microsoft.com/office/officeart/2005/8/layout/vList2"/>
-    <dgm:cxn modelId="{2C2228F0-1DA1-4549-8ABC-794586086176}" srcId="{E07D3DF8-B531-453C-B599-898D9D03A724}" destId="{53EFCA86-4B4F-4BDE-9322-06215FFCFCBF}" srcOrd="2" destOrd="0" parTransId="{6F8E2E0C-0D28-4F6E-A0F7-62F820350508}" sibTransId="{06D6753B-B082-4C36-B61B-1650AF337FFC}"/>
-    <dgm:cxn modelId="{F66F8873-F080-4ED4-A831-58841009DADE}" type="presOf" srcId="{38F77422-9DC2-4461-90F4-808381EB6C65}" destId="{C7130AF6-5BCF-4F29-BA34-95CB85B72764}" srcOrd="0" destOrd="0" presId="urn:microsoft.com/office/officeart/2005/8/layout/vList2"/>
-    <dgm:cxn modelId="{6C00EABA-6F4F-4A66-86A2-B21FF967D541}" srcId="{E07D3DF8-B531-453C-B599-898D9D03A724}" destId="{CB61399F-1A2D-42E5-8BED-9711DCC11731}" srcOrd="3" destOrd="0" parTransId="{7AE97EF6-8A82-49B0-B4CC-14B044F0451A}" sibTransId="{2AF9AD82-5FDD-4C7C-B9BF-B03397D23B2C}"/>
-    <dgm:cxn modelId="{0BA1EE72-EF87-4D62-8BBC-9B12C0A66E28}" type="presOf" srcId="{D941E3BF-98DE-4282-B4DB-54913C6EC119}" destId="{3FFC3410-A2D0-4B28-A055-BFAC61BCB93F}" srcOrd="0" destOrd="0" presId="urn:microsoft.com/office/officeart/2005/8/layout/vList2"/>
-    <dgm:cxn modelId="{548A0F74-DBD6-46F8-9FF7-68DA0AB3A980}" srcId="{CB61399F-1A2D-42E5-8BED-9711DCC11731}" destId="{21F8D68D-EA5A-4A42-BBF1-FE8E7480EBDF}" srcOrd="0" destOrd="0" parTransId="{6A6B22FF-C327-472B-90B5-9F5FC64B0C98}" sibTransId="{AEE67130-E96F-4C8F-8A94-E077723513D2}"/>
-    <dgm:cxn modelId="{C645250B-999A-4C4B-B0D9-55ADA0CE32A4}" srcId="{D6EE5DE8-77E8-4922-A9C6-F365BBE83A79}" destId="{5A0F2CBC-D6CD-4367-8680-42DC6E42144E}" srcOrd="0" destOrd="0" parTransId="{2DDB378C-5C3B-4863-911A-3B31766CAA26}" sibTransId="{DBC07F86-E648-42B6-92D9-074FCD1F5866}"/>
-    <dgm:cxn modelId="{AE0D4A5E-017A-4636-8B86-9F08FCDA9C67}" srcId="{2D36E825-4ACE-45FF-9A82-A07828909465}" destId="{2CE68B19-4D7E-4DE2-8DC6-889BE6ABFD76}" srcOrd="1" destOrd="0" parTransId="{9F41A284-99E6-4545-BAF2-D2D9EA5E21B0}" sibTransId="{11F39526-C1AA-446A-809B-D9D4132A4E51}"/>
-    <dgm:cxn modelId="{A643151B-3E22-4B18-8884-B35007EC6172}" srcId="{E07D3DF8-B531-453C-B599-898D9D03A724}" destId="{A6C8BD6C-B3B2-4605-8970-343DCDE52EF2}" srcOrd="4" destOrd="0" parTransId="{B4F2E15E-1C80-4166-8AB2-D3523720A631}" sibTransId="{1DEDE7B7-B08A-462B-8B72-29F3AA43F8B3}"/>
-    <dgm:cxn modelId="{C087B476-0ECB-4B01-B85A-EE7A409D083F}" srcId="{A6C8BD6C-B3B2-4605-8970-343DCDE52EF2}" destId="{1691F446-2C4D-4079-9D16-C341031FF10A}" srcOrd="0" destOrd="0" parTransId="{DCA4AE69-92CF-4492-A9CA-C35A56BC76BB}" sibTransId="{05219947-3651-4DBB-9B49-DF587987A035}"/>
-    <dgm:cxn modelId="{649E1C9A-C4FD-4E90-9094-E80372FE3B54}" srcId="{E07D3DF8-B531-453C-B599-898D9D03A724}" destId="{2D36E825-4ACE-45FF-9A82-A07828909465}" srcOrd="0" destOrd="0" parTransId="{B4AFEE9B-1623-480E-AD65-DE7486D44E39}" sibTransId="{3CA66D8E-C79A-4301-B374-30BE44E4CC8F}"/>
     <dgm:cxn modelId="{19C50BBE-C8CB-4767-9C04-53426BED15D7}" type="presParOf" srcId="{AE563F13-1AA5-450D-9916-2F11638C1DA9}" destId="{401ECA87-A414-4C2E-815B-2E740FECD9DF}" srcOrd="0" destOrd="0" presId="urn:microsoft.com/office/officeart/2005/8/layout/vList2"/>
     <dgm:cxn modelId="{3A705D86-27F1-4186-B5F0-4FBBE0EBF71C}" type="presParOf" srcId="{AE563F13-1AA5-450D-9916-2F11638C1DA9}" destId="{C7130AF6-5BCF-4F29-BA34-95CB85B72764}" srcOrd="1" destOrd="0" presId="urn:microsoft.com/office/officeart/2005/8/layout/vList2"/>
     <dgm:cxn modelId="{9F4BAB58-4BD1-416C-B496-780C6D23F298}" type="presParOf" srcId="{AE563F13-1AA5-450D-9916-2F11638C1DA9}" destId="{376597F5-777C-4886-9496-C2590412E54E}" srcOrd="2" destOrd="0" presId="urn:microsoft.com/office/officeart/2005/8/layout/vList2"/>
@@ -3793,7 +3793,7 @@
   <dgm:whole/>
   <dgm:extLst>
     <a:ext uri="http://schemas.microsoft.com/office/drawing/2008/diagram">
-      <dsp:dataModelExt xmlns:dsp="http://schemas.microsoft.com/office/drawing/2008/diagram" xmlns="" relId="rId6" minVer="http://schemas.openxmlformats.org/drawingml/2006/diagram"/>
+      <dsp:dataModelExt xmlns:dsp="http://schemas.microsoft.com/office/drawing/2008/diagram" relId="rId6" minVer="http://schemas.openxmlformats.org/drawingml/2006/diagram"/>
     </a:ext>
   </dgm:extLst>
 </dgm:dataModel>
@@ -4145,18 +4145,18 @@
   </dgm:ptLst>
   <dgm:cxnLst>
     <dgm:cxn modelId="{A643151B-3E22-4B18-8884-B35007EC6172}" srcId="{E07D3DF8-B531-453C-B599-898D9D03A724}" destId="{A6C8BD6C-B3B2-4605-8970-343DCDE52EF2}" srcOrd="2" destOrd="0" parTransId="{B4F2E15E-1C80-4166-8AB2-D3523720A631}" sibTransId="{1DEDE7B7-B08A-462B-8B72-29F3AA43F8B3}"/>
+    <dgm:cxn modelId="{61DF26B5-61EC-4CC0-916D-36C222EC2E9A}" type="presOf" srcId="{21F8D68D-EA5A-4A42-BBF1-FE8E7480EBDF}" destId="{9C495DF5-169D-4A31-B3DB-88DFF8C7AB22}" srcOrd="0" destOrd="0" presId="urn:microsoft.com/office/officeart/2005/8/layout/vList2"/>
+    <dgm:cxn modelId="{548A0F74-DBD6-46F8-9FF7-68DA0AB3A980}" srcId="{CB61399F-1A2D-42E5-8BED-9711DCC11731}" destId="{21F8D68D-EA5A-4A42-BBF1-FE8E7480EBDF}" srcOrd="0" destOrd="0" parTransId="{6A6B22FF-C327-472B-90B5-9F5FC64B0C98}" sibTransId="{AEE67130-E96F-4C8F-8A94-E077723513D2}"/>
+    <dgm:cxn modelId="{C087B476-0ECB-4B01-B85A-EE7A409D083F}" srcId="{A6C8BD6C-B3B2-4605-8970-343DCDE52EF2}" destId="{1691F446-2C4D-4079-9D16-C341031FF10A}" srcOrd="0" destOrd="0" parTransId="{DCA4AE69-92CF-4492-A9CA-C35A56BC76BB}" sibTransId="{05219947-3651-4DBB-9B49-DF587987A035}"/>
+    <dgm:cxn modelId="{45E20C9B-880D-4501-872F-9824EB3C2815}" type="presOf" srcId="{CB61399F-1A2D-42E5-8BED-9711DCC11731}" destId="{78DA6840-523F-44DE-8870-8809A7BF9028}" srcOrd="0" destOrd="0" presId="urn:microsoft.com/office/officeart/2005/8/layout/vList2"/>
+    <dgm:cxn modelId="{D522EEA6-CED0-4726-8BDB-F1BEBE02DDCA}" type="presOf" srcId="{1691F446-2C4D-4079-9D16-C341031FF10A}" destId="{5EE99CAA-C70B-49D9-9943-E42F93D8C815}" srcOrd="0" destOrd="0" presId="urn:microsoft.com/office/officeart/2005/8/layout/vList2"/>
+    <dgm:cxn modelId="{6C00EABA-6F4F-4A66-86A2-B21FF967D541}" srcId="{E07D3DF8-B531-453C-B599-898D9D03A724}" destId="{CB61399F-1A2D-42E5-8BED-9711DCC11731}" srcOrd="1" destOrd="0" parTransId="{7AE97EF6-8A82-49B0-B4CC-14B044F0451A}" sibTransId="{2AF9AD82-5FDD-4C7C-B9BF-B03397D23B2C}"/>
+    <dgm:cxn modelId="{649E1C9A-C4FD-4E90-9094-E80372FE3B54}" srcId="{E07D3DF8-B531-453C-B599-898D9D03A724}" destId="{2D36E825-4ACE-45FF-9A82-A07828909465}" srcOrd="0" destOrd="0" parTransId="{B4AFEE9B-1623-480E-AD65-DE7486D44E39}" sibTransId="{3CA66D8E-C79A-4301-B374-30BE44E4CC8F}"/>
+    <dgm:cxn modelId="{38242A67-662C-460B-BF65-C8E708CA8493}" type="presOf" srcId="{E07D3DF8-B531-453C-B599-898D9D03A724}" destId="{AE563F13-1AA5-450D-9916-2F11638C1DA9}" srcOrd="0" destOrd="0" presId="urn:microsoft.com/office/officeart/2005/8/layout/vList2"/>
+    <dgm:cxn modelId="{332EF70E-5376-4614-A641-A415CA4B53BA}" type="presOf" srcId="{38F77422-9DC2-4461-90F4-808381EB6C65}" destId="{C7130AF6-5BCF-4F29-BA34-95CB85B72764}" srcOrd="0" destOrd="0" presId="urn:microsoft.com/office/officeart/2005/8/layout/vList2"/>
     <dgm:cxn modelId="{6CB5BE82-1794-466D-BCBE-E4216D2C3F5D}" type="presOf" srcId="{A6C8BD6C-B3B2-4605-8970-343DCDE52EF2}" destId="{5AF62516-935A-4716-BC3C-96D1A9708875}" srcOrd="0" destOrd="0" presId="urn:microsoft.com/office/officeart/2005/8/layout/vList2"/>
+    <dgm:cxn modelId="{8D5CBEEA-BF3A-4A31-9C1A-49FEF53E1159}" srcId="{2D36E825-4ACE-45FF-9A82-A07828909465}" destId="{38F77422-9DC2-4461-90F4-808381EB6C65}" srcOrd="0" destOrd="0" parTransId="{7E42520C-05FF-4542-92ED-FFCB90C662C0}" sibTransId="{5D5F5B14-0F69-49D6-8F3A-089808006D11}"/>
     <dgm:cxn modelId="{331FC39C-4E6F-4B27-B6DC-F377B797448E}" type="presOf" srcId="{2D36E825-4ACE-45FF-9A82-A07828909465}" destId="{401ECA87-A414-4C2E-815B-2E740FECD9DF}" srcOrd="0" destOrd="0" presId="urn:microsoft.com/office/officeart/2005/8/layout/vList2"/>
-    <dgm:cxn modelId="{6C00EABA-6F4F-4A66-86A2-B21FF967D541}" srcId="{E07D3DF8-B531-453C-B599-898D9D03A724}" destId="{CB61399F-1A2D-42E5-8BED-9711DCC11731}" srcOrd="1" destOrd="0" parTransId="{7AE97EF6-8A82-49B0-B4CC-14B044F0451A}" sibTransId="{2AF9AD82-5FDD-4C7C-B9BF-B03397D23B2C}"/>
-    <dgm:cxn modelId="{8D5CBEEA-BF3A-4A31-9C1A-49FEF53E1159}" srcId="{2D36E825-4ACE-45FF-9A82-A07828909465}" destId="{38F77422-9DC2-4461-90F4-808381EB6C65}" srcOrd="0" destOrd="0" parTransId="{7E42520C-05FF-4542-92ED-FFCB90C662C0}" sibTransId="{5D5F5B14-0F69-49D6-8F3A-089808006D11}"/>
-    <dgm:cxn modelId="{649E1C9A-C4FD-4E90-9094-E80372FE3B54}" srcId="{E07D3DF8-B531-453C-B599-898D9D03A724}" destId="{2D36E825-4ACE-45FF-9A82-A07828909465}" srcOrd="0" destOrd="0" parTransId="{B4AFEE9B-1623-480E-AD65-DE7486D44E39}" sibTransId="{3CA66D8E-C79A-4301-B374-30BE44E4CC8F}"/>
-    <dgm:cxn modelId="{548A0F74-DBD6-46F8-9FF7-68DA0AB3A980}" srcId="{CB61399F-1A2D-42E5-8BED-9711DCC11731}" destId="{21F8D68D-EA5A-4A42-BBF1-FE8E7480EBDF}" srcOrd="0" destOrd="0" parTransId="{6A6B22FF-C327-472B-90B5-9F5FC64B0C98}" sibTransId="{AEE67130-E96F-4C8F-8A94-E077723513D2}"/>
-    <dgm:cxn modelId="{D522EEA6-CED0-4726-8BDB-F1BEBE02DDCA}" type="presOf" srcId="{1691F446-2C4D-4079-9D16-C341031FF10A}" destId="{5EE99CAA-C70B-49D9-9943-E42F93D8C815}" srcOrd="0" destOrd="0" presId="urn:microsoft.com/office/officeart/2005/8/layout/vList2"/>
-    <dgm:cxn modelId="{332EF70E-5376-4614-A641-A415CA4B53BA}" type="presOf" srcId="{38F77422-9DC2-4461-90F4-808381EB6C65}" destId="{C7130AF6-5BCF-4F29-BA34-95CB85B72764}" srcOrd="0" destOrd="0" presId="urn:microsoft.com/office/officeart/2005/8/layout/vList2"/>
-    <dgm:cxn modelId="{45E20C9B-880D-4501-872F-9824EB3C2815}" type="presOf" srcId="{CB61399F-1A2D-42E5-8BED-9711DCC11731}" destId="{78DA6840-523F-44DE-8870-8809A7BF9028}" srcOrd="0" destOrd="0" presId="urn:microsoft.com/office/officeart/2005/8/layout/vList2"/>
-    <dgm:cxn modelId="{38242A67-662C-460B-BF65-C8E708CA8493}" type="presOf" srcId="{E07D3DF8-B531-453C-B599-898D9D03A724}" destId="{AE563F13-1AA5-450D-9916-2F11638C1DA9}" srcOrd="0" destOrd="0" presId="urn:microsoft.com/office/officeart/2005/8/layout/vList2"/>
-    <dgm:cxn modelId="{C087B476-0ECB-4B01-B85A-EE7A409D083F}" srcId="{A6C8BD6C-B3B2-4605-8970-343DCDE52EF2}" destId="{1691F446-2C4D-4079-9D16-C341031FF10A}" srcOrd="0" destOrd="0" parTransId="{DCA4AE69-92CF-4492-A9CA-C35A56BC76BB}" sibTransId="{05219947-3651-4DBB-9B49-DF587987A035}"/>
-    <dgm:cxn modelId="{61DF26B5-61EC-4CC0-916D-36C222EC2E9A}" type="presOf" srcId="{21F8D68D-EA5A-4A42-BBF1-FE8E7480EBDF}" destId="{9C495DF5-169D-4A31-B3DB-88DFF8C7AB22}" srcOrd="0" destOrd="0" presId="urn:microsoft.com/office/officeart/2005/8/layout/vList2"/>
     <dgm:cxn modelId="{0A9504AD-702D-4B23-9D1A-A693DB10C4CA}" type="presParOf" srcId="{AE563F13-1AA5-450D-9916-2F11638C1DA9}" destId="{401ECA87-A414-4C2E-815B-2E740FECD9DF}" srcOrd="0" destOrd="0" presId="urn:microsoft.com/office/officeart/2005/8/layout/vList2"/>
     <dgm:cxn modelId="{CF144102-22ED-49B9-9D0D-410272622A8C}" type="presParOf" srcId="{AE563F13-1AA5-450D-9916-2F11638C1DA9}" destId="{C7130AF6-5BCF-4F29-BA34-95CB85B72764}" srcOrd="1" destOrd="0" presId="urn:microsoft.com/office/officeart/2005/8/layout/vList2"/>
     <dgm:cxn modelId="{140F9814-D7BE-46E8-9B08-4CB539BF985A}" type="presParOf" srcId="{AE563F13-1AA5-450D-9916-2F11638C1DA9}" destId="{78DA6840-523F-44DE-8870-8809A7BF9028}" srcOrd="2" destOrd="0" presId="urn:microsoft.com/office/officeart/2005/8/layout/vList2"/>
@@ -4168,7 +4168,7 @@
   <dgm:whole/>
   <dgm:extLst>
     <a:ext uri="http://schemas.microsoft.com/office/drawing/2008/diagram">
-      <dsp:dataModelExt xmlns:dsp="http://schemas.microsoft.com/office/drawing/2008/diagram" xmlns="" relId="rId6" minVer="http://schemas.openxmlformats.org/drawingml/2006/diagram"/>
+      <dsp:dataModelExt xmlns:dsp="http://schemas.microsoft.com/office/drawing/2008/diagram" relId="rId6" minVer="http://schemas.openxmlformats.org/drawingml/2006/diagram"/>
     </a:ext>
   </dgm:extLst>
 </dgm:dataModel>
@@ -4725,27 +4725,27 @@
     </dgm:pt>
   </dgm:ptLst>
   <dgm:cxnLst>
-    <dgm:cxn modelId="{80FC98DC-09F5-4861-9121-46E4D391D09F}" type="presOf" srcId="{A6C8BD6C-B3B2-4605-8970-343DCDE52EF2}" destId="{5AF62516-935A-4716-BC3C-96D1A9708875}" srcOrd="0" destOrd="0" presId="urn:microsoft.com/office/officeart/2005/8/layout/vList2"/>
-    <dgm:cxn modelId="{700FBA62-08AC-4D50-A12E-F81588B592CD}" type="presOf" srcId="{21F8D68D-EA5A-4A42-BBF1-FE8E7480EBDF}" destId="{9C495DF5-169D-4A31-B3DB-88DFF8C7AB22}" srcOrd="0" destOrd="0" presId="urn:microsoft.com/office/officeart/2005/8/layout/vList2"/>
+    <dgm:cxn modelId="{FC5954B9-4B52-4440-B922-05DA414BC514}" type="presOf" srcId="{1691F446-2C4D-4079-9D16-C341031FF10A}" destId="{5EE99CAA-C70B-49D9-9943-E42F93D8C815}" srcOrd="0" destOrd="0" presId="urn:microsoft.com/office/officeart/2005/8/layout/vList2"/>
+    <dgm:cxn modelId="{A643151B-3E22-4B18-8884-B35007EC6172}" srcId="{E07D3DF8-B531-453C-B599-898D9D03A724}" destId="{A6C8BD6C-B3B2-4605-8970-343DCDE52EF2}" srcOrd="2" destOrd="0" parTransId="{B4F2E15E-1C80-4166-8AB2-D3523720A631}" sibTransId="{1DEDE7B7-B08A-462B-8B72-29F3AA43F8B3}"/>
+    <dgm:cxn modelId="{C087B476-0ECB-4B01-B85A-EE7A409D083F}" srcId="{A6C8BD6C-B3B2-4605-8970-343DCDE52EF2}" destId="{1691F446-2C4D-4079-9D16-C341031FF10A}" srcOrd="0" destOrd="0" parTransId="{DCA4AE69-92CF-4492-A9CA-C35A56BC76BB}" sibTransId="{05219947-3651-4DBB-9B49-DF587987A035}"/>
+    <dgm:cxn modelId="{D30D59F3-71D6-4920-B79A-985FF9D767CC}" srcId="{E9705339-6862-4592-949E-99BA249F19D1}" destId="{83006853-3F34-4B56-B449-FA6A1E70C877}" srcOrd="0" destOrd="0" parTransId="{B0ED33F8-6293-440A-AC5A-286812C9ED6B}" sibTransId="{FCC202FC-334D-4ED6-B57B-5C99CA915F34}"/>
+    <dgm:cxn modelId="{548A0F74-DBD6-46F8-9FF7-68DA0AB3A980}" srcId="{CB61399F-1A2D-42E5-8BED-9711DCC11731}" destId="{21F8D68D-EA5A-4A42-BBF1-FE8E7480EBDF}" srcOrd="0" destOrd="0" parTransId="{6A6B22FF-C327-472B-90B5-9F5FC64B0C98}" sibTransId="{AEE67130-E96F-4C8F-8A94-E077723513D2}"/>
+    <dgm:cxn modelId="{649E1C9A-C4FD-4E90-9094-E80372FE3B54}" srcId="{E07D3DF8-B531-453C-B599-898D9D03A724}" destId="{2D36E825-4ACE-45FF-9A82-A07828909465}" srcOrd="0" destOrd="0" parTransId="{B4AFEE9B-1623-480E-AD65-DE7486D44E39}" sibTransId="{3CA66D8E-C79A-4301-B374-30BE44E4CC8F}"/>
+    <dgm:cxn modelId="{8B9AD8B4-B349-4B8D-BAB4-409CEC2F9059}" type="presOf" srcId="{E07D3DF8-B531-453C-B599-898D9D03A724}" destId="{AE563F13-1AA5-450D-9916-2F11638C1DA9}" srcOrd="0" destOrd="0" presId="urn:microsoft.com/office/officeart/2005/8/layout/vList2"/>
+    <dgm:cxn modelId="{957A5732-6643-4B4A-93D8-DB61D5FFC83E}" srcId="{E07D3DF8-B531-453C-B599-898D9D03A724}" destId="{632313F7-92C6-4DF6-B3C3-79F0F93A02D6}" srcOrd="4" destOrd="0" parTransId="{804005BE-B51D-4726-AC1E-68BB62682854}" sibTransId="{990CB716-E548-450E-9A90-4D8DB093C1ED}"/>
+    <dgm:cxn modelId="{6C00EABA-6F4F-4A66-86A2-B21FF967D541}" srcId="{E07D3DF8-B531-453C-B599-898D9D03A724}" destId="{CB61399F-1A2D-42E5-8BED-9711DCC11731}" srcOrd="1" destOrd="0" parTransId="{7AE97EF6-8A82-49B0-B4CC-14B044F0451A}" sibTransId="{2AF9AD82-5FDD-4C7C-B9BF-B03397D23B2C}"/>
+    <dgm:cxn modelId="{8D5CBEEA-BF3A-4A31-9C1A-49FEF53E1159}" srcId="{2D36E825-4ACE-45FF-9A82-A07828909465}" destId="{38F77422-9DC2-4461-90F4-808381EB6C65}" srcOrd="0" destOrd="0" parTransId="{7E42520C-05FF-4542-92ED-FFCB90C662C0}" sibTransId="{5D5F5B14-0F69-49D6-8F3A-089808006D11}"/>
     <dgm:cxn modelId="{12B07D0C-D790-44F7-94D8-ED4470F1980B}" type="presOf" srcId="{E9705339-6862-4592-949E-99BA249F19D1}" destId="{8E384E35-9385-455F-B372-4AA6FE4C9346}" srcOrd="0" destOrd="0" presId="urn:microsoft.com/office/officeart/2005/8/layout/vList2"/>
-    <dgm:cxn modelId="{957A5732-6643-4B4A-93D8-DB61D5FFC83E}" srcId="{E07D3DF8-B531-453C-B599-898D9D03A724}" destId="{632313F7-92C6-4DF6-B3C3-79F0F93A02D6}" srcOrd="4" destOrd="0" parTransId="{804005BE-B51D-4726-AC1E-68BB62682854}" sibTransId="{990CB716-E548-450E-9A90-4D8DB093C1ED}"/>
+    <dgm:cxn modelId="{3109AF4A-1468-4B5C-BE53-69CBA1E54CEA}" srcId="{E07D3DF8-B531-453C-B599-898D9D03A724}" destId="{E9705339-6862-4592-949E-99BA249F19D1}" srcOrd="3" destOrd="0" parTransId="{06AAE812-5F9C-4F28-A6DB-C0E5E9A112D8}" sibTransId="{E3E15143-41D2-41E3-8117-DAD4A96EA8BC}"/>
     <dgm:cxn modelId="{66F172EE-A2E4-46F7-85EE-7178ED2C26A8}" type="presOf" srcId="{2D36E825-4ACE-45FF-9A82-A07828909465}" destId="{401ECA87-A414-4C2E-815B-2E740FECD9DF}" srcOrd="0" destOrd="0" presId="urn:microsoft.com/office/officeart/2005/8/layout/vList2"/>
     <dgm:cxn modelId="{EA3B3533-2C9C-48E2-9285-90EC72A69282}" type="presOf" srcId="{83006853-3F34-4B56-B449-FA6A1E70C877}" destId="{7E58D7A6-E1A3-4F64-B2F9-76B3525CD76E}" srcOrd="0" destOrd="0" presId="urn:microsoft.com/office/officeart/2005/8/layout/vList2"/>
-    <dgm:cxn modelId="{FC5954B9-4B52-4440-B922-05DA414BC514}" type="presOf" srcId="{1691F446-2C4D-4079-9D16-C341031FF10A}" destId="{5EE99CAA-C70B-49D9-9943-E42F93D8C815}" srcOrd="0" destOrd="0" presId="urn:microsoft.com/office/officeart/2005/8/layout/vList2"/>
+    <dgm:cxn modelId="{06E85CA7-A81C-4492-8E42-89F587E35226}" type="presOf" srcId="{38F77422-9DC2-4461-90F4-808381EB6C65}" destId="{C7130AF6-5BCF-4F29-BA34-95CB85B72764}" srcOrd="0" destOrd="0" presId="urn:microsoft.com/office/officeart/2005/8/layout/vList2"/>
+    <dgm:cxn modelId="{700FBA62-08AC-4D50-A12E-F81588B592CD}" type="presOf" srcId="{21F8D68D-EA5A-4A42-BBF1-FE8E7480EBDF}" destId="{9C495DF5-169D-4A31-B3DB-88DFF8C7AB22}" srcOrd="0" destOrd="0" presId="urn:microsoft.com/office/officeart/2005/8/layout/vList2"/>
+    <dgm:cxn modelId="{4562EE19-D178-43C7-BCD7-5DEF9C1E6452}" type="presOf" srcId="{0D9C04A8-F6C4-4A94-AAC0-4CDF1E2E33FD}" destId="{C4D7444D-E9C0-4694-BF04-B566F459108B}" srcOrd="0" destOrd="0" presId="urn:microsoft.com/office/officeart/2005/8/layout/vList2"/>
     <dgm:cxn modelId="{5E0F4203-A41F-4185-972F-E7C47C185231}" type="presOf" srcId="{CB61399F-1A2D-42E5-8BED-9711DCC11731}" destId="{78DA6840-523F-44DE-8870-8809A7BF9028}" srcOrd="0" destOrd="0" presId="urn:microsoft.com/office/officeart/2005/8/layout/vList2"/>
-    <dgm:cxn modelId="{8D5CBEEA-BF3A-4A31-9C1A-49FEF53E1159}" srcId="{2D36E825-4ACE-45FF-9A82-A07828909465}" destId="{38F77422-9DC2-4461-90F4-808381EB6C65}" srcOrd="0" destOrd="0" parTransId="{7E42520C-05FF-4542-92ED-FFCB90C662C0}" sibTransId="{5D5F5B14-0F69-49D6-8F3A-089808006D11}"/>
+    <dgm:cxn modelId="{80FC98DC-09F5-4861-9121-46E4D391D09F}" type="presOf" srcId="{A6C8BD6C-B3B2-4605-8970-343DCDE52EF2}" destId="{5AF62516-935A-4716-BC3C-96D1A9708875}" srcOrd="0" destOrd="0" presId="urn:microsoft.com/office/officeart/2005/8/layout/vList2"/>
     <dgm:cxn modelId="{5907D802-1C99-48F0-B720-E1CAFE993656}" type="presOf" srcId="{632313F7-92C6-4DF6-B3C3-79F0F93A02D6}" destId="{1A51C3D3-58C0-4069-AB0A-A95B0B4B888D}" srcOrd="0" destOrd="0" presId="urn:microsoft.com/office/officeart/2005/8/layout/vList2"/>
-    <dgm:cxn modelId="{3109AF4A-1468-4B5C-BE53-69CBA1E54CEA}" srcId="{E07D3DF8-B531-453C-B599-898D9D03A724}" destId="{E9705339-6862-4592-949E-99BA249F19D1}" srcOrd="3" destOrd="0" parTransId="{06AAE812-5F9C-4F28-A6DB-C0E5E9A112D8}" sibTransId="{E3E15143-41D2-41E3-8117-DAD4A96EA8BC}"/>
-    <dgm:cxn modelId="{4562EE19-D178-43C7-BCD7-5DEF9C1E6452}" type="presOf" srcId="{0D9C04A8-F6C4-4A94-AAC0-4CDF1E2E33FD}" destId="{C4D7444D-E9C0-4694-BF04-B566F459108B}" srcOrd="0" destOrd="0" presId="urn:microsoft.com/office/officeart/2005/8/layout/vList2"/>
     <dgm:cxn modelId="{5274B04B-EBA3-4A06-A97D-DC94381F8CD3}" srcId="{632313F7-92C6-4DF6-B3C3-79F0F93A02D6}" destId="{0D9C04A8-F6C4-4A94-AAC0-4CDF1E2E33FD}" srcOrd="0" destOrd="0" parTransId="{F63F2778-E27B-4AE3-84B3-300A6BD57EE8}" sibTransId="{30B342D8-FC19-44EE-AC4E-C090EECA01D0}"/>
-    <dgm:cxn modelId="{D30D59F3-71D6-4920-B79A-985FF9D767CC}" srcId="{E9705339-6862-4592-949E-99BA249F19D1}" destId="{83006853-3F34-4B56-B449-FA6A1E70C877}" srcOrd="0" destOrd="0" parTransId="{B0ED33F8-6293-440A-AC5A-286812C9ED6B}" sibTransId="{FCC202FC-334D-4ED6-B57B-5C99CA915F34}"/>
-    <dgm:cxn modelId="{06E85CA7-A81C-4492-8E42-89F587E35226}" type="presOf" srcId="{38F77422-9DC2-4461-90F4-808381EB6C65}" destId="{C7130AF6-5BCF-4F29-BA34-95CB85B72764}" srcOrd="0" destOrd="0" presId="urn:microsoft.com/office/officeart/2005/8/layout/vList2"/>
-    <dgm:cxn modelId="{6C00EABA-6F4F-4A66-86A2-B21FF967D541}" srcId="{E07D3DF8-B531-453C-B599-898D9D03A724}" destId="{CB61399F-1A2D-42E5-8BED-9711DCC11731}" srcOrd="1" destOrd="0" parTransId="{7AE97EF6-8A82-49B0-B4CC-14B044F0451A}" sibTransId="{2AF9AD82-5FDD-4C7C-B9BF-B03397D23B2C}"/>
-    <dgm:cxn modelId="{548A0F74-DBD6-46F8-9FF7-68DA0AB3A980}" srcId="{CB61399F-1A2D-42E5-8BED-9711DCC11731}" destId="{21F8D68D-EA5A-4A42-BBF1-FE8E7480EBDF}" srcOrd="0" destOrd="0" parTransId="{6A6B22FF-C327-472B-90B5-9F5FC64B0C98}" sibTransId="{AEE67130-E96F-4C8F-8A94-E077723513D2}"/>
-    <dgm:cxn modelId="{8B9AD8B4-B349-4B8D-BAB4-409CEC2F9059}" type="presOf" srcId="{E07D3DF8-B531-453C-B599-898D9D03A724}" destId="{AE563F13-1AA5-450D-9916-2F11638C1DA9}" srcOrd="0" destOrd="0" presId="urn:microsoft.com/office/officeart/2005/8/layout/vList2"/>
-    <dgm:cxn modelId="{A643151B-3E22-4B18-8884-B35007EC6172}" srcId="{E07D3DF8-B531-453C-B599-898D9D03A724}" destId="{A6C8BD6C-B3B2-4605-8970-343DCDE52EF2}" srcOrd="2" destOrd="0" parTransId="{B4F2E15E-1C80-4166-8AB2-D3523720A631}" sibTransId="{1DEDE7B7-B08A-462B-8B72-29F3AA43F8B3}"/>
-    <dgm:cxn modelId="{C087B476-0ECB-4B01-B85A-EE7A409D083F}" srcId="{A6C8BD6C-B3B2-4605-8970-343DCDE52EF2}" destId="{1691F446-2C4D-4079-9D16-C341031FF10A}" srcOrd="0" destOrd="0" parTransId="{DCA4AE69-92CF-4492-A9CA-C35A56BC76BB}" sibTransId="{05219947-3651-4DBB-9B49-DF587987A035}"/>
-    <dgm:cxn modelId="{649E1C9A-C4FD-4E90-9094-E80372FE3B54}" srcId="{E07D3DF8-B531-453C-B599-898D9D03A724}" destId="{2D36E825-4ACE-45FF-9A82-A07828909465}" srcOrd="0" destOrd="0" parTransId="{B4AFEE9B-1623-480E-AD65-DE7486D44E39}" sibTransId="{3CA66D8E-C79A-4301-B374-30BE44E4CC8F}"/>
     <dgm:cxn modelId="{9A7975D6-1D4E-4856-B3C4-932BFBD3CDDB}" type="presParOf" srcId="{AE563F13-1AA5-450D-9916-2F11638C1DA9}" destId="{401ECA87-A414-4C2E-815B-2E740FECD9DF}" srcOrd="0" destOrd="0" presId="urn:microsoft.com/office/officeart/2005/8/layout/vList2"/>
     <dgm:cxn modelId="{3AF63245-2634-4686-883D-40B5F87F6805}" type="presParOf" srcId="{AE563F13-1AA5-450D-9916-2F11638C1DA9}" destId="{C7130AF6-5BCF-4F29-BA34-95CB85B72764}" srcOrd="1" destOrd="0" presId="urn:microsoft.com/office/officeart/2005/8/layout/vList2"/>
     <dgm:cxn modelId="{8DA64A14-6FC0-478B-BD2D-7F1A95AA20EC}" type="presParOf" srcId="{AE563F13-1AA5-450D-9916-2F11638C1DA9}" destId="{78DA6840-523F-44DE-8870-8809A7BF9028}" srcOrd="2" destOrd="0" presId="urn:microsoft.com/office/officeart/2005/8/layout/vList2"/>
@@ -4761,7 +4761,7 @@
   <dgm:whole/>
   <dgm:extLst>
     <a:ext uri="http://schemas.microsoft.com/office/drawing/2008/diagram">
-      <dsp:dataModelExt xmlns:dsp="http://schemas.microsoft.com/office/drawing/2008/diagram" xmlns="" relId="rId6" minVer="http://schemas.openxmlformats.org/drawingml/2006/diagram"/>
+      <dsp:dataModelExt xmlns:dsp="http://schemas.microsoft.com/office/drawing/2008/diagram" relId="rId6" minVer="http://schemas.openxmlformats.org/drawingml/2006/diagram"/>
     </a:ext>
   </dgm:extLst>
 </dgm:dataModel>
@@ -5240,25 +5240,25 @@
     </dgm:pt>
   </dgm:ptLst>
   <dgm:cxnLst>
+    <dgm:cxn modelId="{A643151B-3E22-4B18-8884-B35007EC6172}" srcId="{E07D3DF8-B531-453C-B599-898D9D03A724}" destId="{A6C8BD6C-B3B2-4605-8970-343DCDE52EF2}" srcOrd="2" destOrd="0" parTransId="{B4F2E15E-1C80-4166-8AB2-D3523720A631}" sibTransId="{1DEDE7B7-B08A-462B-8B72-29F3AA43F8B3}"/>
+    <dgm:cxn modelId="{DEAC3F62-24BD-4A1E-BB26-42028C0882A5}" type="presOf" srcId="{6E0EABB4-8FD4-4A31-BD32-71E547315439}" destId="{C7130AF6-5BCF-4F29-BA34-95CB85B72764}" srcOrd="0" destOrd="1" presId="urn:microsoft.com/office/officeart/2005/8/layout/vList2"/>
+    <dgm:cxn modelId="{27AE2B06-EC92-4DA5-922B-9E530FB48021}" type="presOf" srcId="{E07D3DF8-B531-453C-B599-898D9D03A724}" destId="{AE563F13-1AA5-450D-9916-2F11638C1DA9}" srcOrd="0" destOrd="0" presId="urn:microsoft.com/office/officeart/2005/8/layout/vList2"/>
+    <dgm:cxn modelId="{468E1276-49A4-427C-9635-5464C82F8338}" type="presOf" srcId="{E9705339-6862-4592-949E-99BA249F19D1}" destId="{8E384E35-9385-455F-B372-4AA6FE4C9346}" srcOrd="0" destOrd="0" presId="urn:microsoft.com/office/officeart/2005/8/layout/vList2"/>
+    <dgm:cxn modelId="{68C5A92B-71CF-4F6B-983F-ED9BDB130016}" type="presOf" srcId="{632313F7-92C6-4DF6-B3C3-79F0F93A02D6}" destId="{1A51C3D3-58C0-4069-AB0A-A95B0B4B888D}" srcOrd="0" destOrd="0" presId="urn:microsoft.com/office/officeart/2005/8/layout/vList2"/>
+    <dgm:cxn modelId="{CF1B1A12-0D10-4D25-9073-8F46478748FC}" type="presOf" srcId="{38F77422-9DC2-4461-90F4-808381EB6C65}" destId="{C7130AF6-5BCF-4F29-BA34-95CB85B72764}" srcOrd="0" destOrd="0" presId="urn:microsoft.com/office/officeart/2005/8/layout/vList2"/>
+    <dgm:cxn modelId="{B1C8337E-EBFA-4ABD-9C53-BED174458251}" type="presOf" srcId="{2D36E825-4ACE-45FF-9A82-A07828909465}" destId="{401ECA87-A414-4C2E-815B-2E740FECD9DF}" srcOrd="0" destOrd="0" presId="urn:microsoft.com/office/officeart/2005/8/layout/vList2"/>
+    <dgm:cxn modelId="{3109AF4A-1468-4B5C-BE53-69CBA1E54CEA}" srcId="{E07D3DF8-B531-453C-B599-898D9D03A724}" destId="{E9705339-6862-4592-949E-99BA249F19D1}" srcOrd="3" destOrd="0" parTransId="{06AAE812-5F9C-4F28-A6DB-C0E5E9A112D8}" sibTransId="{E3E15143-41D2-41E3-8117-DAD4A96EA8BC}"/>
+    <dgm:cxn modelId="{6C00EABA-6F4F-4A66-86A2-B21FF967D541}" srcId="{E07D3DF8-B531-453C-B599-898D9D03A724}" destId="{CB61399F-1A2D-42E5-8BED-9711DCC11731}" srcOrd="1" destOrd="0" parTransId="{7AE97EF6-8A82-49B0-B4CC-14B044F0451A}" sibTransId="{2AF9AD82-5FDD-4C7C-B9BF-B03397D23B2C}"/>
+    <dgm:cxn modelId="{649E1C9A-C4FD-4E90-9094-E80372FE3B54}" srcId="{E07D3DF8-B531-453C-B599-898D9D03A724}" destId="{2D36E825-4ACE-45FF-9A82-A07828909465}" srcOrd="0" destOrd="0" parTransId="{B4AFEE9B-1623-480E-AD65-DE7486D44E39}" sibTransId="{3CA66D8E-C79A-4301-B374-30BE44E4CC8F}"/>
+    <dgm:cxn modelId="{A68CBD88-771A-4A12-8B8B-9F0DC6B301A4}" type="presOf" srcId="{D07773C2-5821-447F-9880-D5FE54F059AC}" destId="{C7130AF6-5BCF-4F29-BA34-95CB85B72764}" srcOrd="0" destOrd="3" presId="urn:microsoft.com/office/officeart/2005/8/layout/vList2"/>
     <dgm:cxn modelId="{C0211991-8DA9-412A-8B5A-52F2BACA6083}" type="presOf" srcId="{CB61399F-1A2D-42E5-8BED-9711DCC11731}" destId="{78DA6840-523F-44DE-8870-8809A7BF9028}" srcOrd="0" destOrd="0" presId="urn:microsoft.com/office/officeart/2005/8/layout/vList2"/>
+    <dgm:cxn modelId="{ECC6EC58-6EBD-4D0F-8DA9-8F738B9D639E}" type="presOf" srcId="{A5C752E3-5F20-413C-96F0-081937642392}" destId="{C7130AF6-5BCF-4F29-BA34-95CB85B72764}" srcOrd="0" destOrd="2" presId="urn:microsoft.com/office/officeart/2005/8/layout/vList2"/>
+    <dgm:cxn modelId="{C908B49B-DBCB-4C55-8D32-48E6281ECE53}" srcId="{2D36E825-4ACE-45FF-9A82-A07828909465}" destId="{D07773C2-5821-447F-9880-D5FE54F059AC}" srcOrd="3" destOrd="0" parTransId="{604414DF-3A89-4A5E-A279-588AFA58EAA7}" sibTransId="{81AD834C-F68E-4FFE-9341-3944C4CC184F}"/>
+    <dgm:cxn modelId="{2F3EECC4-15B6-4560-A7D0-C01E1E99200E}" srcId="{2D36E825-4ACE-45FF-9A82-A07828909465}" destId="{6E0EABB4-8FD4-4A31-BD32-71E547315439}" srcOrd="1" destOrd="0" parTransId="{95D09281-F1D7-4188-8EE7-854B701AF533}" sibTransId="{6209FA6D-8B4E-41AD-8D38-DBCFB2DFB1FB}"/>
+    <dgm:cxn modelId="{03E26BDF-5D4F-478D-B8F8-F2E5FCA7B9F8}" srcId="{2D36E825-4ACE-45FF-9A82-A07828909465}" destId="{A5C752E3-5F20-413C-96F0-081937642392}" srcOrd="2" destOrd="0" parTransId="{11EC339E-6CE9-4164-A730-957FA9F5DFA7}" sibTransId="{9382DBC6-5FC6-4FD1-8597-6E3833FBCCFD}"/>
     <dgm:cxn modelId="{957A5732-6643-4B4A-93D8-DB61D5FFC83E}" srcId="{E07D3DF8-B531-453C-B599-898D9D03A724}" destId="{632313F7-92C6-4DF6-B3C3-79F0F93A02D6}" srcOrd="4" destOrd="0" parTransId="{804005BE-B51D-4726-AC1E-68BB62682854}" sibTransId="{990CB716-E548-450E-9A90-4D8DB093C1ED}"/>
-    <dgm:cxn modelId="{27AE2B06-EC92-4DA5-922B-9E530FB48021}" type="presOf" srcId="{E07D3DF8-B531-453C-B599-898D9D03A724}" destId="{AE563F13-1AA5-450D-9916-2F11638C1DA9}" srcOrd="0" destOrd="0" presId="urn:microsoft.com/office/officeart/2005/8/layout/vList2"/>
-    <dgm:cxn modelId="{68C5A92B-71CF-4F6B-983F-ED9BDB130016}" type="presOf" srcId="{632313F7-92C6-4DF6-B3C3-79F0F93A02D6}" destId="{1A51C3D3-58C0-4069-AB0A-A95B0B4B888D}" srcOrd="0" destOrd="0" presId="urn:microsoft.com/office/officeart/2005/8/layout/vList2"/>
-    <dgm:cxn modelId="{B1C8337E-EBFA-4ABD-9C53-BED174458251}" type="presOf" srcId="{2D36E825-4ACE-45FF-9A82-A07828909465}" destId="{401ECA87-A414-4C2E-815B-2E740FECD9DF}" srcOrd="0" destOrd="0" presId="urn:microsoft.com/office/officeart/2005/8/layout/vList2"/>
-    <dgm:cxn modelId="{CF1B1A12-0D10-4D25-9073-8F46478748FC}" type="presOf" srcId="{38F77422-9DC2-4461-90F4-808381EB6C65}" destId="{C7130AF6-5BCF-4F29-BA34-95CB85B72764}" srcOrd="0" destOrd="0" presId="urn:microsoft.com/office/officeart/2005/8/layout/vList2"/>
+    <dgm:cxn modelId="{FE6F531F-AB5B-44A3-A0BD-29F8A7F52D79}" type="presOf" srcId="{A6C8BD6C-B3B2-4605-8970-343DCDE52EF2}" destId="{5AF62516-935A-4716-BC3C-96D1A9708875}" srcOrd="0" destOrd="0" presId="urn:microsoft.com/office/officeart/2005/8/layout/vList2"/>
     <dgm:cxn modelId="{8D5CBEEA-BF3A-4A31-9C1A-49FEF53E1159}" srcId="{2D36E825-4ACE-45FF-9A82-A07828909465}" destId="{38F77422-9DC2-4461-90F4-808381EB6C65}" srcOrd="0" destOrd="0" parTransId="{7E42520C-05FF-4542-92ED-FFCB90C662C0}" sibTransId="{5D5F5B14-0F69-49D6-8F3A-089808006D11}"/>
-    <dgm:cxn modelId="{3109AF4A-1468-4B5C-BE53-69CBA1E54CEA}" srcId="{E07D3DF8-B531-453C-B599-898D9D03A724}" destId="{E9705339-6862-4592-949E-99BA249F19D1}" srcOrd="3" destOrd="0" parTransId="{06AAE812-5F9C-4F28-A6DB-C0E5E9A112D8}" sibTransId="{E3E15143-41D2-41E3-8117-DAD4A96EA8BC}"/>
-    <dgm:cxn modelId="{C908B49B-DBCB-4C55-8D32-48E6281ECE53}" srcId="{2D36E825-4ACE-45FF-9A82-A07828909465}" destId="{D07773C2-5821-447F-9880-D5FE54F059AC}" srcOrd="3" destOrd="0" parTransId="{604414DF-3A89-4A5E-A279-588AFA58EAA7}" sibTransId="{81AD834C-F68E-4FFE-9341-3944C4CC184F}"/>
-    <dgm:cxn modelId="{A68CBD88-771A-4A12-8B8B-9F0DC6B301A4}" type="presOf" srcId="{D07773C2-5821-447F-9880-D5FE54F059AC}" destId="{C7130AF6-5BCF-4F29-BA34-95CB85B72764}" srcOrd="0" destOrd="3" presId="urn:microsoft.com/office/officeart/2005/8/layout/vList2"/>
-    <dgm:cxn modelId="{ECC6EC58-6EBD-4D0F-8DA9-8F738B9D639E}" type="presOf" srcId="{A5C752E3-5F20-413C-96F0-081937642392}" destId="{C7130AF6-5BCF-4F29-BA34-95CB85B72764}" srcOrd="0" destOrd="2" presId="urn:microsoft.com/office/officeart/2005/8/layout/vList2"/>
-    <dgm:cxn modelId="{6C00EABA-6F4F-4A66-86A2-B21FF967D541}" srcId="{E07D3DF8-B531-453C-B599-898D9D03A724}" destId="{CB61399F-1A2D-42E5-8BED-9711DCC11731}" srcOrd="1" destOrd="0" parTransId="{7AE97EF6-8A82-49B0-B4CC-14B044F0451A}" sibTransId="{2AF9AD82-5FDD-4C7C-B9BF-B03397D23B2C}"/>
-    <dgm:cxn modelId="{FE6F531F-AB5B-44A3-A0BD-29F8A7F52D79}" type="presOf" srcId="{A6C8BD6C-B3B2-4605-8970-343DCDE52EF2}" destId="{5AF62516-935A-4716-BC3C-96D1A9708875}" srcOrd="0" destOrd="0" presId="urn:microsoft.com/office/officeart/2005/8/layout/vList2"/>
-    <dgm:cxn modelId="{DEAC3F62-24BD-4A1E-BB26-42028C0882A5}" type="presOf" srcId="{6E0EABB4-8FD4-4A31-BD32-71E547315439}" destId="{C7130AF6-5BCF-4F29-BA34-95CB85B72764}" srcOrd="0" destOrd="1" presId="urn:microsoft.com/office/officeart/2005/8/layout/vList2"/>
-    <dgm:cxn modelId="{2F3EECC4-15B6-4560-A7D0-C01E1E99200E}" srcId="{2D36E825-4ACE-45FF-9A82-A07828909465}" destId="{6E0EABB4-8FD4-4A31-BD32-71E547315439}" srcOrd="1" destOrd="0" parTransId="{95D09281-F1D7-4188-8EE7-854B701AF533}" sibTransId="{6209FA6D-8B4E-41AD-8D38-DBCFB2DFB1FB}"/>
-    <dgm:cxn modelId="{468E1276-49A4-427C-9635-5464C82F8338}" type="presOf" srcId="{E9705339-6862-4592-949E-99BA249F19D1}" destId="{8E384E35-9385-455F-B372-4AA6FE4C9346}" srcOrd="0" destOrd="0" presId="urn:microsoft.com/office/officeart/2005/8/layout/vList2"/>
-    <dgm:cxn modelId="{03E26BDF-5D4F-478D-B8F8-F2E5FCA7B9F8}" srcId="{2D36E825-4ACE-45FF-9A82-A07828909465}" destId="{A5C752E3-5F20-413C-96F0-081937642392}" srcOrd="2" destOrd="0" parTransId="{11EC339E-6CE9-4164-A730-957FA9F5DFA7}" sibTransId="{9382DBC6-5FC6-4FD1-8597-6E3833FBCCFD}"/>
-    <dgm:cxn modelId="{A643151B-3E22-4B18-8884-B35007EC6172}" srcId="{E07D3DF8-B531-453C-B599-898D9D03A724}" destId="{A6C8BD6C-B3B2-4605-8970-343DCDE52EF2}" srcOrd="2" destOrd="0" parTransId="{B4F2E15E-1C80-4166-8AB2-D3523720A631}" sibTransId="{1DEDE7B7-B08A-462B-8B72-29F3AA43F8B3}"/>
-    <dgm:cxn modelId="{649E1C9A-C4FD-4E90-9094-E80372FE3B54}" srcId="{E07D3DF8-B531-453C-B599-898D9D03A724}" destId="{2D36E825-4ACE-45FF-9A82-A07828909465}" srcOrd="0" destOrd="0" parTransId="{B4AFEE9B-1623-480E-AD65-DE7486D44E39}" sibTransId="{3CA66D8E-C79A-4301-B374-30BE44E4CC8F}"/>
     <dgm:cxn modelId="{EDFC91EA-EE13-4EE1-91F8-56E13C73E6F0}" type="presParOf" srcId="{AE563F13-1AA5-450D-9916-2F11638C1DA9}" destId="{401ECA87-A414-4C2E-815B-2E740FECD9DF}" srcOrd="0" destOrd="0" presId="urn:microsoft.com/office/officeart/2005/8/layout/vList2"/>
     <dgm:cxn modelId="{CFFCD5FA-DD6D-4A45-8DD3-92B9AF0A6280}" type="presParOf" srcId="{AE563F13-1AA5-450D-9916-2F11638C1DA9}" destId="{C7130AF6-5BCF-4F29-BA34-95CB85B72764}" srcOrd="1" destOrd="0" presId="urn:microsoft.com/office/officeart/2005/8/layout/vList2"/>
     <dgm:cxn modelId="{3AF01595-9CA6-4EB1-9E62-04B0C173F5E6}" type="presParOf" srcId="{AE563F13-1AA5-450D-9916-2F11638C1DA9}" destId="{78DA6840-523F-44DE-8870-8809A7BF9028}" srcOrd="2" destOrd="0" presId="urn:microsoft.com/office/officeart/2005/8/layout/vList2"/>
@@ -5273,14 +5273,14 @@
   <dgm:whole/>
   <dgm:extLst>
     <a:ext uri="http://schemas.microsoft.com/office/drawing/2008/diagram">
-      <dsp:dataModelExt xmlns:dsp="http://schemas.microsoft.com/office/drawing/2008/diagram" xmlns="" relId="rId6" minVer="http://schemas.openxmlformats.org/drawingml/2006/diagram"/>
+      <dsp:dataModelExt xmlns:dsp="http://schemas.microsoft.com/office/drawing/2008/diagram" relId="rId6" minVer="http://schemas.openxmlformats.org/drawingml/2006/diagram"/>
     </a:ext>
   </dgm:extLst>
 </dgm:dataModel>
 </file>
 
 <file path=ppt/diagrams/drawing1.xml><?xml version="1.0" encoding="utf-8"?>
-<dsp:drawing xmlns:dgm="http://schemas.openxmlformats.org/drawingml/2006/diagram" xmlns:a="http://schemas.openxmlformats.org/drawingml/2006/main" xmlns:dsp="http://schemas.microsoft.com/office/drawing/2008/diagram">
+<dsp:drawing xmlns:dgm="http://schemas.openxmlformats.org/drawingml/2006/diagram" xmlns:dsp="http://schemas.microsoft.com/office/drawing/2008/diagram" xmlns:a="http://schemas.openxmlformats.org/drawingml/2006/main">
   <dsp:spTree>
     <dsp:nvGrpSpPr>
       <dsp:cNvPr id="0" name=""/>
@@ -5360,8 +5360,8 @@
         </a:p>
       </dsp:txBody>
       <dsp:txXfrm>
-        <a:off x="0" y="56842"/>
-        <a:ext cx="7242259" cy="444600"/>
+        <a:off x="21704" y="78546"/>
+        <a:ext cx="7198851" cy="401192"/>
       </dsp:txXfrm>
     </dsp:sp>
     <dsp:sp modelId="{C7130AF6-5BCF-4F29-BA34-95CB85B72764}">
@@ -5517,8 +5517,8 @@
         </a:p>
       </dsp:txBody>
       <dsp:txXfrm>
-        <a:off x="0" y="1189717"/>
-        <a:ext cx="7242259" cy="444600"/>
+        <a:off x="21704" y="1211421"/>
+        <a:ext cx="7198851" cy="401192"/>
       </dsp:txXfrm>
     </dsp:sp>
     <dsp:sp modelId="{0FB52419-7EF2-4113-8849-3B16BAEC9DD7}">
@@ -5655,8 +5655,8 @@
         </a:p>
       </dsp:txBody>
       <dsp:txXfrm>
-        <a:off x="0" y="2086612"/>
-        <a:ext cx="7242259" cy="444600"/>
+        <a:off x="21704" y="2108316"/>
+        <a:ext cx="7198851" cy="401192"/>
       </dsp:txXfrm>
     </dsp:sp>
     <dsp:sp modelId="{3FFC3410-A2D0-4B28-A055-BFAC61BCB93F}">
@@ -5793,8 +5793,8 @@
         </a:p>
       </dsp:txBody>
       <dsp:txXfrm>
-        <a:off x="0" y="2845852"/>
-        <a:ext cx="7242259" cy="444600"/>
+        <a:off x="21704" y="2867556"/>
+        <a:ext cx="7198851" cy="401192"/>
       </dsp:txXfrm>
     </dsp:sp>
     <dsp:sp modelId="{9C495DF5-169D-4A31-B3DB-88DFF8C7AB22}">
@@ -5930,8 +5930,8 @@
         </a:p>
       </dsp:txBody>
       <dsp:txXfrm>
-        <a:off x="0" y="3605092"/>
-        <a:ext cx="7242259" cy="444600"/>
+        <a:off x="21704" y="3626796"/>
+        <a:ext cx="7198851" cy="401192"/>
       </dsp:txXfrm>
     </dsp:sp>
     <dsp:sp modelId="{5EE99CAA-C70B-49D9-9943-E42F93D8C815}">
@@ -5999,7 +5999,7 @@
 </file>
 
 <file path=ppt/diagrams/drawing2.xml><?xml version="1.0" encoding="utf-8"?>
-<dsp:drawing xmlns:dgm="http://schemas.openxmlformats.org/drawingml/2006/diagram" xmlns:a="http://schemas.openxmlformats.org/drawingml/2006/main" xmlns:dsp="http://schemas.microsoft.com/office/drawing/2008/diagram">
+<dsp:drawing xmlns:dgm="http://schemas.openxmlformats.org/drawingml/2006/diagram" xmlns:dsp="http://schemas.microsoft.com/office/drawing/2008/diagram" xmlns:a="http://schemas.openxmlformats.org/drawingml/2006/main">
   <dsp:spTree>
     <dsp:nvGrpSpPr>
       <dsp:cNvPr id="0" name=""/>
@@ -6079,8 +6079,8 @@
         </a:p>
       </dsp:txBody>
       <dsp:txXfrm>
-        <a:off x="0" y="77673"/>
-        <a:ext cx="7169544" cy="608400"/>
+        <a:off x="29700" y="107373"/>
+        <a:ext cx="7110144" cy="549000"/>
       </dsp:txXfrm>
     </dsp:sp>
     <dsp:sp modelId="{C7130AF6-5BCF-4F29-BA34-95CB85B72764}">
@@ -6217,8 +6217,8 @@
         </a:p>
       </dsp:txBody>
       <dsp:txXfrm>
-        <a:off x="0" y="1278093"/>
-        <a:ext cx="7169544" cy="608400"/>
+        <a:off x="29700" y="1307793"/>
+        <a:ext cx="7110144" cy="549000"/>
       </dsp:txXfrm>
     </dsp:sp>
     <dsp:sp modelId="{9C495DF5-169D-4A31-B3DB-88DFF8C7AB22}">
@@ -6354,8 +6354,8 @@
         </a:p>
       </dsp:txBody>
       <dsp:txXfrm>
-        <a:off x="0" y="2747613"/>
-        <a:ext cx="7169544" cy="608400"/>
+        <a:off x="29700" y="2777313"/>
+        <a:ext cx="7110144" cy="549000"/>
       </dsp:txXfrm>
     </dsp:sp>
     <dsp:sp modelId="{5EE99CAA-C70B-49D9-9943-E42F93D8C815}">
@@ -6423,7 +6423,7 @@
 </file>
 
 <file path=ppt/diagrams/drawing3.xml><?xml version="1.0" encoding="utf-8"?>
-<dsp:drawing xmlns:dgm="http://schemas.openxmlformats.org/drawingml/2006/diagram" xmlns:a="http://schemas.openxmlformats.org/drawingml/2006/main" xmlns:dsp="http://schemas.microsoft.com/office/drawing/2008/diagram">
+<dsp:drawing xmlns:dgm="http://schemas.openxmlformats.org/drawingml/2006/diagram" xmlns:dsp="http://schemas.microsoft.com/office/drawing/2008/diagram" xmlns:a="http://schemas.openxmlformats.org/drawingml/2006/main">
   <dsp:spTree>
     <dsp:nvGrpSpPr>
       <dsp:cNvPr id="0" name=""/>
@@ -6503,8 +6503,8 @@
         </a:p>
       </dsp:txBody>
       <dsp:txXfrm>
-        <a:off x="0" y="65571"/>
-        <a:ext cx="7363752" cy="421200"/>
+        <a:off x="20561" y="86132"/>
+        <a:ext cx="7322630" cy="380078"/>
       </dsp:txXfrm>
     </dsp:sp>
     <dsp:sp modelId="{C7130AF6-5BCF-4F29-BA34-95CB85B72764}">
@@ -6641,8 +6641,8 @@
         </a:p>
       </dsp:txBody>
       <dsp:txXfrm>
-        <a:off x="0" y="905946"/>
-        <a:ext cx="7363752" cy="421200"/>
+        <a:off x="20561" y="926507"/>
+        <a:ext cx="7322630" cy="380078"/>
       </dsp:txXfrm>
     </dsp:sp>
     <dsp:sp modelId="{9C495DF5-169D-4A31-B3DB-88DFF8C7AB22}">
@@ -6778,8 +6778,8 @@
         </a:p>
       </dsp:txBody>
       <dsp:txXfrm>
-        <a:off x="0" y="1746321"/>
-        <a:ext cx="7363752" cy="421200"/>
+        <a:off x="20561" y="1766882"/>
+        <a:ext cx="7322630" cy="380078"/>
       </dsp:txXfrm>
     </dsp:sp>
     <dsp:sp modelId="{5EE99CAA-C70B-49D9-9943-E42F93D8C815}">
@@ -6914,8 +6914,8 @@
         </a:p>
       </dsp:txBody>
       <dsp:txXfrm>
-        <a:off x="0" y="2604074"/>
-        <a:ext cx="7363752" cy="421200"/>
+        <a:off x="20561" y="2624635"/>
+        <a:ext cx="7322630" cy="380078"/>
       </dsp:txXfrm>
     </dsp:sp>
     <dsp:sp modelId="{7E58D7A6-E1A3-4F64-B2F9-76B3525CD76E}">
@@ -7050,8 +7050,8 @@
         </a:p>
       </dsp:txBody>
       <dsp:txXfrm>
-        <a:off x="0" y="3790356"/>
-        <a:ext cx="7363752" cy="421200"/>
+        <a:off x="20561" y="3810917"/>
+        <a:ext cx="7322630" cy="380078"/>
       </dsp:txXfrm>
     </dsp:sp>
     <dsp:sp modelId="{C4D7444D-E9C0-4694-BF04-B566F459108B}">
@@ -7119,7 +7119,7 @@
 </file>
 
 <file path=ppt/diagrams/drawing4.xml><?xml version="1.0" encoding="utf-8"?>
-<dsp:drawing xmlns:dgm="http://schemas.openxmlformats.org/drawingml/2006/diagram" xmlns:a="http://schemas.openxmlformats.org/drawingml/2006/main" xmlns:dsp="http://schemas.microsoft.com/office/drawing/2008/diagram">
+<dsp:drawing xmlns:dgm="http://schemas.openxmlformats.org/drawingml/2006/diagram" xmlns:dsp="http://schemas.microsoft.com/office/drawing/2008/diagram" xmlns:a="http://schemas.openxmlformats.org/drawingml/2006/main">
   <dsp:spTree>
     <dsp:nvGrpSpPr>
       <dsp:cNvPr id="0" name=""/>
@@ -7199,8 +7199,8 @@
         </a:p>
       </dsp:txBody>
       <dsp:txXfrm>
-        <a:off x="0" y="507291"/>
-        <a:ext cx="7363752" cy="491399"/>
+        <a:off x="23988" y="531279"/>
+        <a:ext cx="7315776" cy="443423"/>
       </dsp:txXfrm>
     </dsp:sp>
     <dsp:sp modelId="{C7130AF6-5BCF-4F29-BA34-95CB85B72764}">
@@ -7398,8 +7398,8 @@
         </a:p>
       </dsp:txBody>
       <dsp:txXfrm>
-        <a:off x="0" y="2041971"/>
-        <a:ext cx="7363752" cy="491399"/>
+        <a:off x="23988" y="2065959"/>
+        <a:ext cx="7315776" cy="443423"/>
       </dsp:txXfrm>
     </dsp:sp>
     <dsp:sp modelId="{5AF62516-935A-4716-BC3C-96D1A9708875}">
@@ -7474,8 +7474,8 @@
         </a:p>
       </dsp:txBody>
       <dsp:txXfrm>
-        <a:off x="0" y="2593851"/>
-        <a:ext cx="7363752" cy="491399"/>
+        <a:off x="23988" y="2617839"/>
+        <a:ext cx="7315776" cy="443423"/>
       </dsp:txXfrm>
     </dsp:sp>
     <dsp:sp modelId="{8E384E35-9385-455F-B372-4AA6FE4C9346}">
@@ -7550,8 +7550,8 @@
         </a:p>
       </dsp:txBody>
       <dsp:txXfrm>
-        <a:off x="0" y="3147074"/>
-        <a:ext cx="7363752" cy="491399"/>
+        <a:off x="23988" y="3171062"/>
+        <a:ext cx="7315776" cy="443423"/>
       </dsp:txXfrm>
     </dsp:sp>
     <dsp:sp modelId="{1A51C3D3-58C0-4069-AB0A-A95B0B4B888D}">
@@ -7626,8 +7626,8 @@
         </a:p>
       </dsp:txBody>
       <dsp:txXfrm>
-        <a:off x="0" y="3697611"/>
-        <a:ext cx="7363752" cy="491399"/>
+        <a:off x="23988" y="3721599"/>
+        <a:ext cx="7315776" cy="443423"/>
       </dsp:txXfrm>
     </dsp:sp>
   </dsp:spTree>
@@ -12666,7 +12666,7 @@
     </p:spTree>
     <p:extLst>
       <p:ext uri="{BB962C8B-B14F-4D97-AF65-F5344CB8AC3E}">
-        <p14:creationId xmlns:p14="http://schemas.microsoft.com/office/powerpoint/2010/main" xmlns="" val="2505596649"/>
+        <p14:creationId xmlns:p14="http://schemas.microsoft.com/office/powerpoint/2010/main" val="2505596649"/>
       </p:ext>
     </p:extLst>
   </p:cSld>
@@ -12828,7 +12828,7 @@
           </a:ln>
           <a:extLst>
             <a:ext uri="{909E8E84-426E-40DD-AFC4-6F175D3DCCD1}">
-              <a14:hiddenFill xmlns:a14="http://schemas.microsoft.com/office/drawing/2010/main" xmlns="">
+              <a14:hiddenFill xmlns:a14="http://schemas.microsoft.com/office/drawing/2010/main">
                 <a:solidFill>
                   <a:srgbClr val="FFFFFF"/>
                 </a:solidFill>
@@ -13009,7 +13009,7 @@
     </p:spTree>
     <p:extLst>
       <p:ext uri="{BB962C8B-B14F-4D97-AF65-F5344CB8AC3E}">
-        <p14:creationId xmlns:p14="http://schemas.microsoft.com/office/powerpoint/2010/main" xmlns="" val="2057188744"/>
+        <p14:creationId xmlns:p14="http://schemas.microsoft.com/office/powerpoint/2010/main" val="2057188744"/>
       </p:ext>
     </p:extLst>
   </p:cSld>
@@ -13185,14 +13185,14 @@
           <a:ln/>
           <a:extLst>
             <a:ext uri="{909E8E84-426E-40DD-AFC4-6F175D3DCCD1}">
-              <a14:hiddenFill xmlns:a14="http://schemas.microsoft.com/office/drawing/2010/main" xmlns="">
+              <a14:hiddenFill xmlns:a14="http://schemas.microsoft.com/office/drawing/2010/main">
                 <a:solidFill>
                   <a:srgbClr val="FFFFFF"/>
                 </a:solidFill>
               </a14:hiddenFill>
             </a:ext>
             <a:ext uri="{91240B29-F687-4F45-9708-019B960494DF}">
-              <a14:hiddenLine xmlns:a14="http://schemas.microsoft.com/office/drawing/2010/main" xmlns="" w="9525">
+              <a14:hiddenLine xmlns:a14="http://schemas.microsoft.com/office/drawing/2010/main" w="9525">
                 <a:solidFill>
                   <a:srgbClr val="000000"/>
                 </a:solidFill>
@@ -13228,14 +13228,14 @@
           <a:ln/>
           <a:extLst>
             <a:ext uri="{909E8E84-426E-40DD-AFC4-6F175D3DCCD1}">
-              <a14:hiddenFill xmlns:a14="http://schemas.microsoft.com/office/drawing/2010/main" xmlns="">
+              <a14:hiddenFill xmlns:a14="http://schemas.microsoft.com/office/drawing/2010/main">
                 <a:solidFill>
                   <a:srgbClr val="FFFFFF"/>
                 </a:solidFill>
               </a14:hiddenFill>
             </a:ext>
             <a:ext uri="{91240B29-F687-4F45-9708-019B960494DF}">
-              <a14:hiddenLine xmlns:a14="http://schemas.microsoft.com/office/drawing/2010/main" xmlns="" w="9525">
+              <a14:hiddenLine xmlns:a14="http://schemas.microsoft.com/office/drawing/2010/main" w="9525">
                 <a:solidFill>
                   <a:srgbClr val="000000"/>
                 </a:solidFill>
@@ -13368,7 +13368,7 @@
     </p:spTree>
     <p:extLst>
       <p:ext uri="{BB962C8B-B14F-4D97-AF65-F5344CB8AC3E}">
-        <p14:creationId xmlns:p14="http://schemas.microsoft.com/office/powerpoint/2010/main" xmlns="" val="3818956960"/>
+        <p14:creationId xmlns:p14="http://schemas.microsoft.com/office/powerpoint/2010/main" val="3818956960"/>
       </p:ext>
     </p:extLst>
   </p:cSld>
@@ -13407,7 +13407,7 @@
           <a:blip r:embed="rId2" cstate="print">
             <a:extLst>
               <a:ext uri="{28A0092B-C50C-407E-A947-70E740481C1C}">
-                <a14:useLocalDpi xmlns:a14="http://schemas.microsoft.com/office/drawing/2010/main" xmlns="" val="0"/>
+                <a14:useLocalDpi xmlns:a14="http://schemas.microsoft.com/office/drawing/2010/main" val="0"/>
               </a:ext>
             </a:extLst>
           </a:blip>
@@ -13430,14 +13430,14 @@
           </a:ln>
           <a:extLst>
             <a:ext uri="{909E8E84-426E-40DD-AFC4-6F175D3DCCD1}">
-              <a14:hiddenFill xmlns:a14="http://schemas.microsoft.com/office/drawing/2010/main" xmlns="">
+              <a14:hiddenFill xmlns:a14="http://schemas.microsoft.com/office/drawing/2010/main">
                 <a:solidFill>
                   <a:srgbClr val="FFFFFF"/>
                 </a:solidFill>
               </a14:hiddenFill>
             </a:ext>
             <a:ext uri="{91240B29-F687-4F45-9708-019B960494DF}">
-              <a14:hiddenLine xmlns:a14="http://schemas.microsoft.com/office/drawing/2010/main" xmlns="" w="9525">
+              <a14:hiddenLine xmlns:a14="http://schemas.microsoft.com/office/drawing/2010/main" w="9525">
                 <a:solidFill>
                   <a:srgbClr val="000000"/>
                 </a:solidFill>
@@ -13515,7 +13515,7 @@
           </a:ln>
           <a:extLst>
             <a:ext uri="{91240B29-F687-4F45-9708-019B960494DF}">
-              <a14:hiddenLine xmlns:a14="http://schemas.microsoft.com/office/drawing/2010/main" xmlns="" w="9525">
+              <a14:hiddenLine xmlns:a14="http://schemas.microsoft.com/office/drawing/2010/main" w="9525">
                 <a:solidFill>
                   <a:srgbClr val="000000"/>
                 </a:solidFill>
@@ -13653,7 +13653,7 @@
           <a:blip r:embed="rId3" cstate="print">
             <a:extLst>
               <a:ext uri="{28A0092B-C50C-407E-A947-70E740481C1C}">
-                <a14:useLocalDpi xmlns:a14="http://schemas.microsoft.com/office/drawing/2010/main" xmlns="" val="0"/>
+                <a14:useLocalDpi xmlns:a14="http://schemas.microsoft.com/office/drawing/2010/main" val="0"/>
               </a:ext>
             </a:extLst>
           </a:blip>
@@ -13676,14 +13676,14 @@
           </a:ln>
           <a:extLst>
             <a:ext uri="{909E8E84-426E-40DD-AFC4-6F175D3DCCD1}">
-              <a14:hiddenFill xmlns:a14="http://schemas.microsoft.com/office/drawing/2010/main" xmlns="">
+              <a14:hiddenFill xmlns:a14="http://schemas.microsoft.com/office/drawing/2010/main">
                 <a:solidFill>
                   <a:srgbClr val="FFFFFF"/>
                 </a:solidFill>
               </a14:hiddenFill>
             </a:ext>
             <a:ext uri="{91240B29-F687-4F45-9708-019B960494DF}">
-              <a14:hiddenLine xmlns:a14="http://schemas.microsoft.com/office/drawing/2010/main" xmlns="" w="9525">
+              <a14:hiddenLine xmlns:a14="http://schemas.microsoft.com/office/drawing/2010/main" w="9525">
                 <a:solidFill>
                   <a:srgbClr val="000000"/>
                 </a:solidFill>
@@ -13714,7 +13714,7 @@
             </a:duotone>
             <a:extLst>
               <a:ext uri="{28A0092B-C50C-407E-A947-70E740481C1C}">
-                <a14:useLocalDpi xmlns:a14="http://schemas.microsoft.com/office/drawing/2010/main" xmlns="" val="0"/>
+                <a14:useLocalDpi xmlns:a14="http://schemas.microsoft.com/office/drawing/2010/main" val="0"/>
               </a:ext>
             </a:extLst>
           </a:blip>
@@ -13876,7 +13876,7 @@
     </p:spTree>
     <p:extLst>
       <p:ext uri="{BB962C8B-B14F-4D97-AF65-F5344CB8AC3E}">
-        <p14:creationId xmlns:p14="http://schemas.microsoft.com/office/powerpoint/2010/main" xmlns="" val="419336918"/>
+        <p14:creationId xmlns:p14="http://schemas.microsoft.com/office/powerpoint/2010/main" val="419336918"/>
       </p:ext>
     </p:extLst>
   </p:cSld>
@@ -13918,7 +13918,7 @@
           <a:blip r:embed="rId2" cstate="print">
             <a:extLst>
               <a:ext uri="{28A0092B-C50C-407E-A947-70E740481C1C}">
-                <a14:useLocalDpi xmlns:a14="http://schemas.microsoft.com/office/drawing/2010/main" xmlns="" val="0"/>
+                <a14:useLocalDpi xmlns:a14="http://schemas.microsoft.com/office/drawing/2010/main" val="0"/>
               </a:ext>
             </a:extLst>
           </a:blip>
@@ -13941,14 +13941,14 @@
           </a:ln>
           <a:extLst>
             <a:ext uri="{909E8E84-426E-40DD-AFC4-6F175D3DCCD1}">
-              <a14:hiddenFill xmlns:a14="http://schemas.microsoft.com/office/drawing/2010/main" xmlns="">
+              <a14:hiddenFill xmlns:a14="http://schemas.microsoft.com/office/drawing/2010/main">
                 <a:solidFill>
                   <a:srgbClr val="FFFFFF"/>
                 </a:solidFill>
               </a14:hiddenFill>
             </a:ext>
             <a:ext uri="{91240B29-F687-4F45-9708-019B960494DF}">
-              <a14:hiddenLine xmlns:a14="http://schemas.microsoft.com/office/drawing/2010/main" xmlns="" w="9525">
+              <a14:hiddenLine xmlns:a14="http://schemas.microsoft.com/office/drawing/2010/main" w="9525">
                 <a:solidFill>
                   <a:srgbClr val="000000"/>
                 </a:solidFill>
@@ -13972,7 +13972,7 @@
           <a:blip r:embed="rId3" cstate="print">
             <a:extLst>
               <a:ext uri="{28A0092B-C50C-407E-A947-70E740481C1C}">
-                <a14:useLocalDpi xmlns:a14="http://schemas.microsoft.com/office/drawing/2010/main" xmlns="" val="0"/>
+                <a14:useLocalDpi xmlns:a14="http://schemas.microsoft.com/office/drawing/2010/main" val="0"/>
               </a:ext>
             </a:extLst>
           </a:blip>
@@ -13995,14 +13995,14 @@
           </a:ln>
           <a:extLst>
             <a:ext uri="{909E8E84-426E-40DD-AFC4-6F175D3DCCD1}">
-              <a14:hiddenFill xmlns:a14="http://schemas.microsoft.com/office/drawing/2010/main" xmlns="">
+              <a14:hiddenFill xmlns:a14="http://schemas.microsoft.com/office/drawing/2010/main">
                 <a:solidFill>
                   <a:srgbClr val="FFFFFF"/>
                 </a:solidFill>
               </a14:hiddenFill>
             </a:ext>
             <a:ext uri="{91240B29-F687-4F45-9708-019B960494DF}">
-              <a14:hiddenLine xmlns:a14="http://schemas.microsoft.com/office/drawing/2010/main" xmlns="" w="9525">
+              <a14:hiddenLine xmlns:a14="http://schemas.microsoft.com/office/drawing/2010/main" w="9525">
                 <a:solidFill>
                   <a:srgbClr val="000000"/>
                 </a:solidFill>
@@ -14075,7 +14075,7 @@
             </a:duotone>
             <a:extLst>
               <a:ext uri="{28A0092B-C50C-407E-A947-70E740481C1C}">
-                <a14:useLocalDpi xmlns:a14="http://schemas.microsoft.com/office/drawing/2010/main" xmlns="" val="0"/>
+                <a14:useLocalDpi xmlns:a14="http://schemas.microsoft.com/office/drawing/2010/main" val="0"/>
               </a:ext>
             </a:extLst>
           </a:blip>
@@ -14169,7 +14169,7 @@
     </p:spTree>
     <p:extLst>
       <p:ext uri="{BB962C8B-B14F-4D97-AF65-F5344CB8AC3E}">
-        <p14:creationId xmlns:p14="http://schemas.microsoft.com/office/powerpoint/2010/main" xmlns="" val="3980436823"/>
+        <p14:creationId xmlns:p14="http://schemas.microsoft.com/office/powerpoint/2010/main" val="3980436823"/>
       </p:ext>
     </p:extLst>
   </p:cSld>
@@ -14211,7 +14211,7 @@
           <a:blip r:embed="rId2" cstate="print">
             <a:extLst>
               <a:ext uri="{28A0092B-C50C-407E-A947-70E740481C1C}">
-                <a14:useLocalDpi xmlns:a14="http://schemas.microsoft.com/office/drawing/2010/main" xmlns="" val="0"/>
+                <a14:useLocalDpi xmlns:a14="http://schemas.microsoft.com/office/drawing/2010/main" val="0"/>
               </a:ext>
             </a:extLst>
           </a:blip>
@@ -14234,14 +14234,14 @@
           </a:ln>
           <a:extLst>
             <a:ext uri="{909E8E84-426E-40DD-AFC4-6F175D3DCCD1}">
-              <a14:hiddenFill xmlns:a14="http://schemas.microsoft.com/office/drawing/2010/main" xmlns="">
+              <a14:hiddenFill xmlns:a14="http://schemas.microsoft.com/office/drawing/2010/main">
                 <a:solidFill>
                   <a:srgbClr val="FFFFFF"/>
                 </a:solidFill>
               </a14:hiddenFill>
             </a:ext>
             <a:ext uri="{91240B29-F687-4F45-9708-019B960494DF}">
-              <a14:hiddenLine xmlns:a14="http://schemas.microsoft.com/office/drawing/2010/main" xmlns="" w="9525">
+              <a14:hiddenLine xmlns:a14="http://schemas.microsoft.com/office/drawing/2010/main" w="9525">
                 <a:solidFill>
                   <a:srgbClr val="000000"/>
                 </a:solidFill>
@@ -14265,7 +14265,7 @@
           <a:blip r:embed="rId3" cstate="print">
             <a:extLst>
               <a:ext uri="{28A0092B-C50C-407E-A947-70E740481C1C}">
-                <a14:useLocalDpi xmlns:a14="http://schemas.microsoft.com/office/drawing/2010/main" xmlns="" val="0"/>
+                <a14:useLocalDpi xmlns:a14="http://schemas.microsoft.com/office/drawing/2010/main" val="0"/>
               </a:ext>
             </a:extLst>
           </a:blip>
@@ -14288,14 +14288,14 @@
           </a:ln>
           <a:extLst>
             <a:ext uri="{909E8E84-426E-40DD-AFC4-6F175D3DCCD1}">
-              <a14:hiddenFill xmlns:a14="http://schemas.microsoft.com/office/drawing/2010/main" xmlns="">
+              <a14:hiddenFill xmlns:a14="http://schemas.microsoft.com/office/drawing/2010/main">
                 <a:solidFill>
                   <a:srgbClr val="FFFFFF"/>
                 </a:solidFill>
               </a14:hiddenFill>
             </a:ext>
             <a:ext uri="{91240B29-F687-4F45-9708-019B960494DF}">
-              <a14:hiddenLine xmlns:a14="http://schemas.microsoft.com/office/drawing/2010/main" xmlns="" w="9525">
+              <a14:hiddenLine xmlns:a14="http://schemas.microsoft.com/office/drawing/2010/main" w="9525">
                 <a:solidFill>
                   <a:srgbClr val="000000"/>
                 </a:solidFill>
@@ -14368,7 +14368,7 @@
             </a:duotone>
             <a:extLst>
               <a:ext uri="{28A0092B-C50C-407E-A947-70E740481C1C}">
-                <a14:useLocalDpi xmlns:a14="http://schemas.microsoft.com/office/drawing/2010/main" xmlns="" val="0"/>
+                <a14:useLocalDpi xmlns:a14="http://schemas.microsoft.com/office/drawing/2010/main" val="0"/>
               </a:ext>
             </a:extLst>
           </a:blip>
@@ -14478,7 +14478,7 @@
           <a:ln/>
           <a:extLst>
             <a:ext uri="{909E8E84-426E-40DD-AFC4-6F175D3DCCD1}">
-              <a14:hiddenFill xmlns:a14="http://schemas.microsoft.com/office/drawing/2010/main" xmlns="">
+              <a14:hiddenFill xmlns:a14="http://schemas.microsoft.com/office/drawing/2010/main">
                 <a:solidFill>
                   <a:srgbClr val="FFFFFF">
                     <a:alpha val="0"/>
@@ -14522,7 +14522,7 @@
     </p:spTree>
     <p:extLst>
       <p:ext uri="{BB962C8B-B14F-4D97-AF65-F5344CB8AC3E}">
-        <p14:creationId xmlns:p14="http://schemas.microsoft.com/office/powerpoint/2010/main" xmlns="" val="3550375277"/>
+        <p14:creationId xmlns:p14="http://schemas.microsoft.com/office/powerpoint/2010/main" val="3550375277"/>
       </p:ext>
     </p:extLst>
   </p:cSld>
@@ -14704,7 +14704,7 @@
             <a:fld id="{E906F336-2E39-43F8-9DF9-B9244679DDFB}" type="datetime5">
               <a:rPr lang="en-US" altLang="pl-PL"/>
               <a:pPr/>
-              <a:t>21-Feb-17</a:t>
+              <a:t>23-Feb-17</a:t>
             </a:fld>
             <a:endParaRPr lang="en-US" altLang="pl-PL"/>
           </a:p>
@@ -14776,7 +14776,7 @@
     </p:spTree>
     <p:extLst>
       <p:ext uri="{BB962C8B-B14F-4D97-AF65-F5344CB8AC3E}">
-        <p14:creationId xmlns:p14="http://schemas.microsoft.com/office/powerpoint/2010/main" xmlns="" val="614391971"/>
+        <p14:creationId xmlns:p14="http://schemas.microsoft.com/office/powerpoint/2010/main" val="614391971"/>
       </p:ext>
     </p:extLst>
   </p:cSld>
@@ -15031,7 +15031,7 @@
             <a:fld id="{7B2EBB8C-B024-47EA-BB67-9AC43555CB71}" type="datetime5">
               <a:rPr lang="en-US" altLang="pl-PL"/>
               <a:pPr/>
-              <a:t>21-Feb-17</a:t>
+              <a:t>23-Feb-17</a:t>
             </a:fld>
             <a:endParaRPr lang="en-US" altLang="pl-PL"/>
           </a:p>
@@ -15103,7 +15103,7 @@
     </p:spTree>
     <p:extLst>
       <p:ext uri="{BB962C8B-B14F-4D97-AF65-F5344CB8AC3E}">
-        <p14:creationId xmlns:p14="http://schemas.microsoft.com/office/powerpoint/2010/main" xmlns="" val="2153308106"/>
+        <p14:creationId xmlns:p14="http://schemas.microsoft.com/office/powerpoint/2010/main" val="2153308106"/>
       </p:ext>
     </p:extLst>
   </p:cSld>
@@ -15595,7 +15595,7 @@
             <a:fld id="{AF037DEB-4CF1-4C5F-B037-398229B9C945}" type="datetime5">
               <a:rPr lang="en-US" altLang="pl-PL"/>
               <a:pPr/>
-              <a:t>21-Feb-17</a:t>
+              <a:t>23-Feb-17</a:t>
             </a:fld>
             <a:endParaRPr lang="de-DE" altLang="pl-PL"/>
           </a:p>
@@ -15662,7 +15662,7 @@
     </p:spTree>
     <p:extLst>
       <p:ext uri="{BB962C8B-B14F-4D97-AF65-F5344CB8AC3E}">
-        <p14:creationId xmlns:p14="http://schemas.microsoft.com/office/powerpoint/2010/main" xmlns="" val="2263958231"/>
+        <p14:creationId xmlns:p14="http://schemas.microsoft.com/office/powerpoint/2010/main" val="2263958231"/>
       </p:ext>
     </p:extLst>
   </p:cSld>
@@ -15745,7 +15745,7 @@
             <a:fld id="{9D49F2BD-E1AC-4AED-B4E5-321CBE4AD3D2}" type="datetime5">
               <a:rPr lang="en-US" altLang="pl-PL"/>
               <a:pPr/>
-              <a:t>21-Feb-17</a:t>
+              <a:t>23-Feb-17</a:t>
             </a:fld>
             <a:endParaRPr lang="en-US" altLang="pl-PL"/>
           </a:p>
@@ -15817,7 +15817,7 @@
     </p:spTree>
     <p:extLst>
       <p:ext uri="{BB962C8B-B14F-4D97-AF65-F5344CB8AC3E}">
-        <p14:creationId xmlns:p14="http://schemas.microsoft.com/office/powerpoint/2010/main" xmlns="" val="578267505"/>
+        <p14:creationId xmlns:p14="http://schemas.microsoft.com/office/powerpoint/2010/main" val="578267505"/>
       </p:ext>
     </p:extLst>
   </p:cSld>
@@ -15871,7 +15871,7 @@
           </a:ln>
           <a:extLst>
             <a:ext uri="{91240B29-F687-4F45-9708-019B960494DF}">
-              <a14:hiddenLine xmlns:a14="http://schemas.microsoft.com/office/drawing/2010/main" xmlns="" w="9525">
+              <a14:hiddenLine xmlns:a14="http://schemas.microsoft.com/office/drawing/2010/main" w="9525">
                 <a:solidFill>
                   <a:srgbClr val="000000"/>
                 </a:solidFill>
@@ -16019,7 +16019,7 @@
             <a:fld id="{6DE49DB7-DE0A-4B13-98D6-E8B911A92E91}" type="datetime5">
               <a:rPr lang="en-US" altLang="pl-PL"/>
               <a:pPr/>
-              <a:t>21-Feb-17</a:t>
+              <a:t>23-Feb-17</a:t>
             </a:fld>
             <a:endParaRPr lang="en-US" altLang="pl-PL"/>
           </a:p>
@@ -16085,7 +16085,7 @@
     </p:spTree>
     <p:extLst>
       <p:ext uri="{BB962C8B-B14F-4D97-AF65-F5344CB8AC3E}">
-        <p14:creationId xmlns:p14="http://schemas.microsoft.com/office/powerpoint/2010/main" xmlns="" val="806562212"/>
+        <p14:creationId xmlns:p14="http://schemas.microsoft.com/office/powerpoint/2010/main" val="806562212"/>
       </p:ext>
     </p:extLst>
   </p:cSld>
@@ -16135,7 +16135,7 @@
           <a:blip r:embed="rId14" cstate="print">
             <a:extLst>
               <a:ext uri="{28A0092B-C50C-407E-A947-70E740481C1C}">
-                <a14:useLocalDpi xmlns:a14="http://schemas.microsoft.com/office/drawing/2010/main" xmlns="" val="0"/>
+                <a14:useLocalDpi xmlns:a14="http://schemas.microsoft.com/office/drawing/2010/main" val="0"/>
               </a:ext>
             </a:extLst>
           </a:blip>
@@ -16158,14 +16158,14 @@
           </a:ln>
           <a:extLst>
             <a:ext uri="{909E8E84-426E-40DD-AFC4-6F175D3DCCD1}">
-              <a14:hiddenFill xmlns:a14="http://schemas.microsoft.com/office/drawing/2010/main" xmlns="">
+              <a14:hiddenFill xmlns:a14="http://schemas.microsoft.com/office/drawing/2010/main">
                 <a:solidFill>
                   <a:srgbClr val="FFFFFF"/>
                 </a:solidFill>
               </a14:hiddenFill>
             </a:ext>
             <a:ext uri="{91240B29-F687-4F45-9708-019B960494DF}">
-              <a14:hiddenLine xmlns:a14="http://schemas.microsoft.com/office/drawing/2010/main" xmlns="" w="9525">
+              <a14:hiddenLine xmlns:a14="http://schemas.microsoft.com/office/drawing/2010/main" w="9525">
                 <a:solidFill>
                   <a:srgbClr val="000000"/>
                 </a:solidFill>
@@ -16196,7 +16196,7 @@
             </a:duotone>
             <a:extLst>
               <a:ext uri="{28A0092B-C50C-407E-A947-70E740481C1C}">
-                <a14:useLocalDpi xmlns:a14="http://schemas.microsoft.com/office/drawing/2010/main" xmlns="" val="0"/>
+                <a14:useLocalDpi xmlns:a14="http://schemas.microsoft.com/office/drawing/2010/main" val="0"/>
               </a:ext>
             </a:extLst>
           </a:blip>
@@ -16241,7 +16241,7 @@
           </a:ln>
           <a:extLst>
             <a:ext uri="{909E8E84-426E-40DD-AFC4-6F175D3DCCD1}">
-              <a14:hiddenFill xmlns:a14="http://schemas.microsoft.com/office/drawing/2010/main" xmlns="">
+              <a14:hiddenFill xmlns:a14="http://schemas.microsoft.com/office/drawing/2010/main">
                 <a:noFill/>
               </a14:hiddenFill>
             </a:ext>
@@ -16279,14 +16279,14 @@
           </a:ln>
           <a:extLst>
             <a:ext uri="{909E8E84-426E-40DD-AFC4-6F175D3DCCD1}">
-              <a14:hiddenFill xmlns:a14="http://schemas.microsoft.com/office/drawing/2010/main" xmlns="">
+              <a14:hiddenFill xmlns:a14="http://schemas.microsoft.com/office/drawing/2010/main">
                 <a:solidFill>
                   <a:srgbClr val="FFFFFF"/>
                 </a:solidFill>
               </a14:hiddenFill>
             </a:ext>
             <a:ext uri="{91240B29-F687-4F45-9708-019B960494DF}">
-              <a14:hiddenLine xmlns:a14="http://schemas.microsoft.com/office/drawing/2010/main" xmlns="" w="9525">
+              <a14:hiddenLine xmlns:a14="http://schemas.microsoft.com/office/drawing/2010/main" w="9525">
                 <a:solidFill>
                   <a:srgbClr val="000000"/>
                 </a:solidFill>
@@ -16368,7 +16368,7 @@
           </a:ln>
           <a:extLst>
             <a:ext uri="{909E8E84-426E-40DD-AFC4-6F175D3DCCD1}">
-              <a14:hiddenFill xmlns:a14="http://schemas.microsoft.com/office/drawing/2010/main" xmlns="">
+              <a14:hiddenFill xmlns:a14="http://schemas.microsoft.com/office/drawing/2010/main">
                 <a:noFill/>
               </a14:hiddenFill>
             </a:ext>
@@ -16447,7 +16447,7 @@
           <a:ln/>
           <a:extLst>
             <a:ext uri="{909E8E84-426E-40DD-AFC4-6F175D3DCCD1}">
-              <a14:hiddenFill xmlns:a14="http://schemas.microsoft.com/office/drawing/2010/main" xmlns="">
+              <a14:hiddenFill xmlns:a14="http://schemas.microsoft.com/office/drawing/2010/main">
                 <a:solidFill>
                   <a:srgbClr val="FFFFFF">
                     <a:alpha val="0"/>
@@ -16476,7 +16476,7 @@
             <a:fld id="{57896E6B-B1BC-4ECC-9043-421F9FF1FF7E}" type="datetime5">
               <a:rPr lang="en-US" altLang="pl-PL"/>
               <a:pPr/>
-              <a:t>21-Feb-17</a:t>
+              <a:t>23-Feb-17</a:t>
             </a:fld>
             <a:endParaRPr lang="en-US" altLang="pl-PL"/>
           </a:p>
@@ -16507,7 +16507,7 @@
           <a:ln/>
           <a:extLst>
             <a:ext uri="{909E8E84-426E-40DD-AFC4-6F175D3DCCD1}">
-              <a14:hiddenFill xmlns:a14="http://schemas.microsoft.com/office/drawing/2010/main" xmlns="">
+              <a14:hiddenFill xmlns:a14="http://schemas.microsoft.com/office/drawing/2010/main">
                 <a:solidFill>
                   <a:srgbClr val="FFFFFF">
                     <a:alpha val="0"/>
@@ -16576,7 +16576,7 @@
           <a:ln/>
           <a:extLst>
             <a:ext uri="{909E8E84-426E-40DD-AFC4-6F175D3DCCD1}">
-              <a14:hiddenFill xmlns:a14="http://schemas.microsoft.com/office/drawing/2010/main" xmlns="">
+              <a14:hiddenFill xmlns:a14="http://schemas.microsoft.com/office/drawing/2010/main">
                 <a:solidFill>
                   <a:srgbClr val="FFFFFF">
                     <a:alpha val="0"/>
@@ -17354,7 +17354,7 @@
           <a:noFill/>
           <a:extLst>
             <a:ext uri="{91240B29-F687-4F45-9708-019B960494DF}">
-              <a14:hiddenLine xmlns:a14="http://schemas.microsoft.com/office/drawing/2010/main" xmlns="" w="9525">
+              <a14:hiddenLine xmlns:a14="http://schemas.microsoft.com/office/drawing/2010/main" w="9525">
                 <a:solidFill>
                   <a:srgbClr val="000000"/>
                 </a:solidFill>
@@ -17482,7 +17482,7 @@
                 </a:solidFill>
               </a:rPr>
               <a:pPr/>
-              <a:t>21-Feb-17</a:t>
+              <a:t>23-Feb-17</a:t>
             </a:fld>
             <a:endParaRPr lang="en-US" altLang="pl-PL" sz="900">
               <a:solidFill>
@@ -17506,7 +17506,7 @@
           <a:noFill/>
           <a:extLst>
             <a:ext uri="{91240B29-F687-4F45-9708-019B960494DF}">
-              <a14:hiddenLine xmlns:a14="http://schemas.microsoft.com/office/drawing/2010/main" xmlns="" w="9525">
+              <a14:hiddenLine xmlns:a14="http://schemas.microsoft.com/office/drawing/2010/main" w="9525">
                 <a:solidFill>
                   <a:srgbClr val="000000"/>
                 </a:solidFill>
@@ -17656,7 +17656,7 @@
           <a:noFill/>
           <a:extLst>
             <a:ext uri="{91240B29-F687-4F45-9708-019B960494DF}">
-              <a14:hiddenLine xmlns:a14="http://schemas.microsoft.com/office/drawing/2010/main" xmlns="" w="9525">
+              <a14:hiddenLine xmlns:a14="http://schemas.microsoft.com/office/drawing/2010/main" w="9525">
                 <a:solidFill>
                   <a:srgbClr val="000000"/>
                 </a:solidFill>
@@ -17803,7 +17803,7 @@
           <p:nvPr>
             <p:extLst>
               <p:ext uri="{D42A27DB-BD31-4B8C-83A1-F6EECF244321}">
-                <p14:modId xmlns:p14="http://schemas.microsoft.com/office/powerpoint/2010/main" xmlns="" val="36956152"/>
+                <p14:modId xmlns:p14="http://schemas.microsoft.com/office/powerpoint/2010/main" val="36956152"/>
               </p:ext>
             </p:extLst>
           </p:nvPr>
@@ -18275,7 +18275,7 @@
     </p:spTree>
     <p:extLst>
       <p:ext uri="{BB962C8B-B14F-4D97-AF65-F5344CB8AC3E}">
-        <p14:creationId xmlns:p14="http://schemas.microsoft.com/office/powerpoint/2010/main" xmlns="" val="2851306553"/>
+        <p14:creationId xmlns:p14="http://schemas.microsoft.com/office/powerpoint/2010/main" val="2851306553"/>
       </p:ext>
     </p:extLst>
   </p:cSld>
@@ -18429,7 +18429,7 @@
             <a:fld id="{E906F336-2E39-43F8-9DF9-B9244679DDFB}" type="datetime5">
               <a:rPr lang="en-US" altLang="pl-PL" smtClean="0"/>
               <a:pPr/>
-              <a:t>21-Feb-17</a:t>
+              <a:t>23-Feb-17</a:t>
             </a:fld>
             <a:endParaRPr lang="en-US" altLang="pl-PL"/>
           </a:p>
@@ -18488,7 +18488,7 @@
     </p:spTree>
     <p:extLst>
       <p:ext uri="{BB962C8B-B14F-4D97-AF65-F5344CB8AC3E}">
-        <p14:creationId xmlns:p14="http://schemas.microsoft.com/office/powerpoint/2010/main" xmlns="" val="3319988810"/>
+        <p14:creationId xmlns:p14="http://schemas.microsoft.com/office/powerpoint/2010/main" val="3319988810"/>
       </p:ext>
     </p:extLst>
   </p:cSld>
@@ -18498,6 +18498,13 @@
   <p:transition spd="slow">
     <p:push dir="u"/>
   </p:transition>
+  <p:timing>
+    <p:tnLst>
+      <p:par>
+        <p:cTn id="1" dur="indefinite" restart="never" nodeType="tmRoot"/>
+      </p:par>
+    </p:tnLst>
+  </p:timing>
 </p:sld>
 </file>
 
@@ -18564,7 +18571,7 @@
           <a:noFill/>
           <a:extLst>
             <a:ext uri="{91240B29-F687-4F45-9708-019B960494DF}">
-              <a14:hiddenLine xmlns:a14="http://schemas.microsoft.com/office/drawing/2010/main" xmlns="" w="9525">
+              <a14:hiddenLine xmlns:a14="http://schemas.microsoft.com/office/drawing/2010/main" w="9525">
                 <a:solidFill>
                   <a:srgbClr val="000000"/>
                 </a:solidFill>
@@ -18692,7 +18699,7 @@
                 </a:solidFill>
               </a:rPr>
               <a:pPr/>
-              <a:t>21-Feb-17</a:t>
+              <a:t>23-Feb-17</a:t>
             </a:fld>
             <a:endParaRPr lang="en-US" altLang="pl-PL" sz="900">
               <a:solidFill>
@@ -18716,7 +18723,7 @@
           <a:noFill/>
           <a:extLst>
             <a:ext uri="{91240B29-F687-4F45-9708-019B960494DF}">
-              <a14:hiddenLine xmlns:a14="http://schemas.microsoft.com/office/drawing/2010/main" xmlns="" w="9525">
+              <a14:hiddenLine xmlns:a14="http://schemas.microsoft.com/office/drawing/2010/main" w="9525">
                 <a:solidFill>
                   <a:srgbClr val="000000"/>
                 </a:solidFill>
@@ -18866,7 +18873,7 @@
           <a:noFill/>
           <a:extLst>
             <a:ext uri="{91240B29-F687-4F45-9708-019B960494DF}">
-              <a14:hiddenLine xmlns:a14="http://schemas.microsoft.com/office/drawing/2010/main" xmlns="" w="9525">
+              <a14:hiddenLine xmlns:a14="http://schemas.microsoft.com/office/drawing/2010/main" w="9525">
                 <a:solidFill>
                   <a:srgbClr val="000000"/>
                 </a:solidFill>
@@ -19129,15 +19136,7 @@
             </a:pPr>
             <a:r>
               <a:rPr lang="pl-PL" sz="1600" dirty="0" smtClean="0"/>
-              <a:t>Zrób kopię (</a:t>
-            </a:r>
-            <a:r>
-              <a:rPr lang="pl-PL" sz="1600" dirty="0" err="1" smtClean="0"/>
-              <a:t>fork</a:t>
-            </a:r>
-            <a:r>
-              <a:rPr lang="pl-PL" sz="1600" dirty="0" smtClean="0"/>
-              <a:t>) repozytorium </a:t>
+              <a:t>Zrób kopię (fork) repozytorium </a:t>
             </a:r>
             <a:r>
               <a:rPr lang="pl-PL" sz="1600" dirty="0">
@@ -19146,15 +19145,15 @@
               <a:t>https://</a:t>
             </a:r>
             <a:r>
-              <a:rPr lang="pl-PL" sz="1600" dirty="0" smtClean="0">
+              <a:rPr lang="pl-PL" sz="1600" dirty="0">
                 <a:hlinkClick r:id="rId4"/>
               </a:rPr>
-              <a:t>github.com/wdsr/exercise0</a:t>
+              <a:t>github.com/m-kolodziejski/exercise0</a:t>
             </a:r>
-            <a:endParaRPr lang="pl-PL" sz="1600" dirty="0" smtClean="0"/>
+            <a:endParaRPr lang="pl-PL" sz="1600" dirty="0"/>
           </a:p>
           <a:p>
-            <a:pPr marL="628650" lvl="1" indent="-171450">
+            <a:pPr marL="171450" indent="-171450">
               <a:spcBef>
                 <a:spcPts val="100"/>
               </a:spcBef>
@@ -19166,7 +19165,11 @@
             </a:pPr>
             <a:r>
               <a:rPr lang="pl-PL" sz="1100" dirty="0" smtClean="0"/>
-              <a:t>Zobacz zrzut ekranu na następnym slajdzie</a:t>
+              <a:t>Zobacz </a:t>
+            </a:r>
+            <a:r>
+              <a:rPr lang="pl-PL" sz="1100" dirty="0" smtClean="0"/>
+              <a:t>zrzut ekranu na następnym slajdzie</a:t>
             </a:r>
             <a:endParaRPr lang="pl-PL" sz="1100" dirty="0"/>
           </a:p>
@@ -19191,19 +19194,19 @@
             </a:r>
             <a:r>
               <a:rPr lang="pl-PL" sz="1600" dirty="0" smtClean="0">
-                <a:hlinkClick r:id="rId4"/>
+                <a:hlinkClick r:id="rId5"/>
               </a:rPr>
               <a:t>https</a:t>
             </a:r>
             <a:r>
               <a:rPr lang="pl-PL" sz="1600" dirty="0">
-                <a:hlinkClick r:id="rId4"/>
+                <a:hlinkClick r:id="rId5"/>
               </a:rPr>
               <a:t>://</a:t>
             </a:r>
             <a:r>
               <a:rPr lang="pl-PL" sz="1600" dirty="0" smtClean="0">
-                <a:hlinkClick r:id="rId4"/>
+                <a:hlinkClick r:id="rId5"/>
               </a:rPr>
               <a:t>github.com/&lt;usr&gt;/exercise0</a:t>
             </a:r>
@@ -19241,7 +19244,7 @@
                 <a:solidFill>
                   <a:srgbClr val="0070C0"/>
                 </a:solidFill>
-                <a:hlinkClick r:id="rId5"/>
+                <a:hlinkClick r:id="rId6"/>
               </a:rPr>
               <a:t>https://</a:t>
             </a:r>
@@ -19250,7 +19253,7 @@
                 <a:solidFill>
                   <a:srgbClr val="0070C0"/>
                 </a:solidFill>
-                <a:hlinkClick r:id="rId5"/>
+                <a:hlinkClick r:id="rId6"/>
               </a:rPr>
               <a:t>github.com/&lt;usr&gt;/exercise0.git</a:t>
             </a:r>
@@ -19478,19 +19481,19 @@
             </a:r>
             <a:r>
               <a:rPr lang="pl-PL" sz="900" dirty="0" smtClean="0">
-                <a:hlinkClick r:id="rId6"/>
+                <a:hlinkClick r:id="rId7"/>
               </a:rPr>
               <a:t>https</a:t>
             </a:r>
             <a:r>
               <a:rPr lang="pl-PL" sz="900" dirty="0">
-                <a:hlinkClick r:id="rId6"/>
+                <a:hlinkClick r:id="rId7"/>
               </a:rPr>
               <a:t>://</a:t>
             </a:r>
             <a:r>
               <a:rPr lang="pl-PL" sz="900" dirty="0" smtClean="0">
-                <a:hlinkClick r:id="rId6"/>
+                <a:hlinkClick r:id="rId7"/>
               </a:rPr>
               <a:t>training.github.com/kit/downloads/github-git-cheat-sheet.pdf</a:t>
             </a:r>
@@ -19603,21 +19606,8 @@
                   <a:srgbClr val="00B050"/>
                 </a:solidFill>
               </a:rPr>
-              <a:t>Ostateczny termin zaliczenia ćwiczenia: poniedziałek </a:t>
+              <a:t>Ostateczny termin zaliczenia ćwiczenia: poniedziałek 2 marca</a:t>
             </a:r>
-            <a:r>
-              <a:rPr lang="pl-PL" sz="1600" b="1" dirty="0" smtClean="0">
-                <a:solidFill>
-                  <a:srgbClr val="00B050"/>
-                </a:solidFill>
-              </a:rPr>
-              <a:t>2 marca</a:t>
-            </a:r>
-            <a:endParaRPr lang="pl-PL" sz="1600" b="1" dirty="0" smtClean="0">
-              <a:solidFill>
-                <a:srgbClr val="00B050"/>
-              </a:solidFill>
-            </a:endParaRPr>
           </a:p>
           <a:p>
             <a:pPr>
@@ -19647,7 +19637,7 @@
     </p:spTree>
     <p:extLst>
       <p:ext uri="{BB962C8B-B14F-4D97-AF65-F5344CB8AC3E}">
-        <p14:creationId xmlns:p14="http://schemas.microsoft.com/office/powerpoint/2010/main" xmlns="" val="2253719762"/>
+        <p14:creationId xmlns:p14="http://schemas.microsoft.com/office/powerpoint/2010/main" val="2253719762"/>
       </p:ext>
     </p:extLst>
   </p:cSld>
@@ -19736,7 +19726,7 @@
           <a:noFill/>
           <a:extLst>
             <a:ext uri="{91240B29-F687-4F45-9708-019B960494DF}">
-              <a14:hiddenLine xmlns:a14="http://schemas.microsoft.com/office/drawing/2010/main" xmlns="" w="9525">
+              <a14:hiddenLine xmlns:a14="http://schemas.microsoft.com/office/drawing/2010/main" w="9525">
                 <a:solidFill>
                   <a:srgbClr val="000000"/>
                 </a:solidFill>
@@ -19864,7 +19854,7 @@
                 </a:solidFill>
               </a:rPr>
               <a:pPr/>
-              <a:t>21-Feb-17</a:t>
+              <a:t>23-Feb-17</a:t>
             </a:fld>
             <a:endParaRPr lang="en-US" altLang="pl-PL" sz="900">
               <a:solidFill>
@@ -19888,7 +19878,7 @@
           <a:noFill/>
           <a:extLst>
             <a:ext uri="{91240B29-F687-4F45-9708-019B960494DF}">
-              <a14:hiddenLine xmlns:a14="http://schemas.microsoft.com/office/drawing/2010/main" xmlns="" w="9525">
+              <a14:hiddenLine xmlns:a14="http://schemas.microsoft.com/office/drawing/2010/main" w="9525">
                 <a:solidFill>
                   <a:srgbClr val="000000"/>
                 </a:solidFill>
@@ -20038,7 +20028,7 @@
           <a:noFill/>
           <a:extLst>
             <a:ext uri="{91240B29-F687-4F45-9708-019B960494DF}">
-              <a14:hiddenLine xmlns:a14="http://schemas.microsoft.com/office/drawing/2010/main" xmlns="" w="9525">
+              <a14:hiddenLine xmlns:a14="http://schemas.microsoft.com/office/drawing/2010/main" w="9525">
                 <a:solidFill>
                   <a:srgbClr val="000000"/>
                 </a:solidFill>
@@ -20188,7 +20178,7 @@
           <a:blip r:embed="rId2" cstate="print">
             <a:extLst>
               <a:ext uri="{28A0092B-C50C-407E-A947-70E740481C1C}">
-                <a14:useLocalDpi xmlns:a14="http://schemas.microsoft.com/office/drawing/2010/main" xmlns="" val="0"/>
+                <a14:useLocalDpi xmlns:a14="http://schemas.microsoft.com/office/drawing/2010/main" val="0"/>
               </a:ext>
             </a:extLst>
           </a:blip>
@@ -20211,14 +20201,14 @@
           </a:ln>
           <a:extLst>
             <a:ext uri="{909E8E84-426E-40DD-AFC4-6F175D3DCCD1}">
-              <a14:hiddenFill xmlns:a14="http://schemas.microsoft.com/office/drawing/2010/main" xmlns="">
+              <a14:hiddenFill xmlns:a14="http://schemas.microsoft.com/office/drawing/2010/main">
                 <a:solidFill>
                   <a:schemeClr val="accent1"/>
                 </a:solidFill>
               </a14:hiddenFill>
             </a:ext>
             <a:ext uri="{91240B29-F687-4F45-9708-019B960494DF}">
-              <a14:hiddenLine xmlns:a14="http://schemas.microsoft.com/office/drawing/2010/main" xmlns="" w="9525">
+              <a14:hiddenLine xmlns:a14="http://schemas.microsoft.com/office/drawing/2010/main" w="9525">
                 <a:solidFill>
                   <a:schemeClr val="tx1"/>
                 </a:solidFill>
@@ -20242,7 +20232,7 @@
           <a:blip r:embed="rId3" cstate="print">
             <a:extLst>
               <a:ext uri="{28A0092B-C50C-407E-A947-70E740481C1C}">
-                <a14:useLocalDpi xmlns:a14="http://schemas.microsoft.com/office/drawing/2010/main" xmlns="" val="0"/>
+                <a14:useLocalDpi xmlns:a14="http://schemas.microsoft.com/office/drawing/2010/main" val="0"/>
               </a:ext>
             </a:extLst>
           </a:blip>
@@ -20265,14 +20255,14 @@
           </a:ln>
           <a:extLst>
             <a:ext uri="{909E8E84-426E-40DD-AFC4-6F175D3DCCD1}">
-              <a14:hiddenFill xmlns:a14="http://schemas.microsoft.com/office/drawing/2010/main" xmlns="">
+              <a14:hiddenFill xmlns:a14="http://schemas.microsoft.com/office/drawing/2010/main">
                 <a:solidFill>
                   <a:schemeClr val="accent1"/>
                 </a:solidFill>
               </a14:hiddenFill>
             </a:ext>
             <a:ext uri="{91240B29-F687-4F45-9708-019B960494DF}">
-              <a14:hiddenLine xmlns:a14="http://schemas.microsoft.com/office/drawing/2010/main" xmlns="" w="9525">
+              <a14:hiddenLine xmlns:a14="http://schemas.microsoft.com/office/drawing/2010/main" w="9525">
                 <a:solidFill>
                   <a:schemeClr val="tx1"/>
                 </a:solidFill>
@@ -20296,7 +20286,7 @@
           <a:blip r:embed="rId4" cstate="print">
             <a:extLst>
               <a:ext uri="{28A0092B-C50C-407E-A947-70E740481C1C}">
-                <a14:useLocalDpi xmlns:a14="http://schemas.microsoft.com/office/drawing/2010/main" xmlns="" val="0"/>
+                <a14:useLocalDpi xmlns:a14="http://schemas.microsoft.com/office/drawing/2010/main" val="0"/>
               </a:ext>
             </a:extLst>
           </a:blip>
@@ -20319,14 +20309,14 @@
           </a:ln>
           <a:extLst>
             <a:ext uri="{909E8E84-426E-40DD-AFC4-6F175D3DCCD1}">
-              <a14:hiddenFill xmlns:a14="http://schemas.microsoft.com/office/drawing/2010/main" xmlns="">
+              <a14:hiddenFill xmlns:a14="http://schemas.microsoft.com/office/drawing/2010/main">
                 <a:solidFill>
                   <a:schemeClr val="accent1"/>
                 </a:solidFill>
               </a14:hiddenFill>
             </a:ext>
             <a:ext uri="{91240B29-F687-4F45-9708-019B960494DF}">
-              <a14:hiddenLine xmlns:a14="http://schemas.microsoft.com/office/drawing/2010/main" xmlns="" w="9525">
+              <a14:hiddenLine xmlns:a14="http://schemas.microsoft.com/office/drawing/2010/main" w="9525">
                 <a:solidFill>
                   <a:schemeClr val="tx1"/>
                 </a:solidFill>
@@ -20380,21 +20370,8 @@
                   <a:srgbClr val="00B050"/>
                 </a:solidFill>
               </a:rPr>
-              <a:t>Ostateczny termin zaliczenia ćwiczenia: poniedziałek </a:t>
+              <a:t>Ostateczny termin zaliczenia ćwiczenia: poniedziałek 2 marca</a:t>
             </a:r>
-            <a:r>
-              <a:rPr lang="pl-PL" sz="950" b="1" dirty="0" smtClean="0">
-                <a:solidFill>
-                  <a:srgbClr val="00B050"/>
-                </a:solidFill>
-              </a:rPr>
-              <a:t>2 marca</a:t>
-            </a:r>
-            <a:endParaRPr lang="pl-PL" sz="950" b="1" dirty="0" smtClean="0">
-              <a:solidFill>
-                <a:srgbClr val="00B050"/>
-              </a:solidFill>
-            </a:endParaRPr>
           </a:p>
           <a:p>
             <a:pPr>
@@ -20424,7 +20401,7 @@
     </p:spTree>
     <p:extLst>
       <p:ext uri="{BB962C8B-B14F-4D97-AF65-F5344CB8AC3E}">
-        <p14:creationId xmlns:p14="http://schemas.microsoft.com/office/powerpoint/2010/main" xmlns="" val="958256763"/>
+        <p14:creationId xmlns:p14="http://schemas.microsoft.com/office/powerpoint/2010/main" val="958256763"/>
       </p:ext>
     </p:extLst>
   </p:cSld>
@@ -20522,7 +20499,7 @@
           </a:ln>
           <a:extLst>
             <a:ext uri="{91240B29-F687-4F45-9708-019B960494DF}">
-              <a14:hiddenLine xmlns:a14="http://schemas.microsoft.com/office/drawing/2010/main" xmlns="" w="9525">
+              <a14:hiddenLine xmlns:a14="http://schemas.microsoft.com/office/drawing/2010/main" w="9525">
                 <a:solidFill>
                   <a:srgbClr val="000000"/>
                 </a:solidFill>
@@ -20952,7 +20929,7 @@
           <a:noFill/>
           <a:extLst>
             <a:ext uri="{91240B29-F687-4F45-9708-019B960494DF}">
-              <a14:hiddenLine xmlns:a14="http://schemas.microsoft.com/office/drawing/2010/main" xmlns="" w="9525">
+              <a14:hiddenLine xmlns:a14="http://schemas.microsoft.com/office/drawing/2010/main" w="9525">
                 <a:solidFill>
                   <a:srgbClr val="000000"/>
                 </a:solidFill>
@@ -21080,7 +21057,7 @@
                 </a:solidFill>
               </a:rPr>
               <a:pPr/>
-              <a:t>21-Feb-17</a:t>
+              <a:t>23-Feb-17</a:t>
             </a:fld>
             <a:endParaRPr lang="en-US" altLang="pl-PL" sz="900">
               <a:solidFill>
@@ -21104,7 +21081,7 @@
           <a:noFill/>
           <a:extLst>
             <a:ext uri="{91240B29-F687-4F45-9708-019B960494DF}">
-              <a14:hiddenLine xmlns:a14="http://schemas.microsoft.com/office/drawing/2010/main" xmlns="" w="9525">
+              <a14:hiddenLine xmlns:a14="http://schemas.microsoft.com/office/drawing/2010/main" w="9525">
                 <a:solidFill>
                   <a:srgbClr val="000000"/>
                 </a:solidFill>
@@ -21254,7 +21231,7 @@
           <a:noFill/>
           <a:extLst>
             <a:ext uri="{91240B29-F687-4F45-9708-019B960494DF}">
-              <a14:hiddenLine xmlns:a14="http://schemas.microsoft.com/office/drawing/2010/main" xmlns="" w="9525">
+              <a14:hiddenLine xmlns:a14="http://schemas.microsoft.com/office/drawing/2010/main" w="9525">
                 <a:solidFill>
                   <a:srgbClr val="000000"/>
                 </a:solidFill>
@@ -21607,7 +21584,7 @@
           <a:noFill/>
           <a:extLst>
             <a:ext uri="{91240B29-F687-4F45-9708-019B960494DF}">
-              <a14:hiddenLine xmlns:a14="http://schemas.microsoft.com/office/drawing/2010/main" xmlns="" w="9525">
+              <a14:hiddenLine xmlns:a14="http://schemas.microsoft.com/office/drawing/2010/main" w="9525">
                 <a:solidFill>
                   <a:srgbClr val="000000"/>
                 </a:solidFill>
@@ -21735,7 +21712,7 @@
                 </a:solidFill>
               </a:rPr>
               <a:pPr/>
-              <a:t>21-Feb-17</a:t>
+              <a:t>23-Feb-17</a:t>
             </a:fld>
             <a:endParaRPr lang="en-US" altLang="pl-PL" sz="900">
               <a:solidFill>
@@ -21759,7 +21736,7 @@
           <a:noFill/>
           <a:extLst>
             <a:ext uri="{91240B29-F687-4F45-9708-019B960494DF}">
-              <a14:hiddenLine xmlns:a14="http://schemas.microsoft.com/office/drawing/2010/main" xmlns="" w="9525">
+              <a14:hiddenLine xmlns:a14="http://schemas.microsoft.com/office/drawing/2010/main" w="9525">
                 <a:solidFill>
                   <a:srgbClr val="000000"/>
                 </a:solidFill>
@@ -21909,7 +21886,7 @@
           <a:noFill/>
           <a:extLst>
             <a:ext uri="{91240B29-F687-4F45-9708-019B960494DF}">
-              <a14:hiddenLine xmlns:a14="http://schemas.microsoft.com/office/drawing/2010/main" xmlns="" w="9525">
+              <a14:hiddenLine xmlns:a14="http://schemas.microsoft.com/office/drawing/2010/main" w="9525">
                 <a:solidFill>
                   <a:srgbClr val="000000"/>
                 </a:solidFill>
@@ -22059,7 +22036,7 @@
           <a:blip r:embed="rId2" cstate="print">
             <a:extLst>
               <a:ext uri="{28A0092B-C50C-407E-A947-70E740481C1C}">
-                <a14:useLocalDpi xmlns:a14="http://schemas.microsoft.com/office/drawing/2010/main" xmlns="" val="0"/>
+                <a14:useLocalDpi xmlns:a14="http://schemas.microsoft.com/office/drawing/2010/main" val="0"/>
               </a:ext>
             </a:extLst>
           </a:blip>
@@ -22079,7 +22056,7 @@
           <a:noFill/>
           <a:extLst>
             <a:ext uri="{909E8E84-426E-40DD-AFC4-6F175D3DCCD1}">
-              <a14:hiddenFill xmlns:a14="http://schemas.microsoft.com/office/drawing/2010/main" xmlns="">
+              <a14:hiddenFill xmlns:a14="http://schemas.microsoft.com/office/drawing/2010/main">
                 <a:solidFill>
                   <a:srgbClr val="FFFFFF"/>
                 </a:solidFill>
@@ -22209,7 +22186,7 @@
           <a:blip r:embed="rId3" cstate="print">
             <a:extLst>
               <a:ext uri="{28A0092B-C50C-407E-A947-70E740481C1C}">
-                <a14:useLocalDpi xmlns:a14="http://schemas.microsoft.com/office/drawing/2010/main" xmlns="" val="0"/>
+                <a14:useLocalDpi xmlns:a14="http://schemas.microsoft.com/office/drawing/2010/main" val="0"/>
               </a:ext>
             </a:extLst>
           </a:blip>
@@ -22232,14 +22209,14 @@
           </a:ln>
           <a:extLst>
             <a:ext uri="{909E8E84-426E-40DD-AFC4-6F175D3DCCD1}">
-              <a14:hiddenFill xmlns:a14="http://schemas.microsoft.com/office/drawing/2010/main" xmlns="">
+              <a14:hiddenFill xmlns:a14="http://schemas.microsoft.com/office/drawing/2010/main">
                 <a:solidFill>
                   <a:schemeClr val="accent1"/>
                 </a:solidFill>
               </a14:hiddenFill>
             </a:ext>
             <a:ext uri="{91240B29-F687-4F45-9708-019B960494DF}">
-              <a14:hiddenLine xmlns:a14="http://schemas.microsoft.com/office/drawing/2010/main" xmlns="" w="9525">
+              <a14:hiddenLine xmlns:a14="http://schemas.microsoft.com/office/drawing/2010/main" w="9525">
                 <a:solidFill>
                   <a:schemeClr val="tx1"/>
                 </a:solidFill>
@@ -22372,7 +22349,7 @@
           <a:blip r:embed="rId4" cstate="print">
             <a:extLst>
               <a:ext uri="{28A0092B-C50C-407E-A947-70E740481C1C}">
-                <a14:useLocalDpi xmlns:a14="http://schemas.microsoft.com/office/drawing/2010/main" xmlns="" val="0"/>
+                <a14:useLocalDpi xmlns:a14="http://schemas.microsoft.com/office/drawing/2010/main" val="0"/>
               </a:ext>
             </a:extLst>
           </a:blip>
@@ -22392,7 +22369,7 @@
           <a:noFill/>
           <a:extLst>
             <a:ext uri="{909E8E84-426E-40DD-AFC4-6F175D3DCCD1}">
-              <a14:hiddenFill xmlns:a14="http://schemas.microsoft.com/office/drawing/2010/main" xmlns="">
+              <a14:hiddenFill xmlns:a14="http://schemas.microsoft.com/office/drawing/2010/main">
                 <a:solidFill>
                   <a:srgbClr val="FFFFFF"/>
                 </a:solidFill>
@@ -22536,7 +22513,7 @@
     </p:spTree>
     <p:extLst>
       <p:ext uri="{BB962C8B-B14F-4D97-AF65-F5344CB8AC3E}">
-        <p14:creationId xmlns:p14="http://schemas.microsoft.com/office/powerpoint/2010/main" xmlns="" val="2736078194"/>
+        <p14:creationId xmlns:p14="http://schemas.microsoft.com/office/powerpoint/2010/main" val="2736078194"/>
       </p:ext>
     </p:extLst>
   </p:cSld>
@@ -22947,7 +22924,7 @@
           <a:noFill/>
           <a:extLst>
             <a:ext uri="{91240B29-F687-4F45-9708-019B960494DF}">
-              <a14:hiddenLine xmlns:a14="http://schemas.microsoft.com/office/drawing/2010/main" xmlns="" w="9525">
+              <a14:hiddenLine xmlns:a14="http://schemas.microsoft.com/office/drawing/2010/main" w="9525">
                 <a:solidFill>
                   <a:srgbClr val="000000"/>
                 </a:solidFill>
@@ -23075,7 +23052,7 @@
                 </a:solidFill>
               </a:rPr>
               <a:pPr/>
-              <a:t>21-Feb-17</a:t>
+              <a:t>23-Feb-17</a:t>
             </a:fld>
             <a:endParaRPr lang="en-US" altLang="pl-PL" sz="900">
               <a:solidFill>
@@ -23099,7 +23076,7 @@
           <a:noFill/>
           <a:extLst>
             <a:ext uri="{91240B29-F687-4F45-9708-019B960494DF}">
-              <a14:hiddenLine xmlns:a14="http://schemas.microsoft.com/office/drawing/2010/main" xmlns="" w="9525">
+              <a14:hiddenLine xmlns:a14="http://schemas.microsoft.com/office/drawing/2010/main" w="9525">
                 <a:solidFill>
                   <a:srgbClr val="000000"/>
                 </a:solidFill>
@@ -23249,7 +23226,7 @@
           <a:noFill/>
           <a:extLst>
             <a:ext uri="{91240B29-F687-4F45-9708-019B960494DF}">
-              <a14:hiddenLine xmlns:a14="http://schemas.microsoft.com/office/drawing/2010/main" xmlns="" w="9525">
+              <a14:hiddenLine xmlns:a14="http://schemas.microsoft.com/office/drawing/2010/main" w="9525">
                 <a:solidFill>
                   <a:srgbClr val="000000"/>
                 </a:solidFill>
@@ -23394,7 +23371,7 @@
           <p:nvPr>
             <p:extLst>
               <p:ext uri="{D42A27DB-BD31-4B8C-83A1-F6EECF244321}">
-                <p14:modId xmlns:p14="http://schemas.microsoft.com/office/powerpoint/2010/main" xmlns="" val="573347322"/>
+                <p14:modId xmlns:p14="http://schemas.microsoft.com/office/powerpoint/2010/main" val="573347322"/>
               </p:ext>
             </p:extLst>
           </p:nvPr>
@@ -23412,7 +23389,7 @@
     </p:spTree>
     <p:extLst>
       <p:ext uri="{BB962C8B-B14F-4D97-AF65-F5344CB8AC3E}">
-        <p14:creationId xmlns:p14="http://schemas.microsoft.com/office/powerpoint/2010/main" xmlns="" val="670607410"/>
+        <p14:creationId xmlns:p14="http://schemas.microsoft.com/office/powerpoint/2010/main" val="670607410"/>
       </p:ext>
     </p:extLst>
   </p:cSld>
@@ -24015,7 +23992,7 @@
           <a:noFill/>
           <a:extLst>
             <a:ext uri="{91240B29-F687-4F45-9708-019B960494DF}">
-              <a14:hiddenLine xmlns:a14="http://schemas.microsoft.com/office/drawing/2010/main" xmlns="" w="9525">
+              <a14:hiddenLine xmlns:a14="http://schemas.microsoft.com/office/drawing/2010/main" w="9525">
                 <a:solidFill>
                   <a:srgbClr val="000000"/>
                 </a:solidFill>
@@ -24143,7 +24120,7 @@
                 </a:solidFill>
               </a:rPr>
               <a:pPr/>
-              <a:t>21-Feb-17</a:t>
+              <a:t>23-Feb-17</a:t>
             </a:fld>
             <a:endParaRPr lang="en-US" altLang="pl-PL" sz="900">
               <a:solidFill>
@@ -24167,7 +24144,7 @@
           <a:noFill/>
           <a:extLst>
             <a:ext uri="{91240B29-F687-4F45-9708-019B960494DF}">
-              <a14:hiddenLine xmlns:a14="http://schemas.microsoft.com/office/drawing/2010/main" xmlns="" w="9525">
+              <a14:hiddenLine xmlns:a14="http://schemas.microsoft.com/office/drawing/2010/main" w="9525">
                 <a:solidFill>
                   <a:srgbClr val="000000"/>
                 </a:solidFill>
@@ -24317,7 +24294,7 @@
           <a:noFill/>
           <a:extLst>
             <a:ext uri="{91240B29-F687-4F45-9708-019B960494DF}">
-              <a14:hiddenLine xmlns:a14="http://schemas.microsoft.com/office/drawing/2010/main" xmlns="" w="9525">
+              <a14:hiddenLine xmlns:a14="http://schemas.microsoft.com/office/drawing/2010/main" w="9525">
                 <a:solidFill>
                   <a:srgbClr val="000000"/>
                 </a:solidFill>
@@ -24462,7 +24439,7 @@
           <p:nvPr>
             <p:extLst>
               <p:ext uri="{D42A27DB-BD31-4B8C-83A1-F6EECF244321}">
-                <p14:modId xmlns:p14="http://schemas.microsoft.com/office/powerpoint/2010/main" xmlns="" val="1835432058"/>
+                <p14:modId xmlns:p14="http://schemas.microsoft.com/office/powerpoint/2010/main" val="1835432058"/>
               </p:ext>
             </p:extLst>
           </p:nvPr>
@@ -24480,7 +24457,7 @@
     </p:spTree>
     <p:extLst>
       <p:ext uri="{BB962C8B-B14F-4D97-AF65-F5344CB8AC3E}">
-        <p14:creationId xmlns:p14="http://schemas.microsoft.com/office/powerpoint/2010/main" xmlns="" val="401109775"/>
+        <p14:creationId xmlns:p14="http://schemas.microsoft.com/office/powerpoint/2010/main" val="401109775"/>
       </p:ext>
     </p:extLst>
   </p:cSld>
@@ -24887,7 +24864,7 @@
           <a:noFill/>
           <a:extLst>
             <a:ext uri="{91240B29-F687-4F45-9708-019B960494DF}">
-              <a14:hiddenLine xmlns:a14="http://schemas.microsoft.com/office/drawing/2010/main" xmlns="" w="9525">
+              <a14:hiddenLine xmlns:a14="http://schemas.microsoft.com/office/drawing/2010/main" w="9525">
                 <a:solidFill>
                   <a:srgbClr val="000000"/>
                 </a:solidFill>
@@ -25015,7 +24992,7 @@
                 </a:solidFill>
               </a:rPr>
               <a:pPr/>
-              <a:t>21-Feb-17</a:t>
+              <a:t>23-Feb-17</a:t>
             </a:fld>
             <a:endParaRPr lang="en-US" altLang="pl-PL" sz="900">
               <a:solidFill>
@@ -25039,7 +25016,7 @@
           <a:noFill/>
           <a:extLst>
             <a:ext uri="{91240B29-F687-4F45-9708-019B960494DF}">
-              <a14:hiddenLine xmlns:a14="http://schemas.microsoft.com/office/drawing/2010/main" xmlns="" w="9525">
+              <a14:hiddenLine xmlns:a14="http://schemas.microsoft.com/office/drawing/2010/main" w="9525">
                 <a:solidFill>
                   <a:srgbClr val="000000"/>
                 </a:solidFill>
@@ -25189,7 +25166,7 @@
           <a:noFill/>
           <a:extLst>
             <a:ext uri="{91240B29-F687-4F45-9708-019B960494DF}">
-              <a14:hiddenLine xmlns:a14="http://schemas.microsoft.com/office/drawing/2010/main" xmlns="" w="9525">
+              <a14:hiddenLine xmlns:a14="http://schemas.microsoft.com/office/drawing/2010/main" w="9525">
                 <a:solidFill>
                   <a:srgbClr val="000000"/>
                 </a:solidFill>
@@ -25334,7 +25311,7 @@
           <p:nvPr>
             <p:extLst>
               <p:ext uri="{D42A27DB-BD31-4B8C-83A1-F6EECF244321}">
-                <p14:modId xmlns:p14="http://schemas.microsoft.com/office/powerpoint/2010/main" xmlns="" val="188920010"/>
+                <p14:modId xmlns:p14="http://schemas.microsoft.com/office/powerpoint/2010/main" val="188920010"/>
               </p:ext>
             </p:extLst>
           </p:nvPr>
@@ -25352,7 +25329,7 @@
     </p:spTree>
     <p:extLst>
       <p:ext uri="{BB962C8B-B14F-4D97-AF65-F5344CB8AC3E}">
-        <p14:creationId xmlns:p14="http://schemas.microsoft.com/office/powerpoint/2010/main" xmlns="" val="946513416"/>
+        <p14:creationId xmlns:p14="http://schemas.microsoft.com/office/powerpoint/2010/main" val="946513416"/>
       </p:ext>
     </p:extLst>
   </p:cSld>
@@ -25955,7 +25932,7 @@
           <a:noFill/>
           <a:extLst>
             <a:ext uri="{91240B29-F687-4F45-9708-019B960494DF}">
-              <a14:hiddenLine xmlns:a14="http://schemas.microsoft.com/office/drawing/2010/main" xmlns="" w="9525">
+              <a14:hiddenLine xmlns:a14="http://schemas.microsoft.com/office/drawing/2010/main" w="9525">
                 <a:solidFill>
                   <a:srgbClr val="000000"/>
                 </a:solidFill>
@@ -26083,7 +26060,7 @@
                 </a:solidFill>
               </a:rPr>
               <a:pPr/>
-              <a:t>21-Feb-17</a:t>
+              <a:t>23-Feb-17</a:t>
             </a:fld>
             <a:endParaRPr lang="en-US" altLang="pl-PL" sz="900">
               <a:solidFill>
@@ -26107,7 +26084,7 @@
           <a:noFill/>
           <a:extLst>
             <a:ext uri="{91240B29-F687-4F45-9708-019B960494DF}">
-              <a14:hiddenLine xmlns:a14="http://schemas.microsoft.com/office/drawing/2010/main" xmlns="" w="9525">
+              <a14:hiddenLine xmlns:a14="http://schemas.microsoft.com/office/drawing/2010/main" w="9525">
                 <a:solidFill>
                   <a:srgbClr val="000000"/>
                 </a:solidFill>
@@ -26257,7 +26234,7 @@
           <a:noFill/>
           <a:extLst>
             <a:ext uri="{91240B29-F687-4F45-9708-019B960494DF}">
-              <a14:hiddenLine xmlns:a14="http://schemas.microsoft.com/office/drawing/2010/main" xmlns="" w="9525">
+              <a14:hiddenLine xmlns:a14="http://schemas.microsoft.com/office/drawing/2010/main" w="9525">
                 <a:solidFill>
                   <a:srgbClr val="000000"/>
                 </a:solidFill>
@@ -26484,7 +26461,7 @@
     </p:spTree>
     <p:extLst>
       <p:ext uri="{BB962C8B-B14F-4D97-AF65-F5344CB8AC3E}">
-        <p14:creationId xmlns:p14="http://schemas.microsoft.com/office/powerpoint/2010/main" xmlns="" val="1780986173"/>
+        <p14:creationId xmlns:p14="http://schemas.microsoft.com/office/powerpoint/2010/main" val="1780986173"/>
       </p:ext>
     </p:extLst>
   </p:cSld>
@@ -26567,7 +26544,7 @@
           <a:noFill/>
           <a:extLst>
             <a:ext uri="{91240B29-F687-4F45-9708-019B960494DF}">
-              <a14:hiddenLine xmlns:a14="http://schemas.microsoft.com/office/drawing/2010/main" xmlns="" w="9525">
+              <a14:hiddenLine xmlns:a14="http://schemas.microsoft.com/office/drawing/2010/main" w="9525">
                 <a:solidFill>
                   <a:srgbClr val="000000"/>
                 </a:solidFill>
@@ -26695,7 +26672,7 @@
                 </a:solidFill>
               </a:rPr>
               <a:pPr/>
-              <a:t>21-Feb-17</a:t>
+              <a:t>23-Feb-17</a:t>
             </a:fld>
             <a:endParaRPr lang="en-US" altLang="pl-PL" sz="900">
               <a:solidFill>
@@ -26719,7 +26696,7 @@
           <a:noFill/>
           <a:extLst>
             <a:ext uri="{91240B29-F687-4F45-9708-019B960494DF}">
-              <a14:hiddenLine xmlns:a14="http://schemas.microsoft.com/office/drawing/2010/main" xmlns="" w="9525">
+              <a14:hiddenLine xmlns:a14="http://schemas.microsoft.com/office/drawing/2010/main" w="9525">
                 <a:solidFill>
                   <a:srgbClr val="000000"/>
                 </a:solidFill>
@@ -26869,7 +26846,7 @@
           <a:noFill/>
           <a:extLst>
             <a:ext uri="{91240B29-F687-4F45-9708-019B960494DF}">
-              <a14:hiddenLine xmlns:a14="http://schemas.microsoft.com/office/drawing/2010/main" xmlns="" w="9525">
+              <a14:hiddenLine xmlns:a14="http://schemas.microsoft.com/office/drawing/2010/main" w="9525">
                 <a:solidFill>
                   <a:srgbClr val="000000"/>
                 </a:solidFill>
@@ -27014,7 +26991,7 @@
           <p:nvPr>
             <p:extLst>
               <p:ext uri="{D42A27DB-BD31-4B8C-83A1-F6EECF244321}">
-                <p14:modId xmlns:p14="http://schemas.microsoft.com/office/powerpoint/2010/main" xmlns="" val="1049449028"/>
+                <p14:modId xmlns:p14="http://schemas.microsoft.com/office/powerpoint/2010/main" val="1049449028"/>
               </p:ext>
             </p:extLst>
           </p:nvPr>
@@ -27032,7 +27009,7 @@
     </p:spTree>
     <p:extLst>
       <p:ext uri="{BB962C8B-B14F-4D97-AF65-F5344CB8AC3E}">
-        <p14:creationId xmlns:p14="http://schemas.microsoft.com/office/powerpoint/2010/main" xmlns="" val="3632515949"/>
+        <p14:creationId xmlns:p14="http://schemas.microsoft.com/office/powerpoint/2010/main" val="3632515949"/>
       </p:ext>
     </p:extLst>
   </p:cSld>
@@ -27439,7 +27416,7 @@
           <a:noFill/>
           <a:extLst>
             <a:ext uri="{91240B29-F687-4F45-9708-019B960494DF}">
-              <a14:hiddenLine xmlns:a14="http://schemas.microsoft.com/office/drawing/2010/main" xmlns="" w="9525">
+              <a14:hiddenLine xmlns:a14="http://schemas.microsoft.com/office/drawing/2010/main" w="9525">
                 <a:solidFill>
                   <a:srgbClr val="000000"/>
                 </a:solidFill>
@@ -27567,7 +27544,7 @@
                 </a:solidFill>
               </a:rPr>
               <a:pPr/>
-              <a:t>21-Feb-17</a:t>
+              <a:t>23-Feb-17</a:t>
             </a:fld>
             <a:endParaRPr lang="en-US" altLang="pl-PL" sz="900">
               <a:solidFill>
@@ -27591,7 +27568,7 @@
           <a:noFill/>
           <a:extLst>
             <a:ext uri="{91240B29-F687-4F45-9708-019B960494DF}">
-              <a14:hiddenLine xmlns:a14="http://schemas.microsoft.com/office/drawing/2010/main" xmlns="" w="9525">
+              <a14:hiddenLine xmlns:a14="http://schemas.microsoft.com/office/drawing/2010/main" w="9525">
                 <a:solidFill>
                   <a:srgbClr val="000000"/>
                 </a:solidFill>
@@ -27741,7 +27718,7 @@
           <a:noFill/>
           <a:extLst>
             <a:ext uri="{91240B29-F687-4F45-9708-019B960494DF}">
-              <a14:hiddenLine xmlns:a14="http://schemas.microsoft.com/office/drawing/2010/main" xmlns="" w="9525">
+              <a14:hiddenLine xmlns:a14="http://schemas.microsoft.com/office/drawing/2010/main" w="9525">
                 <a:solidFill>
                   <a:srgbClr val="000000"/>
                 </a:solidFill>
@@ -27888,7 +27865,7 @@
           <p:nvPr>
             <p:extLst>
               <p:ext uri="{D42A27DB-BD31-4B8C-83A1-F6EECF244321}">
-                <p14:modId xmlns:p14="http://schemas.microsoft.com/office/powerpoint/2010/main" xmlns="" val="3524606262"/>
+                <p14:modId xmlns:p14="http://schemas.microsoft.com/office/powerpoint/2010/main" val="3524606262"/>
               </p:ext>
             </p:extLst>
           </p:nvPr>
@@ -28318,7 +28295,7 @@
           <p:nvPr>
             <p:extLst>
               <p:ext uri="{D42A27DB-BD31-4B8C-83A1-F6EECF244321}">
-                <p14:modId xmlns:p14="http://schemas.microsoft.com/office/powerpoint/2010/main" xmlns="" val="3857556710"/>
+                <p14:modId xmlns:p14="http://schemas.microsoft.com/office/powerpoint/2010/main" val="3857556710"/>
               </p:ext>
             </p:extLst>
           </p:nvPr>
@@ -28582,7 +28559,7 @@
     </p:spTree>
     <p:extLst>
       <p:ext uri="{BB962C8B-B14F-4D97-AF65-F5344CB8AC3E}">
-        <p14:creationId xmlns:p14="http://schemas.microsoft.com/office/powerpoint/2010/main" xmlns="" val="393837832"/>
+        <p14:creationId xmlns:p14="http://schemas.microsoft.com/office/powerpoint/2010/main" val="393837832"/>
       </p:ext>
     </p:extLst>
   </p:cSld>
@@ -29133,7 +29110,7 @@
   </a:extraClrSchemeLst>
   <a:extLst>
     <a:ext uri="{05A4C25C-085E-4340-85A3-A5531E510DB2}">
-      <thm15:themeFamily xmlns:thm15="http://schemas.microsoft.com/office/thememl/2012/main" xmlns="" name="v5_GFT_MASTER.potx" id="{0499BC36-F504-48FE-B624-679107AB1F18}" vid="{304785FB-A37F-4ED5-A32C-8677DED9BBC6}"/>
+      <thm15:themeFamily xmlns:thm15="http://schemas.microsoft.com/office/thememl/2012/main" name="v5_GFT_MASTER.potx" id="{0499BC36-F504-48FE-B624-679107AB1F18}" vid="{304785FB-A37F-4ED5-A32C-8677DED9BBC6}"/>
     </a:ext>
   </a:extLst>
 </a:theme>
@@ -29712,15 +29689,6 @@
 </file>
 
 <file path=customXml/item2.xml><?xml version="1.0" encoding="utf-8"?>
-<?mso-contentType ?>
-<FormTemplates xmlns="http://schemas.microsoft.com/sharepoint/v3/contenttype/forms">
-  <Display>DocumentLibraryForm</Display>
-  <Edit>DocumentLibraryForm</Edit>
-  <New>DocumentLibraryForm</New>
-</FormTemplates>
-</file>
-
-<file path=customXml/item3.xml><?xml version="1.0" encoding="utf-8"?>
 <ct:contentTypeSchema xmlns:ct="http://schemas.microsoft.com/office/2006/metadata/contentType" xmlns:ma="http://schemas.microsoft.com/office/2006/metadata/properties/metaAttributes" ct:_="" ma:_="" ma:contentTypeName="Dokument" ma:contentTypeID="0x010100AA54360A2A4C9D41BAEAEC5B88091E96" ma:contentTypeVersion="0" ma:contentTypeDescription="Ein neues Dokument erstellen." ma:contentTypeScope="" ma:versionID="adbe31085c672446fb9e5148d79a6dc6">
   <xsd:schema xmlns:xsd="http://www.w3.org/2001/XMLSchema" xmlns:xs="http://www.w3.org/2001/XMLSchema" xmlns:p="http://schemas.microsoft.com/office/2006/metadata/properties" targetNamespace="http://schemas.microsoft.com/office/2006/metadata/properties" ma:root="true" ma:fieldsID="cb715de677b26ad619381b53932d724a">
     <xsd:element name="properties">
@@ -29834,6 +29802,15 @@
 </ct:contentTypeSchema>
 </file>
 
+<file path=customXml/item3.xml><?xml version="1.0" encoding="utf-8"?>
+<?mso-contentType ?>
+<FormTemplates xmlns="http://schemas.microsoft.com/sharepoint/v3/contenttype/forms">
+  <Display>DocumentLibraryForm</Display>
+  <Edit>DocumentLibraryForm</Edit>
+  <New>DocumentLibraryForm</New>
+</FormTemplates>
+</file>
+
 <file path=customXml/itemProps1.xml><?xml version="1.0" encoding="utf-8"?>
 <ds:datastoreItem xmlns:ds="http://schemas.openxmlformats.org/officeDocument/2006/customXml" ds:itemID="{5405BF3B-1233-4D26-8BBF-BED295340DF6}">
   <ds:schemaRefs>
@@ -29850,14 +29827,6 @@
 </file>
 
 <file path=customXml/itemProps2.xml><?xml version="1.0" encoding="utf-8"?>
-<ds:datastoreItem xmlns:ds="http://schemas.openxmlformats.org/officeDocument/2006/customXml" ds:itemID="{A99115DC-C02A-4EF3-990D-5FF7CC0EE91A}">
-  <ds:schemaRefs>
-    <ds:schemaRef ds:uri="http://schemas.microsoft.com/sharepoint/v3/contenttype/forms"/>
-  </ds:schemaRefs>
-</ds:datastoreItem>
-</file>
-
-<file path=customXml/itemProps3.xml><?xml version="1.0" encoding="utf-8"?>
 <ds:datastoreItem xmlns:ds="http://schemas.openxmlformats.org/officeDocument/2006/customXml" ds:itemID="{C17FC477-C6F3-4824-AF67-67A952D7D3F1}">
   <ds:schemaRefs>
     <ds:schemaRef ds:uri="http://schemas.microsoft.com/office/2006/metadata/contentType"/>
@@ -29871,4 +29840,12 @@
     <ds:schemaRef ds:uri="http://schemas.microsoft.com/office/infopath/2007/PartnerControls"/>
   </ds:schemaRefs>
 </ds:datastoreItem>
+</file>
+
+<file path=customXml/itemProps3.xml><?xml version="1.0" encoding="utf-8"?>
+<ds:datastoreItem xmlns:ds="http://schemas.openxmlformats.org/officeDocument/2006/customXml" ds:itemID="{A99115DC-C02A-4EF3-990D-5FF7CC0EE91A}">
+  <ds:schemaRefs>
+    <ds:schemaRef ds:uri="http://schemas.microsoft.com/sharepoint/v3/contenttype/forms"/>
+  </ds:schemaRefs>
+</ds:datastoreItem>
 </file>
</xml_diff>